<commit_message>
[JAVA] Adding xsd, endpoint, service and test. Updating configuration.
</commit_message>
<xml_diff>
--- a/SOAP/doc/SOAP.pptx
+++ b/SOAP/doc/SOAP.pptx
@@ -7,7 +7,7 @@
     <p:sldMasterId id="2147483683" r:id="rId3"/>
   </p:sldMasterIdLst>
   <p:notesMasterIdLst>
-    <p:notesMasterId r:id="rId30"/>
+    <p:notesMasterId r:id="rId33"/>
   </p:notesMasterIdLst>
   <p:sldIdLst>
     <p:sldId id="256" r:id="rId4"/>
@@ -15,27 +15,30 @@
     <p:sldId id="283" r:id="rId6"/>
     <p:sldId id="257" r:id="rId7"/>
     <p:sldId id="409" r:id="rId8"/>
-    <p:sldId id="258" r:id="rId9"/>
-    <p:sldId id="410" r:id="rId10"/>
-    <p:sldId id="407" r:id="rId11"/>
-    <p:sldId id="408" r:id="rId12"/>
-    <p:sldId id="275" r:id="rId13"/>
-    <p:sldId id="284" r:id="rId14"/>
-    <p:sldId id="295" r:id="rId15"/>
-    <p:sldId id="308" r:id="rId16"/>
-    <p:sldId id="318" r:id="rId17"/>
-    <p:sldId id="324" r:id="rId18"/>
-    <p:sldId id="332" r:id="rId19"/>
-    <p:sldId id="350" r:id="rId20"/>
-    <p:sldId id="357" r:id="rId21"/>
-    <p:sldId id="364" r:id="rId22"/>
-    <p:sldId id="371" r:id="rId23"/>
-    <p:sldId id="382" r:id="rId24"/>
-    <p:sldId id="390" r:id="rId25"/>
-    <p:sldId id="391" r:id="rId26"/>
-    <p:sldId id="405" r:id="rId27"/>
-    <p:sldId id="403" r:id="rId28"/>
-    <p:sldId id="404" r:id="rId29"/>
+    <p:sldId id="412" r:id="rId9"/>
+    <p:sldId id="258" r:id="rId10"/>
+    <p:sldId id="410" r:id="rId11"/>
+    <p:sldId id="407" r:id="rId12"/>
+    <p:sldId id="411" r:id="rId13"/>
+    <p:sldId id="414" r:id="rId14"/>
+    <p:sldId id="408" r:id="rId15"/>
+    <p:sldId id="284" r:id="rId16"/>
+    <p:sldId id="413" r:id="rId17"/>
+    <p:sldId id="415" r:id="rId18"/>
+    <p:sldId id="308" r:id="rId19"/>
+    <p:sldId id="318" r:id="rId20"/>
+    <p:sldId id="324" r:id="rId21"/>
+    <p:sldId id="332" r:id="rId22"/>
+    <p:sldId id="350" r:id="rId23"/>
+    <p:sldId id="357" r:id="rId24"/>
+    <p:sldId id="364" r:id="rId25"/>
+    <p:sldId id="371" r:id="rId26"/>
+    <p:sldId id="382" r:id="rId27"/>
+    <p:sldId id="390" r:id="rId28"/>
+    <p:sldId id="391" r:id="rId29"/>
+    <p:sldId id="405" r:id="rId30"/>
+    <p:sldId id="403" r:id="rId31"/>
+    <p:sldId id="404" r:id="rId32"/>
   </p:sldIdLst>
   <p:sldSz cx="9144000" cy="6858000" type="screen4x3"/>
   <p:notesSz cx="6858000" cy="9144000"/>
@@ -143,22 +146,29 @@
             <p14:sldId id="406"/>
           </p14:sldIdLst>
         </p14:section>
-        <p14:section name="jQuery Basics" id="{BEADEFE6-1E6F-4FB7-9CDA-16D184D6C6EC}">
+        <p14:section name="SOAP Basics" id="{BEADEFE6-1E6F-4FB7-9CDA-16D184D6C6EC}">
           <p14:sldIdLst>
             <p14:sldId id="283"/>
             <p14:sldId id="257"/>
             <p14:sldId id="409"/>
+            <p14:sldId id="412"/>
             <p14:sldId id="258"/>
+          </p14:sldIdLst>
+        </p14:section>
+        <p14:section name="SOAP Architecture" id="{ADB77CB3-A231-41BA-8EB6-19A494CB1288}">
+          <p14:sldIdLst>
             <p14:sldId id="410"/>
             <p14:sldId id="407"/>
+            <p14:sldId id="411"/>
+            <p14:sldId id="414"/>
             <p14:sldId id="408"/>
-            <p14:sldId id="275"/>
           </p14:sldIdLst>
         </p14:section>
-        <p14:section name="Traversing the DOM" id="{F801AF68-436B-43F7-948C-6B5AF8894FCF}">
+        <p14:section name="Spring Web Service" id="{F801AF68-436B-43F7-948C-6B5AF8894FCF}">
           <p14:sldIdLst>
             <p14:sldId id="284"/>
-            <p14:sldId id="295"/>
+            <p14:sldId id="413"/>
+            <p14:sldId id="415"/>
           </p14:sldIdLst>
         </p14:section>
         <p14:section name="Manipulating the DOM" id="{CB680070-3E14-4ED4-8C25-16109008F18E}">
@@ -289,7 +299,7 @@
           <a:p>
             <a:fld id="{C12A86BB-B91D-4109-9037-CC50C5C80585}" type="datetimeFigureOut">
               <a:rPr lang="en-US" smtClean="0"/>
-              <a:t>10/14/2015</a:t>
+              <a:t>10/18/2015</a:t>
             </a:fld>
             <a:endParaRPr lang="en-US"/>
           </a:p>
@@ -448,7 +458,7 @@
           <a:p>
             <a:fld id="{8053F0D8-51BC-4D3B-8B41-73524C0D47EC}" type="slidenum">
               <a:rPr lang="en-US" smtClean="0"/>
-              <a:t>‹Nº›</a:t>
+              <a:t>‹#›</a:t>
             </a:fld>
             <a:endParaRPr lang="en-US"/>
           </a:p>
@@ -952,216 +962,6 @@
 </file>
 
 <file path=ppt/slideLayouts/slideLayout10.xml><?xml version="1.0" encoding="utf-8"?>
-<p:sldLayout xmlns:a="http://schemas.openxmlformats.org/drawingml/2006/main" xmlns:r="http://schemas.openxmlformats.org/officeDocument/2006/relationships" xmlns:p="http://schemas.openxmlformats.org/presentationml/2006/main" type="obj">
-  <p:cSld name="Title and Content">
-    <p:spTree>
-      <p:nvGrpSpPr>
-        <p:cNvPr id="1" name=""/>
-        <p:cNvGrpSpPr/>
-        <p:nvPr/>
-      </p:nvGrpSpPr>
-      <p:grpSpPr>
-        <a:xfrm>
-          <a:off x="0" y="0"/>
-          <a:ext cx="0" cy="0"/>
-          <a:chOff x="0" y="0"/>
-          <a:chExt cx="0" cy="0"/>
-        </a:xfrm>
-      </p:grpSpPr>
-      <p:sp>
-        <p:nvSpPr>
-          <p:cNvPr id="2" name="Title 1"/>
-          <p:cNvSpPr>
-            <a:spLocks noGrp="1"/>
-          </p:cNvSpPr>
-          <p:nvPr>
-            <p:ph type="title"/>
-          </p:nvPr>
-        </p:nvSpPr>
-        <p:spPr>
-          <a:xfrm>
-            <a:off x="457200" y="274638"/>
-            <a:ext cx="8229600" cy="1143000"/>
-          </a:xfrm>
-          <a:prstGeom prst="rect">
-            <a:avLst/>
-          </a:prstGeom>
-        </p:spPr>
-        <p:txBody>
-          <a:bodyPr/>
-          <a:lstStyle/>
-          <a:p>
-            <a:r>
-              <a:rPr lang="en-US" smtClean="0"/>
-              <a:t>Click to edit Master title style</a:t>
-            </a:r>
-            <a:endParaRPr lang="en-US"/>
-          </a:p>
-        </p:txBody>
-      </p:sp>
-      <p:sp>
-        <p:nvSpPr>
-          <p:cNvPr id="3" name="Content Placeholder 2"/>
-          <p:cNvSpPr>
-            <a:spLocks noGrp="1"/>
-          </p:cNvSpPr>
-          <p:nvPr>
-            <p:ph idx="1"/>
-          </p:nvPr>
-        </p:nvSpPr>
-        <p:spPr>
-          <a:xfrm>
-            <a:off x="457200" y="1600200"/>
-            <a:ext cx="8229600" cy="4525963"/>
-          </a:xfrm>
-          <a:prstGeom prst="rect">
-            <a:avLst/>
-          </a:prstGeom>
-        </p:spPr>
-        <p:txBody>
-          <a:bodyPr/>
-          <a:lstStyle/>
-          <a:p>
-            <a:pPr lvl="0"/>
-            <a:r>
-              <a:rPr lang="en-US" smtClean="0"/>
-              <a:t>Click to edit Master text styles</a:t>
-            </a:r>
-          </a:p>
-          <a:p>
-            <a:pPr lvl="1"/>
-            <a:r>
-              <a:rPr lang="en-US" smtClean="0"/>
-              <a:t>Second level</a:t>
-            </a:r>
-          </a:p>
-          <a:p>
-            <a:pPr lvl="2"/>
-            <a:r>
-              <a:rPr lang="en-US" smtClean="0"/>
-              <a:t>Third level</a:t>
-            </a:r>
-          </a:p>
-          <a:p>
-            <a:pPr lvl="3"/>
-            <a:r>
-              <a:rPr lang="en-US" smtClean="0"/>
-              <a:t>Fourth level</a:t>
-            </a:r>
-          </a:p>
-          <a:p>
-            <a:pPr lvl="4"/>
-            <a:r>
-              <a:rPr lang="en-US" smtClean="0"/>
-              <a:t>Fifth level</a:t>
-            </a:r>
-            <a:endParaRPr lang="en-US"/>
-          </a:p>
-        </p:txBody>
-      </p:sp>
-      <p:sp>
-        <p:nvSpPr>
-          <p:cNvPr id="4" name="Date Placeholder 3"/>
-          <p:cNvSpPr>
-            <a:spLocks noGrp="1"/>
-          </p:cNvSpPr>
-          <p:nvPr>
-            <p:ph type="dt" sz="half" idx="10"/>
-          </p:nvPr>
-        </p:nvSpPr>
-        <p:spPr>
-          <a:xfrm>
-            <a:off x="457200" y="6356350"/>
-            <a:ext cx="2133600" cy="365125"/>
-          </a:xfrm>
-          <a:prstGeom prst="rect">
-            <a:avLst/>
-          </a:prstGeom>
-        </p:spPr>
-        <p:txBody>
-          <a:bodyPr/>
-          <a:lstStyle/>
-          <a:p>
-            <a:fld id="{748BD116-2C56-4960-9148-E30902D398A4}" type="datetimeFigureOut">
-              <a:rPr lang="en-US" smtClean="0"/>
-              <a:t>10/14/2015</a:t>
-            </a:fld>
-            <a:endParaRPr lang="en-US"/>
-          </a:p>
-        </p:txBody>
-      </p:sp>
-      <p:sp>
-        <p:nvSpPr>
-          <p:cNvPr id="5" name="Footer Placeholder 4"/>
-          <p:cNvSpPr>
-            <a:spLocks noGrp="1"/>
-          </p:cNvSpPr>
-          <p:nvPr>
-            <p:ph type="ftr" sz="quarter" idx="11"/>
-          </p:nvPr>
-        </p:nvSpPr>
-        <p:spPr>
-          <a:xfrm>
-            <a:off x="3124200" y="6356350"/>
-            <a:ext cx="2895600" cy="365125"/>
-          </a:xfrm>
-          <a:prstGeom prst="rect">
-            <a:avLst/>
-          </a:prstGeom>
-        </p:spPr>
-        <p:txBody>
-          <a:bodyPr/>
-          <a:lstStyle/>
-          <a:p>
-            <a:endParaRPr lang="en-US"/>
-          </a:p>
-        </p:txBody>
-      </p:sp>
-      <p:sp>
-        <p:nvSpPr>
-          <p:cNvPr id="6" name="Slide Number Placeholder 5"/>
-          <p:cNvSpPr>
-            <a:spLocks noGrp="1"/>
-          </p:cNvSpPr>
-          <p:nvPr>
-            <p:ph type="sldNum" sz="quarter" idx="12"/>
-          </p:nvPr>
-        </p:nvSpPr>
-        <p:spPr>
-          <a:xfrm>
-            <a:off x="6553200" y="6356350"/>
-            <a:ext cx="2133600" cy="365125"/>
-          </a:xfrm>
-          <a:prstGeom prst="rect">
-            <a:avLst/>
-          </a:prstGeom>
-        </p:spPr>
-        <p:txBody>
-          <a:bodyPr/>
-          <a:lstStyle/>
-          <a:p>
-            <a:fld id="{CC40A78D-6A80-4A8A-BDF0-EC8EB4C8ED3A}" type="slidenum">
-              <a:rPr lang="en-US" smtClean="0"/>
-              <a:t>‹Nº›</a:t>
-            </a:fld>
-            <a:endParaRPr lang="en-US"/>
-          </a:p>
-        </p:txBody>
-      </p:sp>
-    </p:spTree>
-    <p:extLst>
-      <p:ext uri="{BB962C8B-B14F-4D97-AF65-F5344CB8AC3E}">
-        <p14:creationId xmlns:p14="http://schemas.microsoft.com/office/powerpoint/2010/main" val="1858742807"/>
-      </p:ext>
-    </p:extLst>
-  </p:cSld>
-  <p:clrMapOvr>
-    <a:masterClrMapping/>
-  </p:clrMapOvr>
-</p:sldLayout>
-</file>
-
-<file path=ppt/slideLayouts/slideLayout11.xml><?xml version="1.0" encoding="utf-8"?>
 <p:sldLayout xmlns:a="http://schemas.openxmlformats.org/drawingml/2006/main" xmlns:r="http://schemas.openxmlformats.org/officeDocument/2006/relationships" xmlns:p="http://schemas.openxmlformats.org/presentationml/2006/main" userDrawn="1">
   <p:cSld name="Title ">
     <p:spTree>
@@ -1264,7 +1064,7 @@
               <a:pPr>
                 <a:defRPr/>
               </a:pPr>
-              <a:t>‹Nº›</a:t>
+              <a:t>‹#›</a:t>
             </a:fld>
             <a:endParaRPr lang="en-US" noProof="0"/>
           </a:p>
@@ -1290,137 +1090,8 @@
 </p:sldLayout>
 </file>
 
-<file path=ppt/slideLayouts/slideLayout12.xml><?xml version="1.0" encoding="utf-8"?>
-<p:sldLayout xmlns:a="http://schemas.openxmlformats.org/drawingml/2006/main" xmlns:r="http://schemas.openxmlformats.org/officeDocument/2006/relationships" xmlns:p="http://schemas.openxmlformats.org/presentationml/2006/main" preserve="1" userDrawn="1">
-  <p:cSld name="Title ">
-    <p:spTree>
-      <p:nvGrpSpPr>
-        <p:cNvPr id="1" name=""/>
-        <p:cNvGrpSpPr/>
-        <p:nvPr/>
-      </p:nvGrpSpPr>
-      <p:grpSpPr>
-        <a:xfrm>
-          <a:off x="0" y="0"/>
-          <a:ext cx="0" cy="0"/>
-          <a:chOff x="0" y="0"/>
-          <a:chExt cx="0" cy="0"/>
-        </a:xfrm>
-      </p:grpSpPr>
-      <p:sp>
-        <p:nvSpPr>
-          <p:cNvPr id="4" name="Title Placeholder 14"/>
-          <p:cNvSpPr>
-            <a:spLocks noGrp="1"/>
-          </p:cNvSpPr>
-          <p:nvPr>
-            <p:ph type="title"/>
-          </p:nvPr>
-        </p:nvSpPr>
-        <p:spPr bwMode="auto">
-          <a:xfrm>
-            <a:off x="457200" y="192088"/>
-            <a:ext cx="7194430" cy="849312"/>
-          </a:xfrm>
-          <a:prstGeom prst="rect">
-            <a:avLst/>
-          </a:prstGeom>
-          <a:noFill/>
-          <a:ln w="9525">
-            <a:noFill/>
-            <a:miter lim="800000"/>
-            <a:headEnd/>
-            <a:tailEnd/>
-          </a:ln>
-        </p:spPr>
-        <p:txBody>
-          <a:bodyPr/>
-          <a:lstStyle>
-            <a:lvl1pPr>
-              <a:defRPr>
-                <a:solidFill>
-                  <a:schemeClr val="accent2"/>
-                </a:solidFill>
-              </a:defRPr>
-            </a:lvl1pPr>
-          </a:lstStyle>
-          <a:p>
-            <a:pPr lvl="0"/>
-            <a:r>
-              <a:rPr lang="en-US" noProof="0" smtClean="0"/>
-              <a:t>Click to edit Master title style</a:t>
-            </a:r>
-          </a:p>
-        </p:txBody>
-      </p:sp>
-      <p:sp>
-        <p:nvSpPr>
-          <p:cNvPr id="8" name="Slide Number Placeholder 6"/>
-          <p:cNvSpPr>
-            <a:spLocks noGrp="1"/>
-          </p:cNvSpPr>
-          <p:nvPr>
-            <p:ph type="sldNum" sz="quarter" idx="4"/>
-          </p:nvPr>
-        </p:nvSpPr>
-        <p:spPr>
-          <a:xfrm>
-            <a:off x="395536" y="6520259"/>
-            <a:ext cx="360040" cy="221109"/>
-          </a:xfrm>
-          <a:prstGeom prst="rect">
-            <a:avLst/>
-          </a:prstGeom>
-        </p:spPr>
-        <p:txBody>
-          <a:bodyPr vert="horz" lIns="91440" tIns="45720" rIns="91440" bIns="45720" rtlCol="0" anchor="ctr"/>
-          <a:lstStyle>
-            <a:lvl1pPr algn="r">
-              <a:defRPr sz="800" b="1">
-                <a:solidFill>
-                  <a:schemeClr val="accent2"/>
-                </a:solidFill>
-                <a:latin typeface="Arial" charset="0"/>
-              </a:defRPr>
-            </a:lvl1pPr>
-          </a:lstStyle>
-          <a:p>
-            <a:pPr>
-              <a:defRPr/>
-            </a:pPr>
-            <a:fld id="{4AD834FB-D050-4DAD-A587-98ECF1E1D3D9}" type="slidenum">
-              <a:rPr lang="en-US" noProof="0" smtClean="0"/>
-              <a:pPr>
-                <a:defRPr/>
-              </a:pPr>
-              <a:t>‹Nº›</a:t>
-            </a:fld>
-            <a:endParaRPr lang="en-US" noProof="0"/>
-          </a:p>
-        </p:txBody>
-      </p:sp>
-    </p:spTree>
-    <p:extLst>
-      <p:ext uri="{BB962C8B-B14F-4D97-AF65-F5344CB8AC3E}">
-        <p14:creationId xmlns:p14="http://schemas.microsoft.com/office/powerpoint/2010/main" val="1639072039"/>
-      </p:ext>
-    </p:extLst>
-  </p:cSld>
-  <p:clrMapOvr>
-    <a:masterClrMapping/>
-  </p:clrMapOvr>
-  <p:timing>
-    <p:tnLst>
-      <p:par>
-        <p:cTn id="1" dur="indefinite" restart="never" nodeType="tmRoot"/>
-      </p:par>
-    </p:tnLst>
-  </p:timing>
-</p:sldLayout>
-</file>
-
-<file path=ppt/slideLayouts/slideLayout13.xml><?xml version="1.0" encoding="utf-8"?>
-<p:sldLayout xmlns:a="http://schemas.openxmlformats.org/drawingml/2006/main" xmlns:r="http://schemas.openxmlformats.org/officeDocument/2006/relationships" xmlns:p="http://schemas.openxmlformats.org/presentationml/2006/main" preserve="1" userDrawn="1">
+<file path=ppt/slideLayouts/slideLayout11.xml><?xml version="1.0" encoding="utf-8"?>
+<p:sldLayout xmlns:a="http://schemas.openxmlformats.org/drawingml/2006/main" xmlns:r="http://schemas.openxmlformats.org/officeDocument/2006/relationships" xmlns:p="http://schemas.openxmlformats.org/presentationml/2006/main" userDrawn="1">
   <p:cSld name="Title and Content">
     <p:spTree>
       <p:nvGrpSpPr>
@@ -1451,6 +1122,9 @@
             <a:off x="462227" y="1339789"/>
             <a:ext cx="8208912" cy="4965019"/>
           </a:xfrm>
+          <a:prstGeom prst="rect">
+            <a:avLst/>
+          </a:prstGeom>
         </p:spPr>
         <p:txBody>
           <a:bodyPr/>
@@ -1760,7 +1434,503 @@
               <a:pPr>
                 <a:defRPr/>
               </a:pPr>
-              <a:t>‹Nº›</a:t>
+              <a:t>‹#›</a:t>
+            </a:fld>
+            <a:endParaRPr lang="en-US" noProof="0"/>
+          </a:p>
+        </p:txBody>
+      </p:sp>
+    </p:spTree>
+    <p:extLst>
+      <p:ext uri="{BB962C8B-B14F-4D97-AF65-F5344CB8AC3E}">
+        <p14:creationId xmlns:p14="http://schemas.microsoft.com/office/powerpoint/2010/main" val="3635225305"/>
+      </p:ext>
+    </p:extLst>
+  </p:cSld>
+  <p:clrMapOvr>
+    <a:masterClrMapping/>
+  </p:clrMapOvr>
+  <p:timing>
+    <p:tnLst>
+      <p:par>
+        <p:cTn id="1" dur="indefinite" restart="never" nodeType="tmRoot"/>
+      </p:par>
+    </p:tnLst>
+  </p:timing>
+</p:sldLayout>
+</file>
+
+<file path=ppt/slideLayouts/slideLayout12.xml><?xml version="1.0" encoding="utf-8"?>
+<p:sldLayout xmlns:a="http://schemas.openxmlformats.org/drawingml/2006/main" xmlns:r="http://schemas.openxmlformats.org/officeDocument/2006/relationships" xmlns:p="http://schemas.openxmlformats.org/presentationml/2006/main" preserve="1" userDrawn="1">
+  <p:cSld name="Title ">
+    <p:spTree>
+      <p:nvGrpSpPr>
+        <p:cNvPr id="1" name=""/>
+        <p:cNvGrpSpPr/>
+        <p:nvPr/>
+      </p:nvGrpSpPr>
+      <p:grpSpPr>
+        <a:xfrm>
+          <a:off x="0" y="0"/>
+          <a:ext cx="0" cy="0"/>
+          <a:chOff x="0" y="0"/>
+          <a:chExt cx="0" cy="0"/>
+        </a:xfrm>
+      </p:grpSpPr>
+      <p:sp>
+        <p:nvSpPr>
+          <p:cNvPr id="4" name="Title Placeholder 14"/>
+          <p:cNvSpPr>
+            <a:spLocks noGrp="1"/>
+          </p:cNvSpPr>
+          <p:nvPr>
+            <p:ph type="title"/>
+          </p:nvPr>
+        </p:nvSpPr>
+        <p:spPr bwMode="auto">
+          <a:xfrm>
+            <a:off x="457200" y="192088"/>
+            <a:ext cx="7194430" cy="849312"/>
+          </a:xfrm>
+          <a:prstGeom prst="rect">
+            <a:avLst/>
+          </a:prstGeom>
+          <a:noFill/>
+          <a:ln w="9525">
+            <a:noFill/>
+            <a:miter lim="800000"/>
+            <a:headEnd/>
+            <a:tailEnd/>
+          </a:ln>
+        </p:spPr>
+        <p:txBody>
+          <a:bodyPr/>
+          <a:lstStyle>
+            <a:lvl1pPr>
+              <a:defRPr>
+                <a:solidFill>
+                  <a:schemeClr val="accent2"/>
+                </a:solidFill>
+              </a:defRPr>
+            </a:lvl1pPr>
+          </a:lstStyle>
+          <a:p>
+            <a:pPr lvl="0"/>
+            <a:r>
+              <a:rPr lang="en-US" noProof="0" smtClean="0"/>
+              <a:t>Click to edit Master title style</a:t>
+            </a:r>
+          </a:p>
+        </p:txBody>
+      </p:sp>
+      <p:sp>
+        <p:nvSpPr>
+          <p:cNvPr id="8" name="Slide Number Placeholder 6"/>
+          <p:cNvSpPr>
+            <a:spLocks noGrp="1"/>
+          </p:cNvSpPr>
+          <p:nvPr>
+            <p:ph type="sldNum" sz="quarter" idx="4"/>
+          </p:nvPr>
+        </p:nvSpPr>
+        <p:spPr>
+          <a:xfrm>
+            <a:off x="395536" y="6520259"/>
+            <a:ext cx="360040" cy="221109"/>
+          </a:xfrm>
+          <a:prstGeom prst="rect">
+            <a:avLst/>
+          </a:prstGeom>
+        </p:spPr>
+        <p:txBody>
+          <a:bodyPr vert="horz" lIns="91440" tIns="45720" rIns="91440" bIns="45720" rtlCol="0" anchor="ctr"/>
+          <a:lstStyle>
+            <a:lvl1pPr algn="r">
+              <a:defRPr sz="800" b="1">
+                <a:solidFill>
+                  <a:schemeClr val="accent2"/>
+                </a:solidFill>
+                <a:latin typeface="Arial" charset="0"/>
+              </a:defRPr>
+            </a:lvl1pPr>
+          </a:lstStyle>
+          <a:p>
+            <a:pPr>
+              <a:defRPr/>
+            </a:pPr>
+            <a:fld id="{4AD834FB-D050-4DAD-A587-98ECF1E1D3D9}" type="slidenum">
+              <a:rPr lang="en-US" noProof="0" smtClean="0"/>
+              <a:pPr>
+                <a:defRPr/>
+              </a:pPr>
+              <a:t>‹#›</a:t>
+            </a:fld>
+            <a:endParaRPr lang="en-US" noProof="0"/>
+          </a:p>
+        </p:txBody>
+      </p:sp>
+    </p:spTree>
+    <p:extLst>
+      <p:ext uri="{BB962C8B-B14F-4D97-AF65-F5344CB8AC3E}">
+        <p14:creationId xmlns:p14="http://schemas.microsoft.com/office/powerpoint/2010/main" val="1639072039"/>
+      </p:ext>
+    </p:extLst>
+  </p:cSld>
+  <p:clrMapOvr>
+    <a:masterClrMapping/>
+  </p:clrMapOvr>
+  <p:timing>
+    <p:tnLst>
+      <p:par>
+        <p:cTn id="1" dur="indefinite" restart="never" nodeType="tmRoot"/>
+      </p:par>
+    </p:tnLst>
+  </p:timing>
+</p:sldLayout>
+</file>
+
+<file path=ppt/slideLayouts/slideLayout13.xml><?xml version="1.0" encoding="utf-8"?>
+<p:sldLayout xmlns:a="http://schemas.openxmlformats.org/drawingml/2006/main" xmlns:r="http://schemas.openxmlformats.org/officeDocument/2006/relationships" xmlns:p="http://schemas.openxmlformats.org/presentationml/2006/main" preserve="1" userDrawn="1">
+  <p:cSld name="Title and Content">
+    <p:spTree>
+      <p:nvGrpSpPr>
+        <p:cNvPr id="1" name=""/>
+        <p:cNvGrpSpPr/>
+        <p:nvPr/>
+      </p:nvGrpSpPr>
+      <p:grpSpPr>
+        <a:xfrm>
+          <a:off x="0" y="0"/>
+          <a:ext cx="0" cy="0"/>
+          <a:chOff x="0" y="0"/>
+          <a:chExt cx="0" cy="0"/>
+        </a:xfrm>
+      </p:grpSpPr>
+      <p:sp>
+        <p:nvSpPr>
+          <p:cNvPr id="4" name="Content Placeholder 3"/>
+          <p:cNvSpPr>
+            <a:spLocks noGrp="1"/>
+          </p:cNvSpPr>
+          <p:nvPr>
+            <p:ph sz="quarter" idx="10"/>
+          </p:nvPr>
+        </p:nvSpPr>
+        <p:spPr>
+          <a:xfrm>
+            <a:off x="462227" y="1339789"/>
+            <a:ext cx="8208912" cy="4965019"/>
+          </a:xfrm>
+        </p:spPr>
+        <p:txBody>
+          <a:bodyPr/>
+          <a:lstStyle>
+            <a:lvl1pPr marL="126000" marR="0" indent="-180000" algn="l" defTabSz="914400" rtl="0" eaLnBrk="0" fontAlgn="base" latinLnBrk="0" hangingPunct="0">
+              <a:lnSpc>
+                <a:spcPct val="100000"/>
+              </a:lnSpc>
+              <a:spcBef>
+                <a:spcPct val="20000"/>
+              </a:spcBef>
+              <a:spcAft>
+                <a:spcPct val="0"/>
+              </a:spcAft>
+              <a:buClrTx/>
+              <a:buSzTx/>
+              <a:buFont typeface="Arial Rounded MT Bold" pitchFamily="34" charset="0"/>
+              <a:buChar char="›"/>
+              <a:tabLst/>
+              <a:defRPr/>
+            </a:lvl1pPr>
+            <a:lvl2pPr marL="540000" marR="0" indent="-180000" algn="l" defTabSz="914400" rtl="0" eaLnBrk="0" fontAlgn="base" latinLnBrk="0" hangingPunct="0">
+              <a:lnSpc>
+                <a:spcPct val="100000"/>
+              </a:lnSpc>
+              <a:spcBef>
+                <a:spcPct val="20000"/>
+              </a:spcBef>
+              <a:spcAft>
+                <a:spcPct val="0"/>
+              </a:spcAft>
+              <a:buClrTx/>
+              <a:buSzTx/>
+              <a:buFont typeface="Arial Rounded MT Bold" pitchFamily="34" charset="0"/>
+              <a:buChar char="›"/>
+              <a:tabLst/>
+              <a:defRPr/>
+            </a:lvl2pPr>
+            <a:lvl3pPr marL="715963" marR="0" indent="-180000" algn="l" defTabSz="914400" rtl="0" eaLnBrk="0" fontAlgn="base" latinLnBrk="0" hangingPunct="0">
+              <a:lnSpc>
+                <a:spcPct val="100000"/>
+              </a:lnSpc>
+              <a:spcBef>
+                <a:spcPct val="20000"/>
+              </a:spcBef>
+              <a:spcAft>
+                <a:spcPct val="0"/>
+              </a:spcAft>
+              <a:buClrTx/>
+              <a:buSzTx/>
+              <a:buFont typeface="Arial Rounded MT Bold" pitchFamily="34" charset="0"/>
+              <a:buChar char="›"/>
+              <a:tabLst/>
+              <a:defRPr/>
+            </a:lvl3pPr>
+            <a:lvl4pPr marL="923925" marR="0" indent="-180000" algn="l" defTabSz="914400" rtl="0" eaLnBrk="0" fontAlgn="base" latinLnBrk="0" hangingPunct="0">
+              <a:lnSpc>
+                <a:spcPct val="100000"/>
+              </a:lnSpc>
+              <a:spcBef>
+                <a:spcPct val="20000"/>
+              </a:spcBef>
+              <a:spcAft>
+                <a:spcPct val="0"/>
+              </a:spcAft>
+              <a:buClrTx/>
+              <a:buSzTx/>
+              <a:buFont typeface="Arial Rounded MT Bold" pitchFamily="34" charset="0"/>
+              <a:buChar char="›"/>
+              <a:tabLst/>
+              <a:defRPr/>
+            </a:lvl4pPr>
+          </a:lstStyle>
+          <a:p>
+            <a:pPr marL="126000" marR="0" lvl="0" indent="-180000" algn="l" defTabSz="914400" rtl="0" eaLnBrk="0" fontAlgn="base" latinLnBrk="0" hangingPunct="0">
+              <a:lnSpc>
+                <a:spcPct val="100000"/>
+              </a:lnSpc>
+              <a:spcBef>
+                <a:spcPct val="20000"/>
+              </a:spcBef>
+              <a:spcAft>
+                <a:spcPct val="0"/>
+              </a:spcAft>
+              <a:buClrTx/>
+              <a:buSzTx/>
+              <a:buFont typeface="Arial Rounded MT Bold" pitchFamily="34" charset="0"/>
+              <a:buChar char="›"/>
+              <a:tabLst/>
+              <a:defRPr/>
+            </a:pPr>
+            <a:r>
+              <a:rPr kumimoji="0" lang="en-US" sz="1800" b="0" i="0" u="none" strike="noStrike" kern="1200" cap="none" spc="0" normalizeH="0" baseline="0" noProof="0" smtClean="0">
+                <a:ln>
+                  <a:noFill/>
+                </a:ln>
+                <a:solidFill>
+                  <a:srgbClr val="2B2D2E">
+                    <a:lumMod val="75000"/>
+                    <a:lumOff val="25000"/>
+                  </a:srgbClr>
+                </a:solidFill>
+                <a:effectLst/>
+                <a:uLnTx/>
+                <a:uFillTx/>
+                <a:latin typeface="Arial"/>
+                <a:ea typeface="+mn-ea"/>
+                <a:cs typeface="Arial"/>
+              </a:rPr>
+              <a:t>Click to edit Master text styles</a:t>
+            </a:r>
+          </a:p>
+          <a:p>
+            <a:pPr marL="126000" marR="0" lvl="1" indent="-180000" algn="l" defTabSz="914400" rtl="0" eaLnBrk="0" fontAlgn="base" latinLnBrk="0" hangingPunct="0">
+              <a:lnSpc>
+                <a:spcPct val="100000"/>
+              </a:lnSpc>
+              <a:spcBef>
+                <a:spcPct val="20000"/>
+              </a:spcBef>
+              <a:spcAft>
+                <a:spcPct val="0"/>
+              </a:spcAft>
+              <a:buClrTx/>
+              <a:buSzTx/>
+              <a:buFont typeface="Arial Rounded MT Bold" pitchFamily="34" charset="0"/>
+              <a:buChar char="›"/>
+              <a:tabLst/>
+              <a:defRPr/>
+            </a:pPr>
+            <a:r>
+              <a:rPr kumimoji="0" lang="en-US" sz="1800" b="0" i="0" u="none" strike="noStrike" kern="1200" cap="none" spc="0" normalizeH="0" baseline="0" noProof="0" smtClean="0">
+                <a:ln>
+                  <a:noFill/>
+                </a:ln>
+                <a:solidFill>
+                  <a:srgbClr val="2B2D2E">
+                    <a:lumMod val="75000"/>
+                    <a:lumOff val="25000"/>
+                  </a:srgbClr>
+                </a:solidFill>
+                <a:effectLst/>
+                <a:uLnTx/>
+                <a:uFillTx/>
+                <a:latin typeface="Arial"/>
+                <a:ea typeface="+mn-ea"/>
+                <a:cs typeface="Arial"/>
+              </a:rPr>
+              <a:t>Second level</a:t>
+            </a:r>
+          </a:p>
+          <a:p>
+            <a:pPr marL="126000" marR="0" lvl="2" indent="-180000" algn="l" defTabSz="914400" rtl="0" eaLnBrk="0" fontAlgn="base" latinLnBrk="0" hangingPunct="0">
+              <a:lnSpc>
+                <a:spcPct val="100000"/>
+              </a:lnSpc>
+              <a:spcBef>
+                <a:spcPct val="20000"/>
+              </a:spcBef>
+              <a:spcAft>
+                <a:spcPct val="0"/>
+              </a:spcAft>
+              <a:buClrTx/>
+              <a:buSzTx/>
+              <a:buFont typeface="Arial Rounded MT Bold" pitchFamily="34" charset="0"/>
+              <a:buChar char="›"/>
+              <a:tabLst/>
+              <a:defRPr/>
+            </a:pPr>
+            <a:r>
+              <a:rPr kumimoji="0" lang="en-US" sz="1800" b="0" i="0" u="none" strike="noStrike" kern="1200" cap="none" spc="0" normalizeH="0" baseline="0" noProof="0" smtClean="0">
+                <a:ln>
+                  <a:noFill/>
+                </a:ln>
+                <a:solidFill>
+                  <a:srgbClr val="2B2D2E">
+                    <a:lumMod val="75000"/>
+                    <a:lumOff val="25000"/>
+                  </a:srgbClr>
+                </a:solidFill>
+                <a:effectLst/>
+                <a:uLnTx/>
+                <a:uFillTx/>
+                <a:latin typeface="Arial"/>
+                <a:ea typeface="+mn-ea"/>
+                <a:cs typeface="Arial"/>
+              </a:rPr>
+              <a:t>Third level</a:t>
+            </a:r>
+          </a:p>
+          <a:p>
+            <a:pPr marL="126000" marR="0" lvl="3" indent="-180000" algn="l" defTabSz="914400" rtl="0" eaLnBrk="0" fontAlgn="base" latinLnBrk="0" hangingPunct="0">
+              <a:lnSpc>
+                <a:spcPct val="100000"/>
+              </a:lnSpc>
+              <a:spcBef>
+                <a:spcPct val="20000"/>
+              </a:spcBef>
+              <a:spcAft>
+                <a:spcPct val="0"/>
+              </a:spcAft>
+              <a:buClrTx/>
+              <a:buSzTx/>
+              <a:buFont typeface="Arial Rounded MT Bold" pitchFamily="34" charset="0"/>
+              <a:buChar char="›"/>
+              <a:tabLst/>
+              <a:defRPr/>
+            </a:pPr>
+            <a:r>
+              <a:rPr kumimoji="0" lang="en-US" sz="1800" b="0" i="0" u="none" strike="noStrike" kern="1200" cap="none" spc="0" normalizeH="0" baseline="0" noProof="0" smtClean="0">
+                <a:ln>
+                  <a:noFill/>
+                </a:ln>
+                <a:solidFill>
+                  <a:srgbClr val="2B2D2E">
+                    <a:lumMod val="75000"/>
+                    <a:lumOff val="25000"/>
+                  </a:srgbClr>
+                </a:solidFill>
+                <a:effectLst/>
+                <a:uLnTx/>
+                <a:uFillTx/>
+                <a:latin typeface="Arial"/>
+                <a:ea typeface="+mn-ea"/>
+                <a:cs typeface="Arial"/>
+              </a:rPr>
+              <a:t>Fourth level</a:t>
+            </a:r>
+          </a:p>
+        </p:txBody>
+      </p:sp>
+      <p:sp>
+        <p:nvSpPr>
+          <p:cNvPr id="5" name="Title Placeholder 14"/>
+          <p:cNvSpPr>
+            <a:spLocks noGrp="1"/>
+          </p:cNvSpPr>
+          <p:nvPr>
+            <p:ph type="title"/>
+          </p:nvPr>
+        </p:nvSpPr>
+        <p:spPr bwMode="auto">
+          <a:xfrm>
+            <a:off x="457200" y="192088"/>
+            <a:ext cx="7194430" cy="849312"/>
+          </a:xfrm>
+          <a:prstGeom prst="rect">
+            <a:avLst/>
+          </a:prstGeom>
+          <a:noFill/>
+          <a:ln w="9525">
+            <a:noFill/>
+            <a:miter lim="800000"/>
+            <a:headEnd/>
+            <a:tailEnd/>
+          </a:ln>
+        </p:spPr>
+        <p:txBody>
+          <a:bodyPr/>
+          <a:lstStyle/>
+          <a:p>
+            <a:pPr lvl="0"/>
+            <a:r>
+              <a:rPr lang="en-US" noProof="0" smtClean="0"/>
+              <a:t>Click to edit Master title style</a:t>
+            </a:r>
+          </a:p>
+        </p:txBody>
+      </p:sp>
+      <p:sp>
+        <p:nvSpPr>
+          <p:cNvPr id="9" name="Slide Number Placeholder 6"/>
+          <p:cNvSpPr>
+            <a:spLocks noGrp="1"/>
+          </p:cNvSpPr>
+          <p:nvPr>
+            <p:ph type="sldNum" sz="quarter" idx="4"/>
+          </p:nvPr>
+        </p:nvSpPr>
+        <p:spPr>
+          <a:xfrm>
+            <a:off x="395536" y="6520259"/>
+            <a:ext cx="360040" cy="221109"/>
+          </a:xfrm>
+          <a:prstGeom prst="rect">
+            <a:avLst/>
+          </a:prstGeom>
+        </p:spPr>
+        <p:txBody>
+          <a:bodyPr vert="horz" lIns="91440" tIns="45720" rIns="91440" bIns="45720" rtlCol="0" anchor="ctr"/>
+          <a:lstStyle>
+            <a:lvl1pPr algn="r">
+              <a:defRPr sz="800" b="1">
+                <a:solidFill>
+                  <a:schemeClr val="accent2"/>
+                </a:solidFill>
+                <a:latin typeface="Arial" charset="0"/>
+              </a:defRPr>
+            </a:lvl1pPr>
+          </a:lstStyle>
+          <a:p>
+            <a:pPr>
+              <a:defRPr/>
+            </a:pPr>
+            <a:fld id="{4AD834FB-D050-4DAD-A587-98ECF1E1D3D9}" type="slidenum">
+              <a:rPr lang="en-US" noProof="0" smtClean="0"/>
+              <a:pPr>
+                <a:defRPr/>
+              </a:pPr>
+              <a:t>‹#›</a:t>
             </a:fld>
             <a:endParaRPr lang="en-US" noProof="0"/>
           </a:p>
@@ -2291,7 +2461,7 @@
               <a:pPr>
                 <a:defRPr/>
               </a:pPr>
-              <a:t>‹Nº›</a:t>
+              <a:t>‹#›</a:t>
             </a:fld>
             <a:endParaRPr lang="en-US" noProof="0"/>
           </a:p>
@@ -2551,7 +2721,7 @@
               <a:pPr>
                 <a:defRPr/>
               </a:pPr>
-              <a:t>‹Nº›</a:t>
+              <a:t>‹#›</a:t>
             </a:fld>
             <a:endParaRPr lang="en-US" noProof="0"/>
           </a:p>
@@ -2812,7 +2982,7 @@
               <a:pPr>
                 <a:defRPr/>
               </a:pPr>
-              <a:t>‹Nº›</a:t>
+              <a:t>‹#›</a:t>
             </a:fld>
             <a:endParaRPr lang="en-US" noProof="0"/>
           </a:p>
@@ -2895,7 +3065,7 @@
               <a:pPr>
                 <a:defRPr/>
               </a:pPr>
-              <a:t>‹Nº›</a:t>
+              <a:t>‹#›</a:t>
             </a:fld>
             <a:endParaRPr lang="en-US" noProof="0"/>
           </a:p>
@@ -3436,7 +3606,7 @@
               <a:pPr>
                 <a:defRPr/>
               </a:pPr>
-              <a:t>‹Nº›</a:t>
+              <a:t>‹#›</a:t>
             </a:fld>
             <a:endParaRPr lang="en-US" noProof="0"/>
           </a:p>
@@ -4460,7 +4630,7 @@
               <a:pPr>
                 <a:defRPr/>
               </a:pPr>
-              <a:t>‹Nº›</a:t>
+              <a:t>‹#›</a:t>
             </a:fld>
             <a:endParaRPr lang="en-US" noProof="0"/>
           </a:p>
@@ -5466,7 +5636,7 @@
               <a:pPr>
                 <a:defRPr/>
               </a:pPr>
-              <a:t>‹Nº›</a:t>
+              <a:t>‹#›</a:t>
             </a:fld>
             <a:endParaRPr lang="en-US" noProof="0"/>
           </a:p>
@@ -6203,7 +6373,7 @@
               <a:pPr>
                 <a:defRPr/>
               </a:pPr>
-              <a:t>‹Nº›</a:t>
+              <a:t>‹#›</a:t>
             </a:fld>
             <a:endParaRPr lang="en-US" noProof="0"/>
           </a:p>
@@ -7092,7 +7262,7 @@
           <a:p>
             <a:fld id="{748BD116-2C56-4960-9148-E30902D398A4}" type="datetimeFigureOut">
               <a:rPr lang="en-US" smtClean="0"/>
-              <a:t>10/14/2015</a:t>
+              <a:t>10/18/2015</a:t>
             </a:fld>
             <a:endParaRPr lang="en-US"/>
           </a:p>
@@ -7150,7 +7320,7 @@
           <a:p>
             <a:fld id="{CC40A78D-6A80-4A8A-BDF0-EC8EB4C8ED3A}" type="slidenum">
               <a:rPr lang="en-US" smtClean="0"/>
-              <a:t>‹Nº›</a:t>
+              <a:t>‹#›</a:t>
             </a:fld>
             <a:endParaRPr lang="en-US"/>
           </a:p>
@@ -7272,7 +7442,7 @@
               <a:pPr>
                 <a:defRPr/>
               </a:pPr>
-              <a:t>‹Nº›</a:t>
+              <a:t>‹#›</a:t>
             </a:fld>
             <a:endParaRPr lang="en-US" noProof="0"/>
           </a:p>
@@ -7639,7 +7809,7 @@
               <a:pPr>
                 <a:defRPr/>
               </a:pPr>
-              <a:t>‹Nº›</a:t>
+              <a:t>‹#›</a:t>
             </a:fld>
             <a:endParaRPr lang="en-US" noProof="0"/>
           </a:p>
@@ -8170,7 +8340,7 @@
               <a:pPr>
                 <a:defRPr/>
               </a:pPr>
-              <a:t>‹Nº›</a:t>
+              <a:t>‹#›</a:t>
             </a:fld>
             <a:endParaRPr lang="en-US" noProof="0"/>
           </a:p>
@@ -8430,7 +8600,7 @@
               <a:pPr>
                 <a:defRPr/>
               </a:pPr>
-              <a:t>‹Nº›</a:t>
+              <a:t>‹#›</a:t>
             </a:fld>
             <a:endParaRPr lang="en-US" noProof="0"/>
           </a:p>
@@ -8691,7 +8861,7 @@
               <a:pPr>
                 <a:defRPr/>
               </a:pPr>
-              <a:t>‹Nº›</a:t>
+              <a:t>‹#›</a:t>
             </a:fld>
             <a:endParaRPr lang="en-US" noProof="0"/>
           </a:p>
@@ -8774,7 +8944,7 @@
               <a:pPr>
                 <a:defRPr/>
               </a:pPr>
-              <a:t>‹Nº›</a:t>
+              <a:t>‹#›</a:t>
             </a:fld>
             <a:endParaRPr lang="en-US" noProof="0"/>
           </a:p>
@@ -9315,7 +9485,7 @@
               <a:pPr>
                 <a:defRPr/>
               </a:pPr>
-              <a:t>‹Nº›</a:t>
+              <a:t>‹#›</a:t>
             </a:fld>
             <a:endParaRPr lang="en-US" noProof="0"/>
           </a:p>
@@ -10733,7 +10903,7 @@
               <a:pPr>
                 <a:defRPr/>
               </a:pPr>
-              <a:t>‹Nº›</a:t>
+              <a:t>‹#›</a:t>
             </a:fld>
             <a:endParaRPr lang="en-US" noProof="0"/>
           </a:p>
@@ -11345,7 +11515,7 @@
               <a:pPr>
                 <a:defRPr/>
               </a:pPr>
-              <a:t>‹Nº›</a:t>
+              <a:t>‹#›</a:t>
             </a:fld>
             <a:endParaRPr lang="en-US" noProof="0"/>
           </a:p>
@@ -12082,7 +12252,7 @@
               <a:pPr>
                 <a:defRPr/>
               </a:pPr>
-              <a:t>‹Nº›</a:t>
+              <a:t>‹#›</a:t>
             </a:fld>
             <a:endParaRPr lang="en-US" noProof="0"/>
           </a:p>
@@ -12971,7 +13141,7 @@
           <a:p>
             <a:fld id="{748BD116-2C56-4960-9148-E30902D398A4}" type="datetimeFigureOut">
               <a:rPr lang="en-US" smtClean="0"/>
-              <a:t>10/14/2015</a:t>
+              <a:t>10/18/2015</a:t>
             </a:fld>
             <a:endParaRPr lang="en-US"/>
           </a:p>
@@ -13029,7 +13199,7 @@
           <a:p>
             <a:fld id="{CC40A78D-6A80-4A8A-BDF0-EC8EB4C8ED3A}" type="slidenum">
               <a:rPr lang="en-US" smtClean="0"/>
-              <a:t>‹Nº›</a:t>
+              <a:t>‹#›</a:t>
             </a:fld>
             <a:endParaRPr lang="en-US"/>
           </a:p>
@@ -15256,7 +15426,7 @@
           <a:p>
             <a:fld id="{748BD116-2C56-4960-9148-E30902D398A4}" type="datetimeFigureOut">
               <a:rPr lang="en-US" smtClean="0"/>
-              <a:t>10/14/2015</a:t>
+              <a:t>10/18/2015</a:t>
             </a:fld>
             <a:endParaRPr lang="en-US"/>
           </a:p>
@@ -15314,7 +15484,7 @@
           <a:p>
             <a:fld id="{CC40A78D-6A80-4A8A-BDF0-EC8EB4C8ED3A}" type="slidenum">
               <a:rPr lang="en-US" smtClean="0"/>
-              <a:t>‹Nº›</a:t>
+              <a:t>‹#›</a:t>
             </a:fld>
             <a:endParaRPr lang="en-US"/>
           </a:p>
@@ -15368,8 +15538,8 @@
     <p:sldLayoutId id="2147483667" r:id="rId7"/>
     <p:sldLayoutId id="2147483668" r:id="rId8"/>
     <p:sldLayoutId id="2147483669" r:id="rId9"/>
-    <p:sldLayoutId id="2147483670" r:id="rId10"/>
-    <p:sldLayoutId id="2147483695" r:id="rId11"/>
+    <p:sldLayoutId id="2147483695" r:id="rId10"/>
+    <p:sldLayoutId id="2147483696" r:id="rId11"/>
   </p:sldLayoutIdLst>
   <p:timing>
     <p:tnLst>
@@ -16077,7 +16247,7 @@
               <a:pPr>
                 <a:defRPr/>
               </a:pPr>
-              <a:t>‹Nº›</a:t>
+              <a:t>‹#›</a:t>
             </a:fld>
             <a:endParaRPr lang="en-US" noProof="0"/>
           </a:p>
@@ -16830,7 +17000,7 @@
               <a:pPr>
                 <a:defRPr/>
               </a:pPr>
-              <a:t>‹Nº›</a:t>
+              <a:t>‹#›</a:t>
             </a:fld>
             <a:endParaRPr lang="en-US" noProof="0"/>
           </a:p>
@@ -17346,7 +17516,7 @@
           <a:p>
             <a:r>
               <a:rPr lang="en-US" dirty="0" smtClean="0"/>
-              <a:t>Academia 2015 </a:t>
+              <a:t>Academy 2015 </a:t>
             </a:r>
             <a:r>
               <a:rPr lang="en-US" dirty="0"/>
@@ -17435,12 +17605,12 @@
       </p:grpSpPr>
       <p:sp>
         <p:nvSpPr>
-          <p:cNvPr id="3" name="Text Placeholder 2"/>
+          <p:cNvPr id="2" name="Title 1"/>
           <p:cNvSpPr>
             <a:spLocks noGrp="1"/>
           </p:cNvSpPr>
           <p:nvPr>
-            <p:ph type="body" sz="quarter" idx="10"/>
+            <p:ph type="title"/>
           </p:nvPr>
         </p:nvSpPr>
         <p:spPr/>
@@ -17449,16 +17619,331 @@
           <a:lstStyle/>
           <a:p>
             <a:r>
-              <a:rPr lang="en-US" dirty="0"/>
-              <a:t>Using jQuery</a:t>
-            </a:r>
+              <a:rPr lang="en-US" dirty="0" smtClean="0"/>
+              <a:t>WSDL</a:t>
+            </a:r>
+            <a:endParaRPr lang="en-US" dirty="0"/>
+          </a:p>
+        </p:txBody>
+      </p:sp>
+      <p:sp>
+        <p:nvSpPr>
+          <p:cNvPr id="15" name="Marcador de contenido 14"/>
+          <p:cNvSpPr>
+            <a:spLocks noGrp="1"/>
+          </p:cNvSpPr>
+          <p:nvPr>
+            <p:ph sz="quarter" idx="10"/>
+          </p:nvPr>
+        </p:nvSpPr>
+        <p:spPr/>
+        <p:txBody>
+          <a:bodyPr/>
+          <a:lstStyle/>
+          <a:p>
+            <a:endParaRPr lang="es-MX" dirty="0"/>
+          </a:p>
+          <a:p>
+            <a:endParaRPr lang="en-US" dirty="0"/>
+          </a:p>
+        </p:txBody>
+      </p:sp>
+      <p:sp>
+        <p:nvSpPr>
+          <p:cNvPr id="4" name="Marcador de contenido 14"/>
+          <p:cNvSpPr txBox="1">
+            <a:spLocks/>
+          </p:cNvSpPr>
+          <p:nvPr/>
+        </p:nvSpPr>
+        <p:spPr bwMode="auto">
+          <a:xfrm>
+            <a:off x="614627" y="1492189"/>
+            <a:ext cx="8208912" cy="4965019"/>
+          </a:xfrm>
+          <a:prstGeom prst="rect">
+            <a:avLst/>
+          </a:prstGeom>
+          <a:noFill/>
+          <a:ln>
+            <a:noFill/>
+          </a:ln>
+          <a:extLst>
+            <a:ext uri="{909E8E84-426E-40DD-AFC4-6F175D3DCCD1}">
+              <a14:hiddenFill xmlns:a14="http://schemas.microsoft.com/office/drawing/2010/main">
+                <a:solidFill>
+                  <a:srgbClr val="FFFFFF"/>
+                </a:solidFill>
+              </a14:hiddenFill>
+            </a:ext>
+            <a:ext uri="{91240B29-F687-4F45-9708-019B960494DF}">
+              <a14:hiddenLine xmlns:a14="http://schemas.microsoft.com/office/drawing/2010/main" w="9525">
+                <a:solidFill>
+                  <a:srgbClr val="000000"/>
+                </a:solidFill>
+                <a:miter lim="800000"/>
+                <a:headEnd/>
+                <a:tailEnd/>
+              </a14:hiddenLine>
+            </a:ext>
+          </a:extLst>
+        </p:spPr>
+        <p:txBody>
+          <a:bodyPr vert="horz" wrap="square" lIns="91440" tIns="45720" rIns="91440" bIns="45720" numCol="1" anchor="t" anchorCtr="0" compatLnSpc="1">
+            <a:prstTxWarp prst="textNoShape">
+              <a:avLst/>
+            </a:prstTxWarp>
+          </a:bodyPr>
+          <a:lstStyle>
+            <a:lvl1pPr marL="126000" marR="0" indent="-180000" algn="l" defTabSz="914400" rtl="0" eaLnBrk="0" fontAlgn="base" latinLnBrk="0" hangingPunct="0">
+              <a:lnSpc>
+                <a:spcPct val="100000"/>
+              </a:lnSpc>
+              <a:spcBef>
+                <a:spcPct val="20000"/>
+              </a:spcBef>
+              <a:spcAft>
+                <a:spcPct val="0"/>
+              </a:spcAft>
+              <a:buClrTx/>
+              <a:buSzTx/>
+              <a:buFont typeface="Arial Rounded MT Bold" pitchFamily="34" charset="0"/>
+              <a:buChar char="›"/>
+              <a:tabLst/>
+              <a:defRPr kern="1200">
+                <a:solidFill>
+                  <a:schemeClr val="tx1">
+                    <a:lumMod val="75000"/>
+                    <a:lumOff val="25000"/>
+                  </a:schemeClr>
+                </a:solidFill>
+                <a:latin typeface="Arial"/>
+                <a:ea typeface="+mn-ea"/>
+                <a:cs typeface="Arial"/>
+              </a:defRPr>
+            </a:lvl1pPr>
+            <a:lvl2pPr marL="540000" marR="0" indent="-180000" algn="l" defTabSz="914400" rtl="0" eaLnBrk="0" fontAlgn="base" latinLnBrk="0" hangingPunct="0">
+              <a:lnSpc>
+                <a:spcPct val="100000"/>
+              </a:lnSpc>
+              <a:spcBef>
+                <a:spcPct val="20000"/>
+              </a:spcBef>
+              <a:spcAft>
+                <a:spcPct val="0"/>
+              </a:spcAft>
+              <a:buClrTx/>
+              <a:buSzTx/>
+              <a:buFont typeface="Arial Rounded MT Bold" pitchFamily="34" charset="0"/>
+              <a:buChar char="›"/>
+              <a:tabLst/>
+              <a:defRPr sz="1600" kern="1200">
+                <a:solidFill>
+                  <a:schemeClr val="tx1">
+                    <a:lumMod val="75000"/>
+                    <a:lumOff val="25000"/>
+                  </a:schemeClr>
+                </a:solidFill>
+                <a:latin typeface="Arial"/>
+                <a:ea typeface="+mn-ea"/>
+                <a:cs typeface="Arial"/>
+              </a:defRPr>
+            </a:lvl2pPr>
+            <a:lvl3pPr marL="715963" marR="0" indent="-180000" algn="l" defTabSz="914400" rtl="0" eaLnBrk="0" fontAlgn="base" latinLnBrk="0" hangingPunct="0">
+              <a:lnSpc>
+                <a:spcPct val="100000"/>
+              </a:lnSpc>
+              <a:spcBef>
+                <a:spcPct val="20000"/>
+              </a:spcBef>
+              <a:spcAft>
+                <a:spcPct val="0"/>
+              </a:spcAft>
+              <a:buClrTx/>
+              <a:buSzTx/>
+              <a:buFont typeface="Arial Rounded MT Bold" pitchFamily="34" charset="0"/>
+              <a:buChar char="›"/>
+              <a:tabLst/>
+              <a:defRPr sz="1400" kern="1200">
+                <a:solidFill>
+                  <a:schemeClr val="tx1">
+                    <a:lumMod val="75000"/>
+                    <a:lumOff val="25000"/>
+                  </a:schemeClr>
+                </a:solidFill>
+                <a:latin typeface="Arial"/>
+                <a:ea typeface="+mn-ea"/>
+                <a:cs typeface="Arial"/>
+              </a:defRPr>
+            </a:lvl3pPr>
+            <a:lvl4pPr marL="923925" marR="0" indent="-180000" algn="l" defTabSz="914400" rtl="0" eaLnBrk="0" fontAlgn="base" latinLnBrk="0" hangingPunct="0">
+              <a:lnSpc>
+                <a:spcPct val="100000"/>
+              </a:lnSpc>
+              <a:spcBef>
+                <a:spcPct val="20000"/>
+              </a:spcBef>
+              <a:spcAft>
+                <a:spcPct val="0"/>
+              </a:spcAft>
+              <a:buClrTx/>
+              <a:buSzTx/>
+              <a:buFont typeface="Arial Rounded MT Bold" pitchFamily="34" charset="0"/>
+              <a:buChar char="›"/>
+              <a:tabLst/>
+              <a:defRPr sz="1200" kern="1200">
+                <a:solidFill>
+                  <a:schemeClr val="tx1">
+                    <a:lumMod val="75000"/>
+                    <a:lumOff val="25000"/>
+                  </a:schemeClr>
+                </a:solidFill>
+                <a:latin typeface="Arial"/>
+                <a:ea typeface="+mn-ea"/>
+                <a:cs typeface="Arial"/>
+              </a:defRPr>
+            </a:lvl4pPr>
+            <a:lvl5pPr marL="1079500" indent="-77788" algn="l" rtl="0" eaLnBrk="1" fontAlgn="base" hangingPunct="1">
+              <a:spcBef>
+                <a:spcPct val="20000"/>
+              </a:spcBef>
+              <a:spcAft>
+                <a:spcPct val="0"/>
+              </a:spcAft>
+              <a:buFont typeface="Arial Rounded MT Bold" pitchFamily="34" charset="0"/>
+              <a:buChar char="›"/>
+              <a:defRPr sz="1100" kern="1200">
+                <a:solidFill>
+                  <a:schemeClr val="tx1"/>
+                </a:solidFill>
+                <a:latin typeface="Arial" pitchFamily="34" charset="0"/>
+                <a:ea typeface="+mn-ea"/>
+                <a:cs typeface="Arial" pitchFamily="34" charset="0"/>
+              </a:defRPr>
+            </a:lvl5pPr>
+            <a:lvl6pPr marL="2514600" indent="-228600" algn="l" defTabSz="914400" rtl="0" eaLnBrk="1" latinLnBrk="0" hangingPunct="1">
+              <a:spcBef>
+                <a:spcPct val="20000"/>
+              </a:spcBef>
+              <a:buFont typeface="Arial" pitchFamily="34" charset="0"/>
+              <a:buChar char="•"/>
+              <a:defRPr sz="2000" kern="1200">
+                <a:solidFill>
+                  <a:schemeClr val="tx1"/>
+                </a:solidFill>
+                <a:latin typeface="+mn-lt"/>
+                <a:ea typeface="+mn-ea"/>
+                <a:cs typeface="+mn-cs"/>
+              </a:defRPr>
+            </a:lvl6pPr>
+            <a:lvl7pPr marL="2971800" indent="-228600" algn="l" defTabSz="914400" rtl="0" eaLnBrk="1" latinLnBrk="0" hangingPunct="1">
+              <a:spcBef>
+                <a:spcPct val="20000"/>
+              </a:spcBef>
+              <a:buFont typeface="Arial" pitchFamily="34" charset="0"/>
+              <a:buChar char="•"/>
+              <a:defRPr sz="2000" kern="1200">
+                <a:solidFill>
+                  <a:schemeClr val="tx1"/>
+                </a:solidFill>
+                <a:latin typeface="+mn-lt"/>
+                <a:ea typeface="+mn-ea"/>
+                <a:cs typeface="+mn-cs"/>
+              </a:defRPr>
+            </a:lvl7pPr>
+            <a:lvl8pPr marL="3429000" indent="-228600" algn="l" defTabSz="914400" rtl="0" eaLnBrk="1" latinLnBrk="0" hangingPunct="1">
+              <a:spcBef>
+                <a:spcPct val="20000"/>
+              </a:spcBef>
+              <a:buFont typeface="Arial" pitchFamily="34" charset="0"/>
+              <a:buChar char="•"/>
+              <a:defRPr sz="2000" kern="1200">
+                <a:solidFill>
+                  <a:schemeClr val="tx1"/>
+                </a:solidFill>
+                <a:latin typeface="+mn-lt"/>
+                <a:ea typeface="+mn-ea"/>
+                <a:cs typeface="+mn-cs"/>
+              </a:defRPr>
+            </a:lvl8pPr>
+            <a:lvl9pPr marL="3886200" indent="-228600" algn="l" defTabSz="914400" rtl="0" eaLnBrk="1" latinLnBrk="0" hangingPunct="1">
+              <a:spcBef>
+                <a:spcPct val="20000"/>
+              </a:spcBef>
+              <a:buFont typeface="Arial" pitchFamily="34" charset="0"/>
+              <a:buChar char="•"/>
+              <a:defRPr sz="2000" kern="1200">
+                <a:solidFill>
+                  <a:schemeClr val="tx1"/>
+                </a:solidFill>
+                <a:latin typeface="+mn-lt"/>
+                <a:ea typeface="+mn-ea"/>
+                <a:cs typeface="+mn-cs"/>
+              </a:defRPr>
+            </a:lvl9pPr>
+          </a:lstStyle>
+          <a:p>
+            <a:pPr marL="285750" indent="-285750"/>
+            <a:r>
+              <a:rPr lang="en-US" dirty="0" smtClean="0"/>
+              <a:t>Web Service Description Language.</a:t>
+            </a:r>
+          </a:p>
+          <a:p>
+            <a:pPr marL="285750" indent="-285750"/>
+            <a:endParaRPr lang="en-US" dirty="0" smtClean="0"/>
+          </a:p>
+          <a:p>
+            <a:pPr marL="285750" indent="-285750"/>
+            <a:r>
+              <a:rPr lang="en-US" dirty="0" smtClean="0"/>
+              <a:t>Lists all operations available in the service as well as all required parameters.</a:t>
+            </a:r>
+          </a:p>
+          <a:p>
+            <a:pPr marL="285750" indent="-285750"/>
+            <a:endParaRPr lang="en-US" dirty="0"/>
+          </a:p>
+          <a:p>
+            <a:pPr marL="285750" indent="-285750"/>
+            <a:r>
+              <a:rPr lang="en-US" dirty="0" smtClean="0"/>
+              <a:t>Is a </a:t>
+            </a:r>
+            <a:r>
+              <a:rPr lang="en-US" b="1" i="1" dirty="0" smtClean="0"/>
+              <a:t>contract</a:t>
+            </a:r>
+            <a:r>
+              <a:rPr lang="en-US" dirty="0" smtClean="0"/>
+              <a:t> for clients defined inside an XML file.</a:t>
+            </a:r>
+          </a:p>
+          <a:p>
+            <a:pPr marL="0" indent="0">
+              <a:buNone/>
+            </a:pPr>
+            <a:endParaRPr lang="en-US" dirty="0" smtClean="0"/>
+          </a:p>
+          <a:p>
+            <a:pPr marL="285750" indent="-285750"/>
+            <a:endParaRPr lang="es-MX" dirty="0"/>
+          </a:p>
+          <a:p>
+            <a:endParaRPr lang="es-MX" dirty="0" smtClean="0"/>
+          </a:p>
+          <a:p>
+            <a:endParaRPr lang="es-MX" dirty="0" smtClean="0"/>
+          </a:p>
+          <a:p>
+            <a:endParaRPr lang="en-US" dirty="0"/>
           </a:p>
         </p:txBody>
       </p:sp>
     </p:spTree>
     <p:extLst>
       <p:ext uri="{BB962C8B-B14F-4D97-AF65-F5344CB8AC3E}">
-        <p14:creationId xmlns:p14="http://schemas.microsoft.com/office/powerpoint/2010/main" val="2913985037"/>
+        <p14:creationId xmlns:p14="http://schemas.microsoft.com/office/powerpoint/2010/main" val="2996041716"/>
       </p:ext>
     </p:extLst>
   </p:cSld>
@@ -17508,39 +17993,375 @@
           <a:lstStyle/>
           <a:p>
             <a:r>
-              <a:rPr lang="en-US" sz="3200" dirty="0"/>
-              <a:t>Level</a:t>
-            </a:r>
+              <a:rPr lang="en-US" dirty="0" smtClean="0"/>
+              <a:t>XSD</a:t>
+            </a:r>
+            <a:endParaRPr lang="en-US" dirty="0"/>
+          </a:p>
+        </p:txBody>
+      </p:sp>
+      <p:sp>
+        <p:nvSpPr>
+          <p:cNvPr id="15" name="Marcador de contenido 14"/>
+          <p:cNvSpPr>
+            <a:spLocks noGrp="1"/>
+          </p:cNvSpPr>
+          <p:nvPr>
+            <p:ph sz="quarter" idx="10"/>
+          </p:nvPr>
+        </p:nvSpPr>
+        <p:spPr/>
+        <p:txBody>
+          <a:bodyPr/>
+          <a:lstStyle/>
+          <a:p>
+            <a:endParaRPr lang="es-MX" dirty="0"/>
+          </a:p>
+          <a:p>
+            <a:endParaRPr lang="en-US" dirty="0"/>
+          </a:p>
+        </p:txBody>
+      </p:sp>
+      <p:sp>
+        <p:nvSpPr>
+          <p:cNvPr id="4" name="Marcador de contenido 14"/>
+          <p:cNvSpPr txBox="1">
+            <a:spLocks/>
+          </p:cNvSpPr>
+          <p:nvPr/>
+        </p:nvSpPr>
+        <p:spPr bwMode="auto">
+          <a:xfrm>
+            <a:off x="614627" y="1492189"/>
+            <a:ext cx="8208912" cy="4965019"/>
+          </a:xfrm>
+          <a:prstGeom prst="rect">
+            <a:avLst/>
+          </a:prstGeom>
+          <a:noFill/>
+          <a:ln>
+            <a:noFill/>
+          </a:ln>
+          <a:extLst>
+            <a:ext uri="{909E8E84-426E-40DD-AFC4-6F175D3DCCD1}">
+              <a14:hiddenFill xmlns:a14="http://schemas.microsoft.com/office/drawing/2010/main">
+                <a:solidFill>
+                  <a:srgbClr val="FFFFFF"/>
+                </a:solidFill>
+              </a14:hiddenFill>
+            </a:ext>
+            <a:ext uri="{91240B29-F687-4F45-9708-019B960494DF}">
+              <a14:hiddenLine xmlns:a14="http://schemas.microsoft.com/office/drawing/2010/main" w="9525">
+                <a:solidFill>
+                  <a:srgbClr val="000000"/>
+                </a:solidFill>
+                <a:miter lim="800000"/>
+                <a:headEnd/>
+                <a:tailEnd/>
+              </a14:hiddenLine>
+            </a:ext>
+          </a:extLst>
+        </p:spPr>
+        <p:txBody>
+          <a:bodyPr vert="horz" wrap="square" lIns="91440" tIns="45720" rIns="91440" bIns="45720" numCol="1" anchor="t" anchorCtr="0" compatLnSpc="1">
+            <a:prstTxWarp prst="textNoShape">
+              <a:avLst/>
+            </a:prstTxWarp>
+          </a:bodyPr>
+          <a:lstStyle>
+            <a:lvl1pPr marL="126000" marR="0" indent="-180000" algn="l" defTabSz="914400" rtl="0" eaLnBrk="0" fontAlgn="base" latinLnBrk="0" hangingPunct="0">
+              <a:lnSpc>
+                <a:spcPct val="100000"/>
+              </a:lnSpc>
+              <a:spcBef>
+                <a:spcPct val="20000"/>
+              </a:spcBef>
+              <a:spcAft>
+                <a:spcPct val="0"/>
+              </a:spcAft>
+              <a:buClrTx/>
+              <a:buSzTx/>
+              <a:buFont typeface="Arial Rounded MT Bold" pitchFamily="34" charset="0"/>
+              <a:buChar char="›"/>
+              <a:tabLst/>
+              <a:defRPr kern="1200">
+                <a:solidFill>
+                  <a:schemeClr val="tx1">
+                    <a:lumMod val="75000"/>
+                    <a:lumOff val="25000"/>
+                  </a:schemeClr>
+                </a:solidFill>
+                <a:latin typeface="Arial"/>
+                <a:ea typeface="+mn-ea"/>
+                <a:cs typeface="Arial"/>
+              </a:defRPr>
+            </a:lvl1pPr>
+            <a:lvl2pPr marL="540000" marR="0" indent="-180000" algn="l" defTabSz="914400" rtl="0" eaLnBrk="0" fontAlgn="base" latinLnBrk="0" hangingPunct="0">
+              <a:lnSpc>
+                <a:spcPct val="100000"/>
+              </a:lnSpc>
+              <a:spcBef>
+                <a:spcPct val="20000"/>
+              </a:spcBef>
+              <a:spcAft>
+                <a:spcPct val="0"/>
+              </a:spcAft>
+              <a:buClrTx/>
+              <a:buSzTx/>
+              <a:buFont typeface="Arial Rounded MT Bold" pitchFamily="34" charset="0"/>
+              <a:buChar char="›"/>
+              <a:tabLst/>
+              <a:defRPr sz="1600" kern="1200">
+                <a:solidFill>
+                  <a:schemeClr val="tx1">
+                    <a:lumMod val="75000"/>
+                    <a:lumOff val="25000"/>
+                  </a:schemeClr>
+                </a:solidFill>
+                <a:latin typeface="Arial"/>
+                <a:ea typeface="+mn-ea"/>
+                <a:cs typeface="Arial"/>
+              </a:defRPr>
+            </a:lvl2pPr>
+            <a:lvl3pPr marL="715963" marR="0" indent="-180000" algn="l" defTabSz="914400" rtl="0" eaLnBrk="0" fontAlgn="base" latinLnBrk="0" hangingPunct="0">
+              <a:lnSpc>
+                <a:spcPct val="100000"/>
+              </a:lnSpc>
+              <a:spcBef>
+                <a:spcPct val="20000"/>
+              </a:spcBef>
+              <a:spcAft>
+                <a:spcPct val="0"/>
+              </a:spcAft>
+              <a:buClrTx/>
+              <a:buSzTx/>
+              <a:buFont typeface="Arial Rounded MT Bold" pitchFamily="34" charset="0"/>
+              <a:buChar char="›"/>
+              <a:tabLst/>
+              <a:defRPr sz="1400" kern="1200">
+                <a:solidFill>
+                  <a:schemeClr val="tx1">
+                    <a:lumMod val="75000"/>
+                    <a:lumOff val="25000"/>
+                  </a:schemeClr>
+                </a:solidFill>
+                <a:latin typeface="Arial"/>
+                <a:ea typeface="+mn-ea"/>
+                <a:cs typeface="Arial"/>
+              </a:defRPr>
+            </a:lvl3pPr>
+            <a:lvl4pPr marL="923925" marR="0" indent="-180000" algn="l" defTabSz="914400" rtl="0" eaLnBrk="0" fontAlgn="base" latinLnBrk="0" hangingPunct="0">
+              <a:lnSpc>
+                <a:spcPct val="100000"/>
+              </a:lnSpc>
+              <a:spcBef>
+                <a:spcPct val="20000"/>
+              </a:spcBef>
+              <a:spcAft>
+                <a:spcPct val="0"/>
+              </a:spcAft>
+              <a:buClrTx/>
+              <a:buSzTx/>
+              <a:buFont typeface="Arial Rounded MT Bold" pitchFamily="34" charset="0"/>
+              <a:buChar char="›"/>
+              <a:tabLst/>
+              <a:defRPr sz="1200" kern="1200">
+                <a:solidFill>
+                  <a:schemeClr val="tx1">
+                    <a:lumMod val="75000"/>
+                    <a:lumOff val="25000"/>
+                  </a:schemeClr>
+                </a:solidFill>
+                <a:latin typeface="Arial"/>
+                <a:ea typeface="+mn-ea"/>
+                <a:cs typeface="Arial"/>
+              </a:defRPr>
+            </a:lvl4pPr>
+            <a:lvl5pPr marL="1079500" indent="-77788" algn="l" rtl="0" eaLnBrk="1" fontAlgn="base" hangingPunct="1">
+              <a:spcBef>
+                <a:spcPct val="20000"/>
+              </a:spcBef>
+              <a:spcAft>
+                <a:spcPct val="0"/>
+              </a:spcAft>
+              <a:buFont typeface="Arial Rounded MT Bold" pitchFamily="34" charset="0"/>
+              <a:buChar char="›"/>
+              <a:defRPr sz="1100" kern="1200">
+                <a:solidFill>
+                  <a:schemeClr val="tx1"/>
+                </a:solidFill>
+                <a:latin typeface="Arial" pitchFamily="34" charset="0"/>
+                <a:ea typeface="+mn-ea"/>
+                <a:cs typeface="Arial" pitchFamily="34" charset="0"/>
+              </a:defRPr>
+            </a:lvl5pPr>
+            <a:lvl6pPr marL="2514600" indent="-228600" algn="l" defTabSz="914400" rtl="0" eaLnBrk="1" latinLnBrk="0" hangingPunct="1">
+              <a:spcBef>
+                <a:spcPct val="20000"/>
+              </a:spcBef>
+              <a:buFont typeface="Arial" pitchFamily="34" charset="0"/>
+              <a:buChar char="•"/>
+              <a:defRPr sz="2000" kern="1200">
+                <a:solidFill>
+                  <a:schemeClr val="tx1"/>
+                </a:solidFill>
+                <a:latin typeface="+mn-lt"/>
+                <a:ea typeface="+mn-ea"/>
+                <a:cs typeface="+mn-cs"/>
+              </a:defRPr>
+            </a:lvl6pPr>
+            <a:lvl7pPr marL="2971800" indent="-228600" algn="l" defTabSz="914400" rtl="0" eaLnBrk="1" latinLnBrk="0" hangingPunct="1">
+              <a:spcBef>
+                <a:spcPct val="20000"/>
+              </a:spcBef>
+              <a:buFont typeface="Arial" pitchFamily="34" charset="0"/>
+              <a:buChar char="•"/>
+              <a:defRPr sz="2000" kern="1200">
+                <a:solidFill>
+                  <a:schemeClr val="tx1"/>
+                </a:solidFill>
+                <a:latin typeface="+mn-lt"/>
+                <a:ea typeface="+mn-ea"/>
+                <a:cs typeface="+mn-cs"/>
+              </a:defRPr>
+            </a:lvl7pPr>
+            <a:lvl8pPr marL="3429000" indent="-228600" algn="l" defTabSz="914400" rtl="0" eaLnBrk="1" latinLnBrk="0" hangingPunct="1">
+              <a:spcBef>
+                <a:spcPct val="20000"/>
+              </a:spcBef>
+              <a:buFont typeface="Arial" pitchFamily="34" charset="0"/>
+              <a:buChar char="•"/>
+              <a:defRPr sz="2000" kern="1200">
+                <a:solidFill>
+                  <a:schemeClr val="tx1"/>
+                </a:solidFill>
+                <a:latin typeface="+mn-lt"/>
+                <a:ea typeface="+mn-ea"/>
+                <a:cs typeface="+mn-cs"/>
+              </a:defRPr>
+            </a:lvl8pPr>
+            <a:lvl9pPr marL="3886200" indent="-228600" algn="l" defTabSz="914400" rtl="0" eaLnBrk="1" latinLnBrk="0" hangingPunct="1">
+              <a:spcBef>
+                <a:spcPct val="20000"/>
+              </a:spcBef>
+              <a:buFont typeface="Arial" pitchFamily="34" charset="0"/>
+              <a:buChar char="•"/>
+              <a:defRPr sz="2000" kern="1200">
+                <a:solidFill>
+                  <a:schemeClr val="tx1"/>
+                </a:solidFill>
+                <a:latin typeface="+mn-lt"/>
+                <a:ea typeface="+mn-ea"/>
+                <a:cs typeface="+mn-cs"/>
+              </a:defRPr>
+            </a:lvl9pPr>
+          </a:lstStyle>
+          <a:p>
+            <a:pPr marL="285750" indent="-285750"/>
+            <a:r>
+              <a:rPr lang="en-US" dirty="0" smtClean="0"/>
+              <a:t>XML Schema Definition.</a:t>
+            </a:r>
+          </a:p>
+          <a:p>
+            <a:pPr marL="285750" indent="-285750"/>
+            <a:endParaRPr lang="en-US" dirty="0" smtClean="0"/>
+          </a:p>
+          <a:p>
+            <a:pPr marL="285750" indent="-285750"/>
             <a:r>
               <a:rPr lang="en-US" dirty="0"/>
-              <a:t> </a:t>
-            </a:r>
-            <a:r>
-              <a:rPr lang="en-US" sz="9600" dirty="0"/>
-              <a:t>2</a:t>
-            </a:r>
-            <a:br>
-              <a:rPr lang="en-US" sz="9600" dirty="0"/>
-            </a:br>
-            <a:r>
-              <a:rPr lang="en-US" b="1" dirty="0"/>
-              <a:t>Searching the DOM</a:t>
+              <a:t>D</a:t>
+            </a:r>
+            <a:r>
+              <a:rPr lang="en-US" dirty="0" smtClean="0"/>
+              <a:t>escribes </a:t>
             </a:r>
             <a:r>
               <a:rPr lang="en-US" dirty="0"/>
-              <a:t/>
-            </a:r>
-            <a:br>
+              <a:t>the structure of an XML </a:t>
+            </a:r>
+            <a:r>
+              <a:rPr lang="en-US" dirty="0" smtClean="0"/>
+              <a:t>document.</a:t>
+            </a:r>
+          </a:p>
+          <a:p>
+            <a:pPr marL="285750" indent="-285750"/>
+            <a:endParaRPr lang="en-US" dirty="0"/>
+          </a:p>
+          <a:p>
+            <a:pPr marL="285750" indent="-285750"/>
+            <a:r>
               <a:rPr lang="en-US" dirty="0"/>
-            </a:br>
+              <a:t>D</a:t>
+            </a:r>
+            <a:r>
+              <a:rPr lang="en-US" dirty="0" smtClean="0"/>
+              <a:t>efine </a:t>
+            </a:r>
+            <a:r>
+              <a:rPr lang="en-US" dirty="0"/>
+              <a:t>the legal building blocks of an XML </a:t>
+            </a:r>
+            <a:r>
+              <a:rPr lang="en-US" dirty="0" smtClean="0"/>
+              <a:t>document.</a:t>
+            </a:r>
+          </a:p>
+          <a:p>
+            <a:pPr marL="285750" indent="-285750"/>
             <a:endParaRPr lang="en-US" dirty="0"/>
           </a:p>
-        </p:txBody>
-      </p:sp>
+          <a:p>
+            <a:pPr marL="0" indent="0">
+              <a:buNone/>
+            </a:pPr>
+            <a:endParaRPr lang="en-US" dirty="0" smtClean="0"/>
+          </a:p>
+          <a:p>
+            <a:pPr marL="285750" indent="-285750"/>
+            <a:endParaRPr lang="es-MX" dirty="0"/>
+          </a:p>
+          <a:p>
+            <a:endParaRPr lang="es-MX" dirty="0" smtClean="0"/>
+          </a:p>
+          <a:p>
+            <a:endParaRPr lang="es-MX" dirty="0" smtClean="0"/>
+          </a:p>
+          <a:p>
+            <a:endParaRPr lang="en-US" dirty="0"/>
+          </a:p>
+        </p:txBody>
+      </p:sp>
+      <p:pic>
+        <p:nvPicPr>
+          <p:cNvPr id="3" name="Picture 2"/>
+          <p:cNvPicPr>
+            <a:picLocks noChangeAspect="1"/>
+          </p:cNvPicPr>
+          <p:nvPr/>
+        </p:nvPicPr>
+        <p:blipFill>
+          <a:blip r:embed="rId2"/>
+          <a:stretch>
+            <a:fillRect/>
+          </a:stretch>
+        </p:blipFill>
+        <p:spPr>
+          <a:xfrm>
+            <a:off x="1981200" y="3278291"/>
+            <a:ext cx="3863761" cy="3102717"/>
+          </a:xfrm>
+          <a:prstGeom prst="rect">
+            <a:avLst/>
+          </a:prstGeom>
+        </p:spPr>
+      </p:pic>
     </p:spTree>
     <p:extLst>
       <p:ext uri="{BB962C8B-B14F-4D97-AF65-F5344CB8AC3E}">
-        <p14:creationId xmlns:p14="http://schemas.microsoft.com/office/powerpoint/2010/main" val="789858778"/>
+        <p14:creationId xmlns:p14="http://schemas.microsoft.com/office/powerpoint/2010/main" val="989904660"/>
       </p:ext>
     </p:extLst>
   </p:cSld>
@@ -17576,12 +18397,12 @@
       </p:grpSpPr>
       <p:sp>
         <p:nvSpPr>
-          <p:cNvPr id="2" name="Text Placeholder 1"/>
+          <p:cNvPr id="2" name="Title 1"/>
           <p:cNvSpPr>
             <a:spLocks noGrp="1"/>
           </p:cNvSpPr>
           <p:nvPr>
-            <p:ph type="body" sz="quarter" idx="10"/>
+            <p:ph type="title"/>
           </p:nvPr>
         </p:nvSpPr>
         <p:spPr/>
@@ -17590,16 +18411,63 @@
           <a:lstStyle/>
           <a:p>
             <a:r>
-              <a:rPr lang="en-US" dirty="0"/>
-              <a:t>Traversing</a:t>
-            </a:r>
-          </a:p>
-        </p:txBody>
-      </p:sp>
+              <a:rPr lang="en-US" dirty="0" smtClean="0"/>
+              <a:t>Architecture</a:t>
+            </a:r>
+            <a:endParaRPr lang="en-US" dirty="0"/>
+          </a:p>
+        </p:txBody>
+      </p:sp>
+      <p:sp>
+        <p:nvSpPr>
+          <p:cNvPr id="15" name="Marcador de contenido 14"/>
+          <p:cNvSpPr>
+            <a:spLocks noGrp="1"/>
+          </p:cNvSpPr>
+          <p:nvPr>
+            <p:ph sz="quarter" idx="10"/>
+          </p:nvPr>
+        </p:nvSpPr>
+        <p:spPr/>
+        <p:txBody>
+          <a:bodyPr/>
+          <a:lstStyle/>
+          <a:p>
+            <a:endParaRPr lang="es-MX" dirty="0"/>
+          </a:p>
+          <a:p>
+            <a:endParaRPr lang="en-US" dirty="0"/>
+          </a:p>
+        </p:txBody>
+      </p:sp>
+      <p:pic>
+        <p:nvPicPr>
+          <p:cNvPr id="3" name="Imagen 2"/>
+          <p:cNvPicPr>
+            <a:picLocks noChangeAspect="1"/>
+          </p:cNvPicPr>
+          <p:nvPr/>
+        </p:nvPicPr>
+        <p:blipFill>
+          <a:blip r:embed="rId2"/>
+          <a:stretch>
+            <a:fillRect/>
+          </a:stretch>
+        </p:blipFill>
+        <p:spPr>
+          <a:xfrm>
+            <a:off x="604283" y="1828800"/>
+            <a:ext cx="7924800" cy="3589468"/>
+          </a:xfrm>
+          <a:prstGeom prst="rect">
+            <a:avLst/>
+          </a:prstGeom>
+        </p:spPr>
+      </p:pic>
     </p:spTree>
     <p:extLst>
       <p:ext uri="{BB962C8B-B14F-4D97-AF65-F5344CB8AC3E}">
-        <p14:creationId xmlns:p14="http://schemas.microsoft.com/office/powerpoint/2010/main" val="1119299537"/>
+        <p14:creationId xmlns:p14="http://schemas.microsoft.com/office/powerpoint/2010/main" val="1064482346"/>
       </p:ext>
     </p:extLst>
   </p:cSld>
@@ -17649,23 +18517,19 @@
           <a:lstStyle/>
           <a:p>
             <a:r>
-              <a:rPr lang="en-US" sz="3200" dirty="0" smtClean="0"/>
-              <a:t>Level</a:t>
-            </a:r>
-            <a:r>
-              <a:rPr lang="en-US" dirty="0" smtClean="0"/>
-              <a:t> </a:t>
-            </a:r>
-            <a:r>
               <a:rPr lang="en-US" sz="9600" dirty="0" smtClean="0"/>
               <a:t>3</a:t>
             </a:r>
+            <a:r>
+              <a:rPr lang="en-US" sz="9600" dirty="0"/>
+              <a:t/>
+            </a:r>
             <a:br>
-              <a:rPr lang="en-US" sz="9600" dirty="0" smtClean="0"/>
+              <a:rPr lang="en-US" sz="9600" dirty="0"/>
             </a:br>
             <a:r>
-              <a:rPr lang="en-US" b="1" dirty="0"/>
-              <a:t>Working with the DOM</a:t>
+              <a:rPr lang="en-US" b="1" dirty="0" smtClean="0"/>
+              <a:t>Spring Web Service</a:t>
             </a:r>
             <a:r>
               <a:rPr lang="en-US" dirty="0"/>
@@ -17681,7 +18545,7 @@
     </p:spTree>
     <p:extLst>
       <p:ext uri="{BB962C8B-B14F-4D97-AF65-F5344CB8AC3E}">
-        <p14:creationId xmlns:p14="http://schemas.microsoft.com/office/powerpoint/2010/main" val="1407692737"/>
+        <p14:creationId xmlns:p14="http://schemas.microsoft.com/office/powerpoint/2010/main" val="789858778"/>
       </p:ext>
     </p:extLst>
   </p:cSld>
@@ -17701,6 +18565,11 @@
 <file path=ppt/slides/slide14.xml><?xml version="1.0" encoding="utf-8"?>
 <p:sld xmlns:a="http://schemas.openxmlformats.org/drawingml/2006/main" xmlns:r="http://schemas.openxmlformats.org/officeDocument/2006/relationships" xmlns:p="http://schemas.openxmlformats.org/presentationml/2006/main">
   <p:cSld>
+    <p:bg>
+      <p:bgRef idx="1001">
+        <a:schemeClr val="bg1"/>
+      </p:bgRef>
+    </p:bg>
     <p:spTree>
       <p:nvGrpSpPr>
         <p:cNvPr id="1" name=""/>
@@ -17717,12 +18586,12 @@
       </p:grpSpPr>
       <p:sp>
         <p:nvSpPr>
-          <p:cNvPr id="3" name="Text Placeholder 2"/>
+          <p:cNvPr id="15" name="Marcador de contenido 14"/>
           <p:cNvSpPr>
             <a:spLocks noGrp="1"/>
           </p:cNvSpPr>
           <p:nvPr>
-            <p:ph type="body" sz="quarter" idx="10"/>
+            <p:ph sz="quarter" idx="10"/>
           </p:nvPr>
         </p:nvSpPr>
         <p:spPr/>
@@ -17730,22 +18599,359 @@
           <a:bodyPr/>
           <a:lstStyle/>
           <a:p>
+            <a:endParaRPr lang="es-MX" dirty="0"/>
+          </a:p>
+          <a:p>
+            <a:endParaRPr lang="en-US" dirty="0"/>
+          </a:p>
+        </p:txBody>
+      </p:sp>
+      <p:sp>
+        <p:nvSpPr>
+          <p:cNvPr id="2" name="Title 1"/>
+          <p:cNvSpPr>
+            <a:spLocks noGrp="1"/>
+          </p:cNvSpPr>
+          <p:nvPr>
+            <p:ph type="title"/>
+          </p:nvPr>
+        </p:nvSpPr>
+        <p:spPr/>
+        <p:txBody>
+          <a:bodyPr/>
+          <a:lstStyle/>
+          <a:p>
+            <a:r>
+              <a:rPr lang="en-US" dirty="0" smtClean="0"/>
+              <a:t>Spring WS</a:t>
+            </a:r>
+            <a:endParaRPr lang="en-US" dirty="0"/>
+          </a:p>
+        </p:txBody>
+      </p:sp>
+      <p:sp>
+        <p:nvSpPr>
+          <p:cNvPr id="4" name="Marcador de contenido 14"/>
+          <p:cNvSpPr txBox="1">
+            <a:spLocks/>
+          </p:cNvSpPr>
+          <p:nvPr/>
+        </p:nvSpPr>
+        <p:spPr bwMode="auto">
+          <a:xfrm>
+            <a:off x="614627" y="1492189"/>
+            <a:ext cx="8208912" cy="4965019"/>
+          </a:xfrm>
+          <a:prstGeom prst="rect">
+            <a:avLst/>
+          </a:prstGeom>
+          <a:noFill/>
+          <a:ln>
+            <a:noFill/>
+          </a:ln>
+          <a:extLst>
+            <a:ext uri="{909E8E84-426E-40DD-AFC4-6F175D3DCCD1}">
+              <a14:hiddenFill xmlns:a14="http://schemas.microsoft.com/office/drawing/2010/main">
+                <a:solidFill>
+                  <a:srgbClr val="FFFFFF"/>
+                </a:solidFill>
+              </a14:hiddenFill>
+            </a:ext>
+            <a:ext uri="{91240B29-F687-4F45-9708-019B960494DF}">
+              <a14:hiddenLine xmlns:a14="http://schemas.microsoft.com/office/drawing/2010/main" w="9525">
+                <a:solidFill>
+                  <a:srgbClr val="000000"/>
+                </a:solidFill>
+                <a:miter lim="800000"/>
+                <a:headEnd/>
+                <a:tailEnd/>
+              </a14:hiddenLine>
+            </a:ext>
+          </a:extLst>
+        </p:spPr>
+        <p:txBody>
+          <a:bodyPr vert="horz" wrap="square" lIns="91440" tIns="45720" rIns="91440" bIns="45720" numCol="1" anchor="t" anchorCtr="0" compatLnSpc="1">
+            <a:prstTxWarp prst="textNoShape">
+              <a:avLst/>
+            </a:prstTxWarp>
+          </a:bodyPr>
+          <a:lstStyle>
+            <a:lvl1pPr marL="126000" marR="0" indent="-180000" algn="l" defTabSz="914400" rtl="0" eaLnBrk="0" fontAlgn="base" latinLnBrk="0" hangingPunct="0">
+              <a:lnSpc>
+                <a:spcPct val="100000"/>
+              </a:lnSpc>
+              <a:spcBef>
+                <a:spcPct val="20000"/>
+              </a:spcBef>
+              <a:spcAft>
+                <a:spcPct val="0"/>
+              </a:spcAft>
+              <a:buClrTx/>
+              <a:buSzTx/>
+              <a:buFont typeface="Arial Rounded MT Bold" pitchFamily="34" charset="0"/>
+              <a:buChar char="›"/>
+              <a:tabLst/>
+              <a:defRPr kern="1200">
+                <a:solidFill>
+                  <a:schemeClr val="tx1">
+                    <a:lumMod val="75000"/>
+                    <a:lumOff val="25000"/>
+                  </a:schemeClr>
+                </a:solidFill>
+                <a:latin typeface="Arial"/>
+                <a:ea typeface="+mn-ea"/>
+                <a:cs typeface="Arial"/>
+              </a:defRPr>
+            </a:lvl1pPr>
+            <a:lvl2pPr marL="540000" marR="0" indent="-180000" algn="l" defTabSz="914400" rtl="0" eaLnBrk="0" fontAlgn="base" latinLnBrk="0" hangingPunct="0">
+              <a:lnSpc>
+                <a:spcPct val="100000"/>
+              </a:lnSpc>
+              <a:spcBef>
+                <a:spcPct val="20000"/>
+              </a:spcBef>
+              <a:spcAft>
+                <a:spcPct val="0"/>
+              </a:spcAft>
+              <a:buClrTx/>
+              <a:buSzTx/>
+              <a:buFont typeface="Arial Rounded MT Bold" pitchFamily="34" charset="0"/>
+              <a:buChar char="›"/>
+              <a:tabLst/>
+              <a:defRPr sz="1600" kern="1200">
+                <a:solidFill>
+                  <a:schemeClr val="tx1">
+                    <a:lumMod val="75000"/>
+                    <a:lumOff val="25000"/>
+                  </a:schemeClr>
+                </a:solidFill>
+                <a:latin typeface="Arial"/>
+                <a:ea typeface="+mn-ea"/>
+                <a:cs typeface="Arial"/>
+              </a:defRPr>
+            </a:lvl2pPr>
+            <a:lvl3pPr marL="715963" marR="0" indent="-180000" algn="l" defTabSz="914400" rtl="0" eaLnBrk="0" fontAlgn="base" latinLnBrk="0" hangingPunct="0">
+              <a:lnSpc>
+                <a:spcPct val="100000"/>
+              </a:lnSpc>
+              <a:spcBef>
+                <a:spcPct val="20000"/>
+              </a:spcBef>
+              <a:spcAft>
+                <a:spcPct val="0"/>
+              </a:spcAft>
+              <a:buClrTx/>
+              <a:buSzTx/>
+              <a:buFont typeface="Arial Rounded MT Bold" pitchFamily="34" charset="0"/>
+              <a:buChar char="›"/>
+              <a:tabLst/>
+              <a:defRPr sz="1400" kern="1200">
+                <a:solidFill>
+                  <a:schemeClr val="tx1">
+                    <a:lumMod val="75000"/>
+                    <a:lumOff val="25000"/>
+                  </a:schemeClr>
+                </a:solidFill>
+                <a:latin typeface="Arial"/>
+                <a:ea typeface="+mn-ea"/>
+                <a:cs typeface="Arial"/>
+              </a:defRPr>
+            </a:lvl3pPr>
+            <a:lvl4pPr marL="923925" marR="0" indent="-180000" algn="l" defTabSz="914400" rtl="0" eaLnBrk="0" fontAlgn="base" latinLnBrk="0" hangingPunct="0">
+              <a:lnSpc>
+                <a:spcPct val="100000"/>
+              </a:lnSpc>
+              <a:spcBef>
+                <a:spcPct val="20000"/>
+              </a:spcBef>
+              <a:spcAft>
+                <a:spcPct val="0"/>
+              </a:spcAft>
+              <a:buClrTx/>
+              <a:buSzTx/>
+              <a:buFont typeface="Arial Rounded MT Bold" pitchFamily="34" charset="0"/>
+              <a:buChar char="›"/>
+              <a:tabLst/>
+              <a:defRPr sz="1200" kern="1200">
+                <a:solidFill>
+                  <a:schemeClr val="tx1">
+                    <a:lumMod val="75000"/>
+                    <a:lumOff val="25000"/>
+                  </a:schemeClr>
+                </a:solidFill>
+                <a:latin typeface="Arial"/>
+                <a:ea typeface="+mn-ea"/>
+                <a:cs typeface="Arial"/>
+              </a:defRPr>
+            </a:lvl4pPr>
+            <a:lvl5pPr marL="1079500" indent="-77788" algn="l" rtl="0" eaLnBrk="1" fontAlgn="base" hangingPunct="1">
+              <a:spcBef>
+                <a:spcPct val="20000"/>
+              </a:spcBef>
+              <a:spcAft>
+                <a:spcPct val="0"/>
+              </a:spcAft>
+              <a:buFont typeface="Arial Rounded MT Bold" pitchFamily="34" charset="0"/>
+              <a:buChar char="›"/>
+              <a:defRPr sz="1100" kern="1200">
+                <a:solidFill>
+                  <a:schemeClr val="tx1"/>
+                </a:solidFill>
+                <a:latin typeface="Arial" pitchFamily="34" charset="0"/>
+                <a:ea typeface="+mn-ea"/>
+                <a:cs typeface="Arial" pitchFamily="34" charset="0"/>
+              </a:defRPr>
+            </a:lvl5pPr>
+            <a:lvl6pPr marL="2514600" indent="-228600" algn="l" defTabSz="914400" rtl="0" eaLnBrk="1" latinLnBrk="0" hangingPunct="1">
+              <a:spcBef>
+                <a:spcPct val="20000"/>
+              </a:spcBef>
+              <a:buFont typeface="Arial" pitchFamily="34" charset="0"/>
+              <a:buChar char="•"/>
+              <a:defRPr sz="2000" kern="1200">
+                <a:solidFill>
+                  <a:schemeClr val="tx1"/>
+                </a:solidFill>
+                <a:latin typeface="+mn-lt"/>
+                <a:ea typeface="+mn-ea"/>
+                <a:cs typeface="+mn-cs"/>
+              </a:defRPr>
+            </a:lvl6pPr>
+            <a:lvl7pPr marL="2971800" indent="-228600" algn="l" defTabSz="914400" rtl="0" eaLnBrk="1" latinLnBrk="0" hangingPunct="1">
+              <a:spcBef>
+                <a:spcPct val="20000"/>
+              </a:spcBef>
+              <a:buFont typeface="Arial" pitchFamily="34" charset="0"/>
+              <a:buChar char="•"/>
+              <a:defRPr sz="2000" kern="1200">
+                <a:solidFill>
+                  <a:schemeClr val="tx1"/>
+                </a:solidFill>
+                <a:latin typeface="+mn-lt"/>
+                <a:ea typeface="+mn-ea"/>
+                <a:cs typeface="+mn-cs"/>
+              </a:defRPr>
+            </a:lvl7pPr>
+            <a:lvl8pPr marL="3429000" indent="-228600" algn="l" defTabSz="914400" rtl="0" eaLnBrk="1" latinLnBrk="0" hangingPunct="1">
+              <a:spcBef>
+                <a:spcPct val="20000"/>
+              </a:spcBef>
+              <a:buFont typeface="Arial" pitchFamily="34" charset="0"/>
+              <a:buChar char="•"/>
+              <a:defRPr sz="2000" kern="1200">
+                <a:solidFill>
+                  <a:schemeClr val="tx1"/>
+                </a:solidFill>
+                <a:latin typeface="+mn-lt"/>
+                <a:ea typeface="+mn-ea"/>
+                <a:cs typeface="+mn-cs"/>
+              </a:defRPr>
+            </a:lvl8pPr>
+            <a:lvl9pPr marL="3886200" indent="-228600" algn="l" defTabSz="914400" rtl="0" eaLnBrk="1" latinLnBrk="0" hangingPunct="1">
+              <a:spcBef>
+                <a:spcPct val="20000"/>
+              </a:spcBef>
+              <a:buFont typeface="Arial" pitchFamily="34" charset="0"/>
+              <a:buChar char="•"/>
+              <a:defRPr sz="2000" kern="1200">
+                <a:solidFill>
+                  <a:schemeClr val="tx1"/>
+                </a:solidFill>
+                <a:latin typeface="+mn-lt"/>
+                <a:ea typeface="+mn-ea"/>
+                <a:cs typeface="+mn-cs"/>
+              </a:defRPr>
+            </a:lvl9pPr>
+          </a:lstStyle>
+          <a:p>
+            <a:pPr marL="285750" indent="-285750"/>
             <a:r>
               <a:rPr lang="en-US" dirty="0"/>
-              <a:t>Acting on interaction</a:t>
-            </a:r>
+              <a:t>Spring Web Services </a:t>
+            </a:r>
+            <a:r>
+              <a:rPr lang="en-US" dirty="0" smtClean="0"/>
+              <a:t>facilitates </a:t>
+            </a:r>
+            <a:r>
+              <a:rPr lang="en-US" b="1" i="1" dirty="0" smtClean="0"/>
+              <a:t>contract-first</a:t>
+            </a:r>
+            <a:r>
+              <a:rPr lang="en-US" dirty="0" smtClean="0"/>
+              <a:t> </a:t>
+            </a:r>
+            <a:r>
+              <a:rPr lang="en-US" dirty="0"/>
+              <a:t>SOAP </a:t>
+            </a:r>
+            <a:r>
+              <a:rPr lang="en-US" dirty="0" smtClean="0"/>
+              <a:t>web service development</a:t>
+            </a:r>
+            <a:r>
+              <a:rPr lang="en-US" dirty="0"/>
+              <a:t>.</a:t>
+            </a:r>
+            <a:endParaRPr lang="en-US" dirty="0" smtClean="0"/>
+          </a:p>
+          <a:p>
+            <a:pPr marL="285750" indent="-285750"/>
+            <a:endParaRPr lang="en-US" dirty="0"/>
+          </a:p>
+          <a:p>
+            <a:pPr marL="285750" indent="-285750"/>
+            <a:r>
+              <a:rPr lang="en-US" dirty="0" smtClean="0"/>
+              <a:t>Allows the </a:t>
+            </a:r>
+            <a:r>
+              <a:rPr lang="en-US" dirty="0"/>
+              <a:t>creation of flexible web services using one of the many ways to manipulate XML payloads.</a:t>
+            </a:r>
+            <a:endParaRPr lang="es-MX" dirty="0"/>
+          </a:p>
+          <a:p>
+            <a:endParaRPr lang="es-MX" dirty="0" smtClean="0"/>
+          </a:p>
+          <a:p>
+            <a:r>
+              <a:rPr lang="es-MX" dirty="0" err="1" smtClean="0"/>
+              <a:t>Based</a:t>
+            </a:r>
+            <a:r>
+              <a:rPr lang="es-MX" dirty="0" smtClean="0"/>
+              <a:t> </a:t>
+            </a:r>
+            <a:r>
+              <a:rPr lang="es-MX" dirty="0" err="1" smtClean="0"/>
+              <a:t>on</a:t>
+            </a:r>
+            <a:r>
+              <a:rPr lang="es-MX" dirty="0" smtClean="0"/>
+              <a:t> JAX-WS.</a:t>
+            </a:r>
+          </a:p>
+          <a:p>
+            <a:endParaRPr lang="es-MX" dirty="0"/>
+          </a:p>
+          <a:p>
+            <a:endParaRPr lang="es-MX" dirty="0" smtClean="0"/>
+          </a:p>
+          <a:p>
+            <a:endParaRPr lang="en-US" dirty="0"/>
           </a:p>
         </p:txBody>
       </p:sp>
     </p:spTree>
     <p:extLst>
       <p:ext uri="{BB962C8B-B14F-4D97-AF65-F5344CB8AC3E}">
-        <p14:creationId xmlns:p14="http://schemas.microsoft.com/office/powerpoint/2010/main" val="1931983810"/>
+        <p14:creationId xmlns:p14="http://schemas.microsoft.com/office/powerpoint/2010/main" val="1145471620"/>
       </p:ext>
     </p:extLst>
   </p:cSld>
   <p:clrMapOvr>
-    <a:masterClrMapping/>
+    <a:overrideClrMapping bg1="lt1" tx1="dk1" bg2="lt2" tx2="dk2" accent1="accent1" accent2="accent2" accent3="accent3" accent4="accent4" accent5="accent5" accent6="accent6" hlink="hlink" folHlink="folHlink"/>
   </p:clrMapOvr>
   <p:timing>
     <p:tnLst>
@@ -17776,12 +18982,12 @@
       </p:grpSpPr>
       <p:sp>
         <p:nvSpPr>
-          <p:cNvPr id="3" name="Text Placeholder 2"/>
+          <p:cNvPr id="15" name="Marcador de contenido 14"/>
           <p:cNvSpPr>
             <a:spLocks noGrp="1"/>
           </p:cNvSpPr>
           <p:nvPr>
-            <p:ph type="body" sz="quarter" idx="10"/>
+            <p:ph sz="quarter" idx="10"/>
           </p:nvPr>
         </p:nvSpPr>
         <p:spPr/>
@@ -17789,9 +18995,31 @@
           <a:bodyPr/>
           <a:lstStyle/>
           <a:p>
-            <a:r>
-              <a:rPr lang="en-US" b="1" dirty="0"/>
-              <a:t>Refactor using Traversing</a:t>
+            <a:endParaRPr lang="es-MX" dirty="0"/>
+          </a:p>
+          <a:p>
+            <a:endParaRPr lang="en-US" dirty="0"/>
+          </a:p>
+        </p:txBody>
+      </p:sp>
+      <p:sp>
+        <p:nvSpPr>
+          <p:cNvPr id="2" name="Title 1"/>
+          <p:cNvSpPr>
+            <a:spLocks noGrp="1"/>
+          </p:cNvSpPr>
+          <p:nvPr>
+            <p:ph type="title"/>
+          </p:nvPr>
+        </p:nvSpPr>
+        <p:spPr/>
+        <p:txBody>
+          <a:bodyPr/>
+          <a:lstStyle/>
+          <a:p>
+            <a:r>
+              <a:rPr lang="en-US" dirty="0" smtClean="0"/>
+              <a:t>Contract-first</a:t>
             </a:r>
             <a:endParaRPr lang="en-US" dirty="0"/>
           </a:p>
@@ -17800,7 +19028,7 @@
     </p:spTree>
     <p:extLst>
       <p:ext uri="{BB962C8B-B14F-4D97-AF65-F5344CB8AC3E}">
-        <p14:creationId xmlns:p14="http://schemas.microsoft.com/office/powerpoint/2010/main" val="1508099874"/>
+        <p14:creationId xmlns:p14="http://schemas.microsoft.com/office/powerpoint/2010/main" val="3730732468"/>
       </p:ext>
     </p:extLst>
   </p:cSld>
@@ -17836,12 +19064,12 @@
       </p:grpSpPr>
       <p:sp>
         <p:nvSpPr>
-          <p:cNvPr id="3" name="Text Placeholder 2"/>
+          <p:cNvPr id="2" name="Title 1"/>
           <p:cNvSpPr>
             <a:spLocks noGrp="1"/>
           </p:cNvSpPr>
           <p:nvPr>
-            <p:ph type="body" sz="quarter" idx="10"/>
+            <p:ph type="title"/>
           </p:nvPr>
         </p:nvSpPr>
         <p:spPr/>
@@ -17850,9 +19078,31 @@
           <a:lstStyle/>
           <a:p>
             <a:r>
+              <a:rPr lang="en-US" sz="3200" dirty="0" smtClean="0"/>
+              <a:t>Level</a:t>
+            </a:r>
+            <a:r>
+              <a:rPr lang="en-US" dirty="0" smtClean="0"/>
+              <a:t> </a:t>
+            </a:r>
+            <a:r>
+              <a:rPr lang="en-US" sz="9600" dirty="0" smtClean="0"/>
+              <a:t>3</a:t>
+            </a:r>
+            <a:br>
+              <a:rPr lang="en-US" sz="9600" dirty="0" smtClean="0"/>
+            </a:br>
+            <a:r>
               <a:rPr lang="en-US" b="1" dirty="0"/>
-              <a:t>Traversing and Filtering</a:t>
-            </a:r>
+              <a:t>Working with the DOM</a:t>
+            </a:r>
+            <a:r>
+              <a:rPr lang="en-US" dirty="0"/>
+              <a:t/>
+            </a:r>
+            <a:br>
+              <a:rPr lang="en-US" dirty="0"/>
+            </a:br>
             <a:endParaRPr lang="en-US" dirty="0"/>
           </a:p>
         </p:txBody>
@@ -17860,7 +19110,7 @@
     </p:spTree>
     <p:extLst>
       <p:ext uri="{BB962C8B-B14F-4D97-AF65-F5344CB8AC3E}">
-        <p14:creationId xmlns:p14="http://schemas.microsoft.com/office/powerpoint/2010/main" val="1997405799"/>
+        <p14:creationId xmlns:p14="http://schemas.microsoft.com/office/powerpoint/2010/main" val="1407692737"/>
       </p:ext>
     </p:extLst>
   </p:cSld>
@@ -17896,12 +19146,12 @@
       </p:grpSpPr>
       <p:sp>
         <p:nvSpPr>
-          <p:cNvPr id="2" name="Title 1"/>
+          <p:cNvPr id="3" name="Text Placeholder 2"/>
           <p:cNvSpPr>
             <a:spLocks noGrp="1"/>
           </p:cNvSpPr>
           <p:nvPr>
-            <p:ph type="title"/>
+            <p:ph type="body" sz="quarter" idx="10"/>
           </p:nvPr>
         </p:nvSpPr>
         <p:spPr/>
@@ -17910,39 +19160,16 @@
           <a:lstStyle/>
           <a:p>
             <a:r>
-              <a:rPr lang="en-US" sz="3200" dirty="0" smtClean="0"/>
-              <a:t>Level </a:t>
-            </a:r>
-            <a:r>
-              <a:rPr lang="en-US" sz="9600" dirty="0" smtClean="0"/>
-              <a:t>4</a:t>
-            </a:r>
-            <a:r>
-              <a:rPr lang="en-US" sz="9600" dirty="0"/>
-              <a:t/>
-            </a:r>
-            <a:br>
-              <a:rPr lang="en-US" sz="9600" dirty="0"/>
-            </a:br>
-            <a:r>
-              <a:rPr lang="en-US" b="1" dirty="0"/>
-              <a:t>On DOM load</a:t>
-            </a:r>
-            <a:r>
               <a:rPr lang="en-US" dirty="0"/>
-              <a:t/>
-            </a:r>
-            <a:br>
-              <a:rPr lang="en-US" dirty="0"/>
-            </a:br>
-            <a:endParaRPr lang="en-US" dirty="0"/>
+              <a:t>Acting on interaction</a:t>
+            </a:r>
           </a:p>
         </p:txBody>
       </p:sp>
     </p:spTree>
     <p:extLst>
       <p:ext uri="{BB962C8B-B14F-4D97-AF65-F5344CB8AC3E}">
-        <p14:creationId xmlns:p14="http://schemas.microsoft.com/office/powerpoint/2010/main" val="2596890739"/>
+        <p14:creationId xmlns:p14="http://schemas.microsoft.com/office/powerpoint/2010/main" val="1931983810"/>
       </p:ext>
     </p:extLst>
   </p:cSld>
@@ -17993,7 +19220,7 @@
           <a:p>
             <a:r>
               <a:rPr lang="en-US" b="1" dirty="0"/>
-              <a:t>Expanding on on()</a:t>
+              <a:t>Refactor using Traversing</a:t>
             </a:r>
             <a:endParaRPr lang="en-US" dirty="0"/>
           </a:p>
@@ -18002,7 +19229,7 @@
     </p:spTree>
     <p:extLst>
       <p:ext uri="{BB962C8B-B14F-4D97-AF65-F5344CB8AC3E}">
-        <p14:creationId xmlns:p14="http://schemas.microsoft.com/office/powerpoint/2010/main" val="1436923828"/>
+        <p14:creationId xmlns:p14="http://schemas.microsoft.com/office/powerpoint/2010/main" val="1508099874"/>
       </p:ext>
     </p:extLst>
   </p:cSld>
@@ -18053,7 +19280,7 @@
           <a:p>
             <a:r>
               <a:rPr lang="en-US" b="1" dirty="0"/>
-              <a:t>Keyboard Events</a:t>
+              <a:t>Traversing and Filtering</a:t>
             </a:r>
             <a:endParaRPr lang="en-US" dirty="0"/>
           </a:p>
@@ -18062,7 +19289,7 @@
     </p:spTree>
     <p:extLst>
       <p:ext uri="{BB962C8B-B14F-4D97-AF65-F5344CB8AC3E}">
-        <p14:creationId xmlns:p14="http://schemas.microsoft.com/office/powerpoint/2010/main" val="2008738165"/>
+        <p14:creationId xmlns:p14="http://schemas.microsoft.com/office/powerpoint/2010/main" val="1997405799"/>
       </p:ext>
     </p:extLst>
   </p:cSld>
@@ -18105,7 +19332,7 @@
           <p:nvPr>
             <p:extLst>
               <p:ext uri="{D42A27DB-BD31-4B8C-83A1-F6EECF244321}">
-                <p14:modId xmlns:p14="http://schemas.microsoft.com/office/powerpoint/2010/main" val="2229652139"/>
+                <p14:modId xmlns:p14="http://schemas.microsoft.com/office/powerpoint/2010/main" val="4027710981"/>
               </p:ext>
             </p:extLst>
           </p:nvPr>
@@ -18214,11 +19441,7 @@
                     <a:p>
                       <a:r>
                         <a:rPr lang="en-US" sz="1200" dirty="0" smtClean="0"/>
-                        <a:t>Java </a:t>
-                      </a:r>
-                      <a:r>
-                        <a:rPr lang="en-US" sz="1200" dirty="0" err="1" smtClean="0"/>
-                        <a:t>Academiy</a:t>
+                        <a:t>Java Academy</a:t>
                       </a:r>
                       <a:r>
                         <a:rPr lang="en-US" sz="1200" baseline="0" dirty="0" smtClean="0"/>
@@ -18915,7 +20138,7 @@
                 <a:latin typeface="Arial" charset="0"/>
                 <a:cs typeface="Arial" charset="0"/>
               </a:rPr>
-              <a:t>Document Name:</a:t>
+              <a:t>Document Name: ACADEMY 2015 – SOAP WEB SERVICES</a:t>
             </a:r>
           </a:p>
           <a:p>
@@ -19459,12 +20682,12 @@
       </p:grpSpPr>
       <p:sp>
         <p:nvSpPr>
-          <p:cNvPr id="3" name="Text Placeholder 2"/>
+          <p:cNvPr id="2" name="Title 1"/>
           <p:cNvSpPr>
             <a:spLocks noGrp="1"/>
           </p:cNvSpPr>
           <p:nvPr>
-            <p:ph type="body" sz="quarter" idx="10"/>
+            <p:ph type="title"/>
           </p:nvPr>
         </p:nvSpPr>
         <p:spPr/>
@@ -19473,9 +20696,31 @@
           <a:lstStyle/>
           <a:p>
             <a:r>
+              <a:rPr lang="en-US" sz="3200" dirty="0" smtClean="0"/>
+              <a:t>Level </a:t>
+            </a:r>
+            <a:r>
+              <a:rPr lang="en-US" sz="9600" dirty="0" smtClean="0"/>
+              <a:t>4</a:t>
+            </a:r>
+            <a:r>
+              <a:rPr lang="en-US" sz="9600" dirty="0"/>
+              <a:t/>
+            </a:r>
+            <a:br>
+              <a:rPr lang="en-US" sz="9600" dirty="0"/>
+            </a:br>
+            <a:r>
               <a:rPr lang="en-US" b="1" dirty="0"/>
-              <a:t>Link Layover</a:t>
-            </a:r>
+              <a:t>On DOM load</a:t>
+            </a:r>
+            <a:r>
+              <a:rPr lang="en-US" dirty="0"/>
+              <a:t/>
+            </a:r>
+            <a:br>
+              <a:rPr lang="en-US" dirty="0"/>
+            </a:br>
             <a:endParaRPr lang="en-US" dirty="0"/>
           </a:p>
         </p:txBody>
@@ -19483,7 +20728,7 @@
     </p:spTree>
     <p:extLst>
       <p:ext uri="{BB962C8B-B14F-4D97-AF65-F5344CB8AC3E}">
-        <p14:creationId xmlns:p14="http://schemas.microsoft.com/office/powerpoint/2010/main" val="3884705515"/>
+        <p14:creationId xmlns:p14="http://schemas.microsoft.com/office/powerpoint/2010/main" val="2596890739"/>
       </p:ext>
     </p:extLst>
   </p:cSld>
@@ -19519,12 +20764,12 @@
       </p:grpSpPr>
       <p:sp>
         <p:nvSpPr>
-          <p:cNvPr id="2" name="Title 1"/>
+          <p:cNvPr id="3" name="Text Placeholder 2"/>
           <p:cNvSpPr>
             <a:spLocks noGrp="1"/>
           </p:cNvSpPr>
           <p:nvPr>
-            <p:ph type="title"/>
+            <p:ph type="body" sz="quarter" idx="10"/>
           </p:nvPr>
         </p:nvSpPr>
         <p:spPr/>
@@ -19533,31 +20778,9 @@
           <a:lstStyle/>
           <a:p>
             <a:r>
-              <a:rPr lang="en-US" sz="3200" dirty="0"/>
-              <a:t>Level</a:t>
-            </a:r>
-            <a:r>
-              <a:rPr lang="en-US" dirty="0"/>
-              <a:t> </a:t>
-            </a:r>
-            <a:r>
-              <a:rPr lang="en-US" sz="9600" dirty="0"/>
-              <a:t>5</a:t>
-            </a:r>
-            <a:br>
-              <a:rPr lang="en-US" sz="9600" dirty="0"/>
-            </a:br>
-            <a:r>
               <a:rPr lang="en-US" b="1" dirty="0"/>
-              <a:t>Taming CSS</a:t>
-            </a:r>
-            <a:r>
-              <a:rPr lang="en-US" dirty="0"/>
-              <a:t/>
-            </a:r>
-            <a:br>
-              <a:rPr lang="en-US" dirty="0"/>
-            </a:br>
+              <a:t>Expanding on on()</a:t>
+            </a:r>
             <a:endParaRPr lang="en-US" dirty="0"/>
           </a:p>
         </p:txBody>
@@ -19565,7 +20788,7 @@
     </p:spTree>
     <p:extLst>
       <p:ext uri="{BB962C8B-B14F-4D97-AF65-F5344CB8AC3E}">
-        <p14:creationId xmlns:p14="http://schemas.microsoft.com/office/powerpoint/2010/main" val="1520728916"/>
+        <p14:creationId xmlns:p14="http://schemas.microsoft.com/office/powerpoint/2010/main" val="1436923828"/>
       </p:ext>
     </p:extLst>
   </p:cSld>
@@ -19616,7 +20839,7 @@
           <a:p>
             <a:r>
               <a:rPr lang="en-US" b="1" dirty="0"/>
-              <a:t>Challenges</a:t>
+              <a:t>Keyboard Events</a:t>
             </a:r>
             <a:endParaRPr lang="en-US" dirty="0"/>
           </a:p>
@@ -19625,7 +20848,7 @@
     </p:spTree>
     <p:extLst>
       <p:ext uri="{BB962C8B-B14F-4D97-AF65-F5344CB8AC3E}">
-        <p14:creationId xmlns:p14="http://schemas.microsoft.com/office/powerpoint/2010/main" val="3021578249"/>
+        <p14:creationId xmlns:p14="http://schemas.microsoft.com/office/powerpoint/2010/main" val="2008738165"/>
       </p:ext>
     </p:extLst>
   </p:cSld>
@@ -19676,30 +20899,7 @@
           <a:p>
             <a:r>
               <a:rPr lang="en-US" b="1" dirty="0"/>
-              <a:t>Animation</a:t>
-            </a:r>
-            <a:endParaRPr lang="en-US" dirty="0"/>
-          </a:p>
-        </p:txBody>
-      </p:sp>
-      <p:sp>
-        <p:nvSpPr>
-          <p:cNvPr id="2" name="Title 1"/>
-          <p:cNvSpPr>
-            <a:spLocks noGrp="1"/>
-          </p:cNvSpPr>
-          <p:nvPr>
-            <p:ph type="title"/>
-          </p:nvPr>
-        </p:nvSpPr>
-        <p:spPr/>
-        <p:txBody>
-          <a:bodyPr/>
-          <a:lstStyle/>
-          <a:p>
-            <a:r>
-              <a:rPr lang="en-US" dirty="0" smtClean="0"/>
-              <a:t>Challenges</a:t>
+              <a:t>Link Layover</a:t>
             </a:r>
             <a:endParaRPr lang="en-US" dirty="0"/>
           </a:p>
@@ -19708,7 +20908,7 @@
     </p:spTree>
     <p:extLst>
       <p:ext uri="{BB962C8B-B14F-4D97-AF65-F5344CB8AC3E}">
-        <p14:creationId xmlns:p14="http://schemas.microsoft.com/office/powerpoint/2010/main" val="246998020"/>
+        <p14:creationId xmlns:p14="http://schemas.microsoft.com/office/powerpoint/2010/main" val="3884705515"/>
       </p:ext>
     </p:extLst>
   </p:cSld>
@@ -19744,45 +20944,53 @@
       </p:grpSpPr>
       <p:sp>
         <p:nvSpPr>
-          <p:cNvPr id="4" name="Slide Number Placeholder 3"/>
+          <p:cNvPr id="2" name="Title 1"/>
           <p:cNvSpPr>
             <a:spLocks noGrp="1"/>
           </p:cNvSpPr>
           <p:nvPr>
-            <p:ph type="sldNum" sz="quarter" idx="4294967295"/>
+            <p:ph type="title"/>
           </p:nvPr>
         </p:nvSpPr>
-        <p:spPr>
-          <a:xfrm>
-            <a:off x="0" y="6519863"/>
-            <a:ext cx="360363" cy="222250"/>
-          </a:xfrm>
-          <a:prstGeom prst="rect">
-            <a:avLst/>
-          </a:prstGeom>
-        </p:spPr>
+        <p:spPr/>
         <p:txBody>
           <a:bodyPr/>
           <a:lstStyle/>
           <a:p>
-            <a:pPr>
-              <a:defRPr/>
-            </a:pPr>
-            <a:fld id="{4AD834FB-D050-4DAD-A587-98ECF1E1D3D9}" type="slidenum">
-              <a:rPr lang="en-US" noProof="0" smtClean="0"/>
-              <a:pPr>
-                <a:defRPr/>
-              </a:pPr>
-              <a:t>24</a:t>
-            </a:fld>
-            <a:endParaRPr lang="en-US" noProof="0"/>
+            <a:r>
+              <a:rPr lang="en-US" sz="3200" dirty="0"/>
+              <a:t>Level</a:t>
+            </a:r>
+            <a:r>
+              <a:rPr lang="en-US" dirty="0"/>
+              <a:t> </a:t>
+            </a:r>
+            <a:r>
+              <a:rPr lang="en-US" sz="9600" dirty="0"/>
+              <a:t>5</a:t>
+            </a:r>
+            <a:br>
+              <a:rPr lang="en-US" sz="9600" dirty="0"/>
+            </a:br>
+            <a:r>
+              <a:rPr lang="en-US" b="1" dirty="0"/>
+              <a:t>Taming CSS</a:t>
+            </a:r>
+            <a:r>
+              <a:rPr lang="en-US" dirty="0"/>
+              <a:t/>
+            </a:r>
+            <a:br>
+              <a:rPr lang="en-US" dirty="0"/>
+            </a:br>
+            <a:endParaRPr lang="en-US" dirty="0"/>
           </a:p>
         </p:txBody>
       </p:sp>
     </p:spTree>
     <p:extLst>
       <p:ext uri="{BB962C8B-B14F-4D97-AF65-F5344CB8AC3E}">
-        <p14:creationId xmlns:p14="http://schemas.microsoft.com/office/powerpoint/2010/main" val="3482330255"/>
+        <p14:creationId xmlns:p14="http://schemas.microsoft.com/office/powerpoint/2010/main" val="1520728916"/>
       </p:ext>
     </p:extLst>
   </p:cSld>
@@ -19818,27 +21026,22 @@
       </p:grpSpPr>
       <p:sp>
         <p:nvSpPr>
-          <p:cNvPr id="2" name="Title 1"/>
+          <p:cNvPr id="3" name="Text Placeholder 2"/>
           <p:cNvSpPr>
             <a:spLocks noGrp="1"/>
           </p:cNvSpPr>
           <p:nvPr>
-            <p:ph type="title"/>
+            <p:ph type="body" sz="quarter" idx="10"/>
           </p:nvPr>
         </p:nvSpPr>
-        <p:spPr>
-          <a:xfrm>
-            <a:off x="457200" y="2590800"/>
-            <a:ext cx="8229600" cy="1143000"/>
-          </a:xfrm>
-        </p:spPr>
+        <p:spPr/>
         <p:txBody>
           <a:bodyPr/>
           <a:lstStyle/>
           <a:p>
             <a:r>
-              <a:rPr lang="en-US" dirty="0" smtClean="0"/>
-              <a:t>The End</a:t>
+              <a:rPr lang="en-US" b="1" dirty="0"/>
+              <a:t>Challenges</a:t>
             </a:r>
             <a:endParaRPr lang="en-US" dirty="0"/>
           </a:p>
@@ -19847,7 +21050,7 @@
     </p:spTree>
     <p:extLst>
       <p:ext uri="{BB962C8B-B14F-4D97-AF65-F5344CB8AC3E}">
-        <p14:creationId xmlns:p14="http://schemas.microsoft.com/office/powerpoint/2010/main" val="2404004988"/>
+        <p14:creationId xmlns:p14="http://schemas.microsoft.com/office/powerpoint/2010/main" val="3021578249"/>
       </p:ext>
     </p:extLst>
   </p:cSld>
@@ -19883,12 +21086,12 @@
       </p:grpSpPr>
       <p:sp>
         <p:nvSpPr>
-          <p:cNvPr id="3" name="Content Placeholder 2"/>
+          <p:cNvPr id="3" name="Text Placeholder 2"/>
           <p:cNvSpPr>
             <a:spLocks noGrp="1"/>
           </p:cNvSpPr>
           <p:nvPr>
-            <p:ph type="body" sz="quarter" idx="18"/>
+            <p:ph type="body" sz="quarter" idx="10"/>
           </p:nvPr>
         </p:nvSpPr>
         <p:spPr/>
@@ -19896,27 +21099,22 @@
           <a:bodyPr/>
           <a:lstStyle/>
           <a:p>
-            <a:pPr marL="0" indent="0">
-              <a:buNone/>
-            </a:pPr>
-            <a:r>
-              <a:rPr lang="en-US" sz="2400" dirty="0" smtClean="0"/>
-              <a:t>Videos, challenges, tutorials</a:t>
-            </a:r>
-          </a:p>
-          <a:p>
+            <a:r>
+              <a:rPr lang="en-US" b="1" dirty="0"/>
+              <a:t>Animation</a:t>
+            </a:r>
             <a:endParaRPr lang="en-US" dirty="0"/>
           </a:p>
         </p:txBody>
       </p:sp>
       <p:sp>
         <p:nvSpPr>
-          <p:cNvPr id="4" name="Text Placeholder 3"/>
+          <p:cNvPr id="2" name="Title 1"/>
           <p:cNvSpPr>
             <a:spLocks noGrp="1"/>
           </p:cNvSpPr>
           <p:nvPr>
-            <p:ph type="body" sz="quarter" idx="19"/>
+            <p:ph type="title"/>
           </p:nvPr>
         </p:nvSpPr>
         <p:spPr/>
@@ -19925,71 +21123,189 @@
           <a:lstStyle/>
           <a:p>
             <a:r>
-              <a:rPr lang="en-US" dirty="0">
-                <a:hlinkClick r:id="rId2"/>
-              </a:rPr>
-              <a:t>http://try.jquery.com/</a:t>
+              <a:rPr lang="en-US" dirty="0" smtClean="0"/>
+              <a:t>Challenges</a:t>
             </a:r>
             <a:endParaRPr lang="en-US" dirty="0"/>
           </a:p>
-          <a:p>
-            <a:endParaRPr lang="en-US" dirty="0"/>
-          </a:p>
-        </p:txBody>
-      </p:sp>
-      <p:sp>
-        <p:nvSpPr>
-          <p:cNvPr id="5" name="Text Placeholder 4"/>
+        </p:txBody>
+      </p:sp>
+    </p:spTree>
+    <p:extLst>
+      <p:ext uri="{BB962C8B-B14F-4D97-AF65-F5344CB8AC3E}">
+        <p14:creationId xmlns:p14="http://schemas.microsoft.com/office/powerpoint/2010/main" val="246998020"/>
+      </p:ext>
+    </p:extLst>
+  </p:cSld>
+  <p:clrMapOvr>
+    <a:masterClrMapping/>
+  </p:clrMapOvr>
+  <p:timing>
+    <p:tnLst>
+      <p:par>
+        <p:cTn id="1" dur="indefinite" restart="never" nodeType="tmRoot"/>
+      </p:par>
+    </p:tnLst>
+  </p:timing>
+</p:sld>
+</file>
+
+<file path=ppt/slides/slide27.xml><?xml version="1.0" encoding="utf-8"?>
+<p:sld xmlns:a="http://schemas.openxmlformats.org/drawingml/2006/main" xmlns:r="http://schemas.openxmlformats.org/officeDocument/2006/relationships" xmlns:p="http://schemas.openxmlformats.org/presentationml/2006/main">
+  <p:cSld>
+    <p:spTree>
+      <p:nvGrpSpPr>
+        <p:cNvPr id="1" name=""/>
+        <p:cNvGrpSpPr/>
+        <p:nvPr/>
+      </p:nvGrpSpPr>
+      <p:grpSpPr>
+        <a:xfrm>
+          <a:off x="0" y="0"/>
+          <a:ext cx="0" cy="0"/>
+          <a:chOff x="0" y="0"/>
+          <a:chExt cx="0" cy="0"/>
+        </a:xfrm>
+      </p:grpSpPr>
+      <p:sp>
+        <p:nvSpPr>
+          <p:cNvPr id="4" name="Slide Number Placeholder 3"/>
           <p:cNvSpPr>
             <a:spLocks noGrp="1"/>
           </p:cNvSpPr>
           <p:nvPr>
-            <p:ph type="body" sz="quarter" idx="20"/>
+            <p:ph type="sldNum" sz="quarter" idx="4294967295"/>
           </p:nvPr>
         </p:nvSpPr>
-        <p:spPr/>
+        <p:spPr>
+          <a:xfrm>
+            <a:off x="0" y="6519863"/>
+            <a:ext cx="360363" cy="222250"/>
+          </a:xfrm>
+          <a:prstGeom prst="rect">
+            <a:avLst/>
+          </a:prstGeom>
+        </p:spPr>
         <p:txBody>
           <a:bodyPr/>
           <a:lstStyle/>
           <a:p>
-            <a:r>
-              <a:rPr lang="en-US" dirty="0"/>
-              <a:t>Official jQuery API documentation</a:t>
-            </a:r>
-          </a:p>
-          <a:p>
-            <a:endParaRPr lang="en-US" dirty="0"/>
-          </a:p>
-        </p:txBody>
-      </p:sp>
-      <p:sp>
-        <p:nvSpPr>
-          <p:cNvPr id="6" name="Text Placeholder 5"/>
+            <a:pPr>
+              <a:defRPr/>
+            </a:pPr>
+            <a:fld id="{4AD834FB-D050-4DAD-A587-98ECF1E1D3D9}" type="slidenum">
+              <a:rPr lang="en-US" noProof="0" smtClean="0"/>
+              <a:pPr>
+                <a:defRPr/>
+              </a:pPr>
+              <a:t>27</a:t>
+            </a:fld>
+            <a:endParaRPr lang="en-US" noProof="0"/>
+          </a:p>
+        </p:txBody>
+      </p:sp>
+    </p:spTree>
+    <p:extLst>
+      <p:ext uri="{BB962C8B-B14F-4D97-AF65-F5344CB8AC3E}">
+        <p14:creationId xmlns:p14="http://schemas.microsoft.com/office/powerpoint/2010/main" val="3482330255"/>
+      </p:ext>
+    </p:extLst>
+  </p:cSld>
+  <p:clrMapOvr>
+    <a:masterClrMapping/>
+  </p:clrMapOvr>
+  <p:timing>
+    <p:tnLst>
+      <p:par>
+        <p:cTn id="1" dur="indefinite" restart="never" nodeType="tmRoot"/>
+      </p:par>
+    </p:tnLst>
+  </p:timing>
+</p:sld>
+</file>
+
+<file path=ppt/slides/slide28.xml><?xml version="1.0" encoding="utf-8"?>
+<p:sld xmlns:a="http://schemas.openxmlformats.org/drawingml/2006/main" xmlns:r="http://schemas.openxmlformats.org/officeDocument/2006/relationships" xmlns:p="http://schemas.openxmlformats.org/presentationml/2006/main">
+  <p:cSld>
+    <p:spTree>
+      <p:nvGrpSpPr>
+        <p:cNvPr id="1" name=""/>
+        <p:cNvGrpSpPr/>
+        <p:nvPr/>
+      </p:nvGrpSpPr>
+      <p:grpSpPr>
+        <a:xfrm>
+          <a:off x="0" y="0"/>
+          <a:ext cx="0" cy="0"/>
+          <a:chOff x="0" y="0"/>
+          <a:chExt cx="0" cy="0"/>
+        </a:xfrm>
+      </p:grpSpPr>
+      <p:sp>
+        <p:nvSpPr>
+          <p:cNvPr id="2" name="Title 1"/>
           <p:cNvSpPr>
             <a:spLocks noGrp="1"/>
           </p:cNvSpPr>
           <p:nvPr>
-            <p:ph type="body" sz="quarter" idx="21"/>
+            <p:ph type="title"/>
           </p:nvPr>
         </p:nvSpPr>
-        <p:spPr/>
+        <p:spPr>
+          <a:xfrm>
+            <a:off x="457200" y="2590800"/>
+            <a:ext cx="8229600" cy="1143000"/>
+          </a:xfrm>
+        </p:spPr>
         <p:txBody>
           <a:bodyPr/>
           <a:lstStyle/>
           <a:p>
             <a:r>
-              <a:rPr lang="en-US" dirty="0">
-                <a:hlinkClick r:id="rId3"/>
-              </a:rPr>
-              <a:t>http://api.jquery.com/</a:t>
+              <a:rPr lang="en-US" dirty="0" smtClean="0"/>
+              <a:t>The End</a:t>
             </a:r>
             <a:endParaRPr lang="en-US" dirty="0"/>
           </a:p>
-          <a:p>
-            <a:endParaRPr lang="en-US" dirty="0"/>
-          </a:p>
-        </p:txBody>
-      </p:sp>
+        </p:txBody>
+      </p:sp>
+    </p:spTree>
+    <p:extLst>
+      <p:ext uri="{BB962C8B-B14F-4D97-AF65-F5344CB8AC3E}">
+        <p14:creationId xmlns:p14="http://schemas.microsoft.com/office/powerpoint/2010/main" val="2404004988"/>
+      </p:ext>
+    </p:extLst>
+  </p:cSld>
+  <p:clrMapOvr>
+    <a:masterClrMapping/>
+  </p:clrMapOvr>
+  <p:timing>
+    <p:tnLst>
+      <p:par>
+        <p:cTn id="1" dur="indefinite" restart="never" nodeType="tmRoot"/>
+      </p:par>
+    </p:tnLst>
+  </p:timing>
+</p:sld>
+</file>
+
+<file path=ppt/slides/slide29.xml><?xml version="1.0" encoding="utf-8"?>
+<p:sld xmlns:a="http://schemas.openxmlformats.org/drawingml/2006/main" xmlns:r="http://schemas.openxmlformats.org/officeDocument/2006/relationships" xmlns:p="http://schemas.openxmlformats.org/presentationml/2006/main">
+  <p:cSld>
+    <p:spTree>
+      <p:nvGrpSpPr>
+        <p:cNvPr id="1" name=""/>
+        <p:cNvGrpSpPr/>
+        <p:nvPr/>
+      </p:nvGrpSpPr>
+      <p:grpSpPr>
+        <a:xfrm>
+          <a:off x="0" y="0"/>
+          <a:ext cx="0" cy="0"/>
+          <a:chOff x="0" y="0"/>
+          <a:chExt cx="0" cy="0"/>
+        </a:xfrm>
+      </p:grpSpPr>
       <p:sp>
         <p:nvSpPr>
           <p:cNvPr id="7" name="Text Placeholder 6"/>
@@ -20007,12 +21323,9 @@
           <a:p>
             <a:r>
               <a:rPr lang="en-US" dirty="0" smtClean="0"/>
-              <a:t>Official </a:t>
-            </a:r>
-            <a:r>
-              <a:rPr lang="en-US" dirty="0"/>
-              <a:t>jQuery page</a:t>
-            </a:r>
+              <a:t>Official Spring WS page</a:t>
+            </a:r>
+            <a:endParaRPr lang="en-US" dirty="0"/>
           </a:p>
           <a:p>
             <a:endParaRPr lang="en-US" dirty="0"/>
@@ -20038,12 +21351,9 @@
           <a:lstStyle/>
           <a:p>
             <a:r>
-              <a:rPr lang="en-US" dirty="0">
-                <a:hlinkClick r:id="rId4"/>
-              </a:rPr>
-              <a:t>https://jquery.com/</a:t>
-            </a:r>
-            <a:endParaRPr lang="en-US" dirty="0"/>
+              <a:rPr lang="en-US" dirty="0"/>
+              <a:t>http://projects.spring.io/spring-ws/</a:t>
+            </a:r>
           </a:p>
         </p:txBody>
       </p:sp>
@@ -20072,10 +21382,18 @@
           <a:p>
             <a:pPr algn="l"/>
             <a:r>
-              <a:rPr lang="en-US" dirty="0" smtClean="0"/>
+              <a:rPr lang="en-US" dirty="0" smtClean="0">
+                <a:solidFill>
+                  <a:schemeClr val="bg1"/>
+                </a:solidFill>
+              </a:rPr>
               <a:t>References</a:t>
             </a:r>
-            <a:endParaRPr lang="en-US" dirty="0"/>
+            <a:endParaRPr lang="en-US" dirty="0">
+              <a:solidFill>
+                <a:schemeClr val="bg1"/>
+              </a:solidFill>
+            </a:endParaRPr>
           </a:p>
         </p:txBody>
       </p:sp>
@@ -20135,24 +21453,12 @@
               <a:rPr lang="en-US" sz="9600" dirty="0" smtClean="0"/>
               <a:t>1</a:t>
             </a:r>
-            <a:r>
-              <a:rPr lang="en-US" sz="9600" dirty="0" smtClean="0"/>
-              <a:t/>
-            </a:r>
             <a:br>
               <a:rPr lang="en-US" sz="9600" dirty="0" smtClean="0"/>
             </a:br>
             <a:r>
               <a:rPr lang="en-US" b="1" dirty="0" smtClean="0"/>
-              <a:t>SOAP </a:t>
-            </a:r>
-            <a:r>
-              <a:rPr lang="en-US" b="1" dirty="0" smtClean="0"/>
-              <a:t>Web </a:t>
-            </a:r>
-            <a:r>
-              <a:rPr lang="en-US" b="1" dirty="0" smtClean="0"/>
-              <a:t>Services in nutshell</a:t>
+              <a:t>SOAP Web Services in nutshell</a:t>
             </a:r>
             <a:endParaRPr lang="en-US" dirty="0"/>
           </a:p>
@@ -20212,7 +21518,15 @@
           <a:p>
             <a:r>
               <a:rPr lang="en-US" dirty="0"/>
-              <a:t>A web service is a network accessible interface to application functionality, built using standard Internet technologies</a:t>
+              <a:t>A web service is a network accessible interface to application functionality, built using standard Internet </a:t>
+            </a:r>
+            <a:r>
+              <a:rPr lang="en-US" dirty="0" smtClean="0"/>
+              <a:t>technologies.</a:t>
+            </a:r>
+            <a:r>
+              <a:rPr lang="en-US" dirty="0"/>
+              <a:t/>
             </a:r>
             <a:br>
               <a:rPr lang="en-US" dirty="0"/>
@@ -20238,11 +21552,7 @@
           <a:p>
             <a:r>
               <a:rPr lang="en-US" dirty="0" smtClean="0"/>
-              <a:t>What are </a:t>
-            </a:r>
-            <a:r>
-              <a:rPr lang="en-US" dirty="0" smtClean="0"/>
-              <a:t>Web Services?</a:t>
+              <a:t>What are Web Services?</a:t>
             </a:r>
             <a:endParaRPr lang="en-US" dirty="0"/>
           </a:p>
@@ -20250,7 +21560,7 @@
       </p:sp>
       <p:pic>
         <p:nvPicPr>
-          <p:cNvPr id="5" name="Imagen 4"/>
+          <p:cNvPr id="4" name="Picture 3"/>
           <p:cNvPicPr>
             <a:picLocks noChangeAspect="1"/>
           </p:cNvPicPr>
@@ -20264,8 +21574,8 @@
         </p:blipFill>
         <p:spPr>
           <a:xfrm>
-            <a:off x="675720" y="3124200"/>
-            <a:ext cx="7781925" cy="2257425"/>
+            <a:off x="611426" y="2895600"/>
+            <a:ext cx="7910513" cy="2514600"/>
           </a:xfrm>
           <a:prstGeom prst="rect">
             <a:avLst/>
@@ -20343,15 +21653,7 @@
           <a:p>
             <a:r>
               <a:rPr lang="en-US" dirty="0" smtClean="0"/>
-              <a:t>SOAP </a:t>
-            </a:r>
-            <a:r>
-              <a:rPr lang="en-US" dirty="0" smtClean="0"/>
-              <a:t>Web services </a:t>
-            </a:r>
-            <a:r>
-              <a:rPr lang="en-US" dirty="0" smtClean="0"/>
-              <a:t>are web services which use </a:t>
+              <a:t>SOAP Web services are web services which use </a:t>
             </a:r>
             <a:r>
               <a:rPr lang="en-US" dirty="0"/>
@@ -20390,11 +21692,7 @@
           <a:p>
             <a:r>
               <a:rPr lang="en-US" dirty="0" smtClean="0"/>
-              <a:t>What are </a:t>
-            </a:r>
-            <a:r>
-              <a:rPr lang="en-US" dirty="0" smtClean="0"/>
-              <a:t>SOAP Web Services?</a:t>
+              <a:t>What are SOAP Web Services?</a:t>
             </a:r>
             <a:endParaRPr lang="en-US" dirty="0"/>
           </a:p>
@@ -20416,7 +21714,7 @@
         </p:blipFill>
         <p:spPr>
           <a:xfrm>
-            <a:off x="2396308" y="2808027"/>
+            <a:off x="2908576" y="2743200"/>
             <a:ext cx="3316213" cy="3485408"/>
           </a:xfrm>
           <a:prstGeom prst="rect">
@@ -20478,149 +21776,40 @@
           <a:p>
             <a:r>
               <a:rPr lang="en-US" dirty="0" smtClean="0"/>
-              <a:t>Characteristics</a:t>
+              <a:t>How does SOAP Web Services work?</a:t>
             </a:r>
             <a:endParaRPr lang="en-US" dirty="0"/>
           </a:p>
         </p:txBody>
       </p:sp>
-      <p:sp>
-        <p:nvSpPr>
-          <p:cNvPr id="15" name="Marcador de contenido 14"/>
-          <p:cNvSpPr>
-            <a:spLocks noGrp="1"/>
-          </p:cNvSpPr>
-          <p:nvPr>
-            <p:ph sz="quarter" idx="10"/>
-          </p:nvPr>
-        </p:nvSpPr>
-        <p:spPr/>
-        <p:txBody>
-          <a:bodyPr/>
-          <a:lstStyle/>
-          <a:p>
-            <a:r>
-              <a:rPr lang="en-US" dirty="0" smtClean="0"/>
-              <a:t>XML </a:t>
-            </a:r>
-            <a:r>
-              <a:rPr lang="en-US" dirty="0"/>
-              <a:t>b</a:t>
-            </a:r>
-            <a:r>
-              <a:rPr lang="en-US" dirty="0" smtClean="0"/>
-              <a:t>ased protocol</a:t>
-            </a:r>
-            <a:endParaRPr lang="en-US" dirty="0" smtClean="0"/>
-          </a:p>
-          <a:p>
-            <a:endParaRPr lang="en-US" dirty="0" smtClean="0"/>
-          </a:p>
-          <a:p>
-            <a:r>
-              <a:rPr lang="es-MX" dirty="0" err="1" smtClean="0"/>
-              <a:t>Loosely</a:t>
-            </a:r>
-            <a:r>
-              <a:rPr lang="es-MX" dirty="0" smtClean="0"/>
-              <a:t> </a:t>
-            </a:r>
-            <a:r>
-              <a:rPr lang="es-MX" dirty="0" err="1"/>
-              <a:t>c</a:t>
-            </a:r>
-            <a:r>
-              <a:rPr lang="es-MX" dirty="0" err="1" smtClean="0"/>
-              <a:t>oupled</a:t>
-            </a:r>
-            <a:endParaRPr lang="es-MX" dirty="0" smtClean="0"/>
-          </a:p>
-          <a:p>
-            <a:endParaRPr lang="es-MX" dirty="0"/>
-          </a:p>
-          <a:p>
-            <a:r>
-              <a:rPr lang="es-MX" dirty="0" err="1"/>
-              <a:t>I</a:t>
-            </a:r>
-            <a:r>
-              <a:rPr lang="es-MX" dirty="0" err="1" smtClean="0"/>
-              <a:t>nteroperability</a:t>
-            </a:r>
-            <a:endParaRPr lang="es-MX" dirty="0" smtClean="0"/>
-          </a:p>
-          <a:p>
-            <a:endParaRPr lang="en-US" dirty="0" smtClean="0"/>
-          </a:p>
-          <a:p>
-            <a:r>
-              <a:rPr lang="es-MX" dirty="0"/>
-              <a:t>S</a:t>
-            </a:r>
-            <a:r>
-              <a:rPr lang="es-MX" dirty="0" smtClean="0"/>
-              <a:t>imple </a:t>
-            </a:r>
-            <a:r>
-              <a:rPr lang="es-MX" dirty="0"/>
-              <a:t>and </a:t>
-            </a:r>
-            <a:r>
-              <a:rPr lang="es-MX" dirty="0" smtClean="0"/>
-              <a:t>extensible</a:t>
-            </a:r>
-          </a:p>
-          <a:p>
-            <a:endParaRPr lang="es-MX" dirty="0"/>
-          </a:p>
-          <a:p>
-            <a:endParaRPr lang="en-US" dirty="0"/>
-          </a:p>
-        </p:txBody>
-      </p:sp>
-      <p:sp>
-        <p:nvSpPr>
-          <p:cNvPr id="3" name="AutoShape 2" descr="Resultado de imagen para xml"/>
-          <p:cNvSpPr>
-            <a:spLocks noChangeAspect="1" noChangeArrowheads="1"/>
-          </p:cNvSpPr>
+      <p:pic>
+        <p:nvPicPr>
+          <p:cNvPr id="6" name="Picture 5"/>
+          <p:cNvPicPr>
+            <a:picLocks noChangeAspect="1"/>
+          </p:cNvPicPr>
           <p:nvPr/>
-        </p:nvSpPr>
-        <p:spPr bwMode="auto">
-          <a:xfrm>
-            <a:off x="155575" y="-144463"/>
-            <a:ext cx="304800" cy="304801"/>
+        </p:nvPicPr>
+        <p:blipFill>
+          <a:blip r:embed="rId2"/>
+          <a:stretch>
+            <a:fillRect/>
+          </a:stretch>
+        </p:blipFill>
+        <p:spPr>
+          <a:xfrm>
+            <a:off x="1579934" y="1981200"/>
+            <a:ext cx="4948961" cy="3562350"/>
           </a:xfrm>
           <a:prstGeom prst="rect">
             <a:avLst/>
           </a:prstGeom>
-          <a:noFill/>
-          <a:extLst>
-            <a:ext uri="{909E8E84-426E-40DD-AFC4-6F175D3DCCD1}">
-              <a14:hiddenFill xmlns:a14="http://schemas.microsoft.com/office/drawing/2010/main">
-                <a:solidFill>
-                  <a:srgbClr val="FFFFFF"/>
-                </a:solidFill>
-              </a14:hiddenFill>
-            </a:ext>
-          </a:extLst>
-        </p:spPr>
-        <p:txBody>
-          <a:bodyPr vert="horz" wrap="square" lIns="91440" tIns="45720" rIns="91440" bIns="45720" numCol="1" anchor="t" anchorCtr="0" compatLnSpc="1">
-            <a:prstTxWarp prst="textNoShape">
-              <a:avLst/>
-            </a:prstTxWarp>
-          </a:bodyPr>
-          <a:lstStyle/>
-          <a:p>
-            <a:endParaRPr lang="en-US"/>
-          </a:p>
-        </p:txBody>
-      </p:sp>
+        </p:spPr>
+      </p:pic>
     </p:spTree>
     <p:extLst>
       <p:ext uri="{BB962C8B-B14F-4D97-AF65-F5344CB8AC3E}">
-        <p14:creationId xmlns:p14="http://schemas.microsoft.com/office/powerpoint/2010/main" val="4039559392"/>
+        <p14:creationId xmlns:p14="http://schemas.microsoft.com/office/powerpoint/2010/main" val="1152802154"/>
       </p:ext>
     </p:extLst>
   </p:cSld>
@@ -20656,7 +21845,7 @@
       </p:grpSpPr>
       <p:sp>
         <p:nvSpPr>
-          <p:cNvPr id="6" name="Title 5"/>
+          <p:cNvPr id="2" name="Title 1"/>
           <p:cNvSpPr>
             <a:spLocks noGrp="1"/>
           </p:cNvSpPr>
@@ -20670,28 +21859,147 @@
           <a:lstStyle/>
           <a:p>
             <a:r>
-              <a:rPr lang="en-US" sz="9600" dirty="0" smtClean="0"/>
-              <a:t>2</a:t>
-            </a:r>
-            <a:r>
-              <a:rPr lang="en-US" sz="9600" dirty="0" smtClean="0"/>
-              <a:t/>
-            </a:r>
-            <a:br>
-              <a:rPr lang="en-US" sz="9600" dirty="0" smtClean="0"/>
-            </a:br>
-            <a:r>
-              <a:rPr lang="en-US" b="1" dirty="0" smtClean="0"/>
-              <a:t>Architecture</a:t>
+              <a:rPr lang="en-US" dirty="0" smtClean="0"/>
+              <a:t>Characteristics</a:t>
             </a:r>
             <a:endParaRPr lang="en-US" dirty="0"/>
+          </a:p>
+        </p:txBody>
+      </p:sp>
+      <p:sp>
+        <p:nvSpPr>
+          <p:cNvPr id="15" name="Marcador de contenido 14"/>
+          <p:cNvSpPr>
+            <a:spLocks noGrp="1"/>
+          </p:cNvSpPr>
+          <p:nvPr>
+            <p:ph sz="quarter" idx="10"/>
+          </p:nvPr>
+        </p:nvSpPr>
+        <p:spPr/>
+        <p:txBody>
+          <a:bodyPr/>
+          <a:lstStyle/>
+          <a:p>
+            <a:r>
+              <a:rPr lang="en-US" dirty="0" smtClean="0"/>
+              <a:t>XML </a:t>
+            </a:r>
+            <a:r>
+              <a:rPr lang="en-US" dirty="0"/>
+              <a:t>b</a:t>
+            </a:r>
+            <a:r>
+              <a:rPr lang="en-US" dirty="0" smtClean="0"/>
+              <a:t>ased protocol.</a:t>
+            </a:r>
+          </a:p>
+          <a:p>
+            <a:endParaRPr lang="en-US" dirty="0" smtClean="0"/>
+          </a:p>
+          <a:p>
+            <a:r>
+              <a:rPr lang="es-MX" dirty="0" err="1" smtClean="0"/>
+              <a:t>Loosely</a:t>
+            </a:r>
+            <a:r>
+              <a:rPr lang="es-MX" dirty="0" smtClean="0"/>
+              <a:t> </a:t>
+            </a:r>
+            <a:r>
+              <a:rPr lang="es-MX" dirty="0" err="1" smtClean="0"/>
+              <a:t>coupled</a:t>
+            </a:r>
+            <a:r>
+              <a:rPr lang="es-MX" dirty="0" smtClean="0"/>
+              <a:t>.</a:t>
+            </a:r>
+          </a:p>
+          <a:p>
+            <a:endParaRPr lang="es-MX" dirty="0"/>
+          </a:p>
+          <a:p>
+            <a:r>
+              <a:rPr lang="es-MX" dirty="0" err="1" smtClean="0"/>
+              <a:t>Interoperability</a:t>
+            </a:r>
+            <a:r>
+              <a:rPr lang="es-MX" dirty="0" smtClean="0"/>
+              <a:t>.</a:t>
+            </a:r>
+          </a:p>
+          <a:p>
+            <a:endParaRPr lang="en-US" dirty="0" smtClean="0"/>
+          </a:p>
+          <a:p>
+            <a:r>
+              <a:rPr lang="es-MX" dirty="0"/>
+              <a:t>S</a:t>
+            </a:r>
+            <a:r>
+              <a:rPr lang="es-MX" dirty="0" smtClean="0"/>
+              <a:t>imple </a:t>
+            </a:r>
+            <a:r>
+              <a:rPr lang="es-MX" dirty="0"/>
+              <a:t>and </a:t>
+            </a:r>
+            <a:r>
+              <a:rPr lang="es-MX" dirty="0" smtClean="0"/>
+              <a:t>extensible.</a:t>
+            </a:r>
+          </a:p>
+          <a:p>
+            <a:endParaRPr lang="es-MX" dirty="0"/>
+          </a:p>
+          <a:p>
+            <a:endParaRPr lang="en-US" dirty="0"/>
+          </a:p>
+        </p:txBody>
+      </p:sp>
+      <p:sp>
+        <p:nvSpPr>
+          <p:cNvPr id="3" name="AutoShape 2" descr="Resultado de imagen para xml"/>
+          <p:cNvSpPr>
+            <a:spLocks noChangeAspect="1" noChangeArrowheads="1"/>
+          </p:cNvSpPr>
+          <p:nvPr/>
+        </p:nvSpPr>
+        <p:spPr bwMode="auto">
+          <a:xfrm>
+            <a:off x="155575" y="-144463"/>
+            <a:ext cx="304800" cy="304801"/>
+          </a:xfrm>
+          <a:prstGeom prst="rect">
+            <a:avLst/>
+          </a:prstGeom>
+          <a:noFill/>
+          <a:extLst>
+            <a:ext uri="{909E8E84-426E-40DD-AFC4-6F175D3DCCD1}">
+              <a14:hiddenFill xmlns:a14="http://schemas.microsoft.com/office/drawing/2010/main">
+                <a:solidFill>
+                  <a:srgbClr val="FFFFFF"/>
+                </a:solidFill>
+              </a14:hiddenFill>
+            </a:ext>
+          </a:extLst>
+        </p:spPr>
+        <p:txBody>
+          <a:bodyPr vert="horz" wrap="square" lIns="91440" tIns="45720" rIns="91440" bIns="45720" numCol="1" anchor="t" anchorCtr="0" compatLnSpc="1">
+            <a:prstTxWarp prst="textNoShape">
+              <a:avLst/>
+            </a:prstTxWarp>
+          </a:bodyPr>
+          <a:lstStyle/>
+          <a:p>
+            <a:endParaRPr lang="en-US"/>
           </a:p>
         </p:txBody>
       </p:sp>
     </p:spTree>
     <p:extLst>
       <p:ext uri="{BB962C8B-B14F-4D97-AF65-F5344CB8AC3E}">
-        <p14:creationId xmlns:p14="http://schemas.microsoft.com/office/powerpoint/2010/main" val="128301367"/>
+        <p14:creationId xmlns:p14="http://schemas.microsoft.com/office/powerpoint/2010/main" val="4039559392"/>
       </p:ext>
     </p:extLst>
   </p:cSld>
@@ -20727,7 +22035,7 @@
       </p:grpSpPr>
       <p:sp>
         <p:nvSpPr>
-          <p:cNvPr id="2" name="Title 1"/>
+          <p:cNvPr id="6" name="Title 5"/>
           <p:cNvSpPr>
             <a:spLocks noGrp="1"/>
           </p:cNvSpPr>
@@ -20741,338 +22049,16 @@
           <a:lstStyle/>
           <a:p>
             <a:r>
-              <a:rPr lang="en-US" dirty="0" smtClean="0"/>
-              <a:t>Components</a:t>
-            </a:r>
-            <a:endParaRPr lang="en-US" dirty="0"/>
-          </a:p>
-        </p:txBody>
-      </p:sp>
-      <p:sp>
-        <p:nvSpPr>
-          <p:cNvPr id="15" name="Marcador de contenido 14"/>
-          <p:cNvSpPr>
-            <a:spLocks noGrp="1"/>
-          </p:cNvSpPr>
-          <p:nvPr>
-            <p:ph sz="quarter" idx="10"/>
-          </p:nvPr>
-        </p:nvSpPr>
-        <p:spPr/>
-        <p:txBody>
-          <a:bodyPr/>
-          <a:lstStyle/>
-          <a:p>
-            <a:endParaRPr lang="es-MX" dirty="0"/>
-          </a:p>
-          <a:p>
-            <a:endParaRPr lang="en-US" dirty="0"/>
-          </a:p>
-        </p:txBody>
-      </p:sp>
-      <p:sp>
-        <p:nvSpPr>
-          <p:cNvPr id="4" name="Marcador de contenido 14"/>
-          <p:cNvSpPr txBox="1">
-            <a:spLocks/>
-          </p:cNvSpPr>
-          <p:nvPr/>
-        </p:nvSpPr>
-        <p:spPr bwMode="auto">
-          <a:xfrm>
-            <a:off x="614627" y="1492189"/>
-            <a:ext cx="8208912" cy="4965019"/>
-          </a:xfrm>
-          <a:prstGeom prst="rect">
-            <a:avLst/>
-          </a:prstGeom>
-          <a:noFill/>
-          <a:ln>
-            <a:noFill/>
-          </a:ln>
-          <a:extLst>
-            <a:ext uri="{909E8E84-426E-40DD-AFC4-6F175D3DCCD1}">
-              <a14:hiddenFill xmlns:a14="http://schemas.microsoft.com/office/drawing/2010/main">
-                <a:solidFill>
-                  <a:srgbClr val="FFFFFF"/>
-                </a:solidFill>
-              </a14:hiddenFill>
-            </a:ext>
-            <a:ext uri="{91240B29-F687-4F45-9708-019B960494DF}">
-              <a14:hiddenLine xmlns:a14="http://schemas.microsoft.com/office/drawing/2010/main" w="9525">
-                <a:solidFill>
-                  <a:srgbClr val="000000"/>
-                </a:solidFill>
-                <a:miter lim="800000"/>
-                <a:headEnd/>
-                <a:tailEnd/>
-              </a14:hiddenLine>
-            </a:ext>
-          </a:extLst>
-        </p:spPr>
-        <p:txBody>
-          <a:bodyPr vert="horz" wrap="square" lIns="91440" tIns="45720" rIns="91440" bIns="45720" numCol="1" anchor="t" anchorCtr="0" compatLnSpc="1">
-            <a:prstTxWarp prst="textNoShape">
-              <a:avLst/>
-            </a:prstTxWarp>
-          </a:bodyPr>
-          <a:lstStyle>
-            <a:lvl1pPr marL="126000" marR="0" indent="-180000" algn="l" defTabSz="914400" rtl="0" eaLnBrk="0" fontAlgn="base" latinLnBrk="0" hangingPunct="0">
-              <a:lnSpc>
-                <a:spcPct val="100000"/>
-              </a:lnSpc>
-              <a:spcBef>
-                <a:spcPct val="20000"/>
-              </a:spcBef>
-              <a:spcAft>
-                <a:spcPct val="0"/>
-              </a:spcAft>
-              <a:buClrTx/>
-              <a:buSzTx/>
-              <a:buFont typeface="Arial Rounded MT Bold" pitchFamily="34" charset="0"/>
-              <a:buChar char="›"/>
-              <a:tabLst/>
-              <a:defRPr kern="1200">
-                <a:solidFill>
-                  <a:schemeClr val="tx1">
-                    <a:lumMod val="75000"/>
-                    <a:lumOff val="25000"/>
-                  </a:schemeClr>
-                </a:solidFill>
-                <a:latin typeface="Arial"/>
-                <a:ea typeface="+mn-ea"/>
-                <a:cs typeface="Arial"/>
-              </a:defRPr>
-            </a:lvl1pPr>
-            <a:lvl2pPr marL="540000" marR="0" indent="-180000" algn="l" defTabSz="914400" rtl="0" eaLnBrk="0" fontAlgn="base" latinLnBrk="0" hangingPunct="0">
-              <a:lnSpc>
-                <a:spcPct val="100000"/>
-              </a:lnSpc>
-              <a:spcBef>
-                <a:spcPct val="20000"/>
-              </a:spcBef>
-              <a:spcAft>
-                <a:spcPct val="0"/>
-              </a:spcAft>
-              <a:buClrTx/>
-              <a:buSzTx/>
-              <a:buFont typeface="Arial Rounded MT Bold" pitchFamily="34" charset="0"/>
-              <a:buChar char="›"/>
-              <a:tabLst/>
-              <a:defRPr sz="1600" kern="1200">
-                <a:solidFill>
-                  <a:schemeClr val="tx1">
-                    <a:lumMod val="75000"/>
-                    <a:lumOff val="25000"/>
-                  </a:schemeClr>
-                </a:solidFill>
-                <a:latin typeface="Arial"/>
-                <a:ea typeface="+mn-ea"/>
-                <a:cs typeface="Arial"/>
-              </a:defRPr>
-            </a:lvl2pPr>
-            <a:lvl3pPr marL="715963" marR="0" indent="-180000" algn="l" defTabSz="914400" rtl="0" eaLnBrk="0" fontAlgn="base" latinLnBrk="0" hangingPunct="0">
-              <a:lnSpc>
-                <a:spcPct val="100000"/>
-              </a:lnSpc>
-              <a:spcBef>
-                <a:spcPct val="20000"/>
-              </a:spcBef>
-              <a:spcAft>
-                <a:spcPct val="0"/>
-              </a:spcAft>
-              <a:buClrTx/>
-              <a:buSzTx/>
-              <a:buFont typeface="Arial Rounded MT Bold" pitchFamily="34" charset="0"/>
-              <a:buChar char="›"/>
-              <a:tabLst/>
-              <a:defRPr sz="1400" kern="1200">
-                <a:solidFill>
-                  <a:schemeClr val="tx1">
-                    <a:lumMod val="75000"/>
-                    <a:lumOff val="25000"/>
-                  </a:schemeClr>
-                </a:solidFill>
-                <a:latin typeface="Arial"/>
-                <a:ea typeface="+mn-ea"/>
-                <a:cs typeface="Arial"/>
-              </a:defRPr>
-            </a:lvl3pPr>
-            <a:lvl4pPr marL="923925" marR="0" indent="-180000" algn="l" defTabSz="914400" rtl="0" eaLnBrk="0" fontAlgn="base" latinLnBrk="0" hangingPunct="0">
-              <a:lnSpc>
-                <a:spcPct val="100000"/>
-              </a:lnSpc>
-              <a:spcBef>
-                <a:spcPct val="20000"/>
-              </a:spcBef>
-              <a:spcAft>
-                <a:spcPct val="0"/>
-              </a:spcAft>
-              <a:buClrTx/>
-              <a:buSzTx/>
-              <a:buFont typeface="Arial Rounded MT Bold" pitchFamily="34" charset="0"/>
-              <a:buChar char="›"/>
-              <a:tabLst/>
-              <a:defRPr sz="1200" kern="1200">
-                <a:solidFill>
-                  <a:schemeClr val="tx1">
-                    <a:lumMod val="75000"/>
-                    <a:lumOff val="25000"/>
-                  </a:schemeClr>
-                </a:solidFill>
-                <a:latin typeface="Arial"/>
-                <a:ea typeface="+mn-ea"/>
-                <a:cs typeface="Arial"/>
-              </a:defRPr>
-            </a:lvl4pPr>
-            <a:lvl5pPr marL="1079500" indent="-77788" algn="l" rtl="0" eaLnBrk="1" fontAlgn="base" hangingPunct="1">
-              <a:spcBef>
-                <a:spcPct val="20000"/>
-              </a:spcBef>
-              <a:spcAft>
-                <a:spcPct val="0"/>
-              </a:spcAft>
-              <a:buFont typeface="Arial Rounded MT Bold" pitchFamily="34" charset="0"/>
-              <a:buChar char="›"/>
-              <a:defRPr sz="1100" kern="1200">
-                <a:solidFill>
-                  <a:schemeClr val="tx1"/>
-                </a:solidFill>
-                <a:latin typeface="Arial" pitchFamily="34" charset="0"/>
-                <a:ea typeface="+mn-ea"/>
-                <a:cs typeface="Arial" pitchFamily="34" charset="0"/>
-              </a:defRPr>
-            </a:lvl5pPr>
-            <a:lvl6pPr marL="2514600" indent="-228600" algn="l" defTabSz="914400" rtl="0" eaLnBrk="1" latinLnBrk="0" hangingPunct="1">
-              <a:spcBef>
-                <a:spcPct val="20000"/>
-              </a:spcBef>
-              <a:buFont typeface="Arial" pitchFamily="34" charset="0"/>
-              <a:buChar char="•"/>
-              <a:defRPr sz="2000" kern="1200">
-                <a:solidFill>
-                  <a:schemeClr val="tx1"/>
-                </a:solidFill>
-                <a:latin typeface="+mn-lt"/>
-                <a:ea typeface="+mn-ea"/>
-                <a:cs typeface="+mn-cs"/>
-              </a:defRPr>
-            </a:lvl6pPr>
-            <a:lvl7pPr marL="2971800" indent="-228600" algn="l" defTabSz="914400" rtl="0" eaLnBrk="1" latinLnBrk="0" hangingPunct="1">
-              <a:spcBef>
-                <a:spcPct val="20000"/>
-              </a:spcBef>
-              <a:buFont typeface="Arial" pitchFamily="34" charset="0"/>
-              <a:buChar char="•"/>
-              <a:defRPr sz="2000" kern="1200">
-                <a:solidFill>
-                  <a:schemeClr val="tx1"/>
-                </a:solidFill>
-                <a:latin typeface="+mn-lt"/>
-                <a:ea typeface="+mn-ea"/>
-                <a:cs typeface="+mn-cs"/>
-              </a:defRPr>
-            </a:lvl7pPr>
-            <a:lvl8pPr marL="3429000" indent="-228600" algn="l" defTabSz="914400" rtl="0" eaLnBrk="1" latinLnBrk="0" hangingPunct="1">
-              <a:spcBef>
-                <a:spcPct val="20000"/>
-              </a:spcBef>
-              <a:buFont typeface="Arial" pitchFamily="34" charset="0"/>
-              <a:buChar char="•"/>
-              <a:defRPr sz="2000" kern="1200">
-                <a:solidFill>
-                  <a:schemeClr val="tx1"/>
-                </a:solidFill>
-                <a:latin typeface="+mn-lt"/>
-                <a:ea typeface="+mn-ea"/>
-                <a:cs typeface="+mn-cs"/>
-              </a:defRPr>
-            </a:lvl8pPr>
-            <a:lvl9pPr marL="3886200" indent="-228600" algn="l" defTabSz="914400" rtl="0" eaLnBrk="1" latinLnBrk="0" hangingPunct="1">
-              <a:spcBef>
-                <a:spcPct val="20000"/>
-              </a:spcBef>
-              <a:buFont typeface="Arial" pitchFamily="34" charset="0"/>
-              <a:buChar char="•"/>
-              <a:defRPr sz="2000" kern="1200">
-                <a:solidFill>
-                  <a:schemeClr val="tx1"/>
-                </a:solidFill>
-                <a:latin typeface="+mn-lt"/>
-                <a:ea typeface="+mn-ea"/>
-                <a:cs typeface="+mn-cs"/>
-              </a:defRPr>
-            </a:lvl9pPr>
-          </a:lstStyle>
-          <a:p>
-            <a:r>
-              <a:rPr lang="en-US" dirty="0" smtClean="0"/>
-              <a:t>WSDL</a:t>
-            </a:r>
-          </a:p>
-          <a:p>
-            <a:endParaRPr lang="es-MX" dirty="0" smtClean="0"/>
-          </a:p>
-          <a:p>
-            <a:r>
-              <a:rPr lang="es-MX" dirty="0" smtClean="0"/>
-              <a:t>XSD</a:t>
-            </a:r>
-          </a:p>
-          <a:p>
-            <a:endParaRPr lang="es-MX" dirty="0"/>
-          </a:p>
-          <a:p>
-            <a:r>
-              <a:rPr lang="es-MX" dirty="0" smtClean="0"/>
-              <a:t>SOAP </a:t>
-            </a:r>
-            <a:r>
-              <a:rPr lang="en-US" dirty="0" smtClean="0"/>
-              <a:t>request and </a:t>
-            </a:r>
-            <a:r>
-              <a:rPr lang="es-MX" dirty="0" smtClean="0"/>
-              <a:t>SOAP response</a:t>
-            </a:r>
-          </a:p>
-          <a:p>
-            <a:endParaRPr lang="es-MX" dirty="0"/>
-          </a:p>
-          <a:p>
-            <a:r>
-              <a:rPr lang="en-US" dirty="0" smtClean="0"/>
-              <a:t>Provider</a:t>
-            </a:r>
-          </a:p>
-          <a:p>
-            <a:endParaRPr lang="es-MX" dirty="0"/>
-          </a:p>
-          <a:p>
-            <a:r>
-              <a:rPr lang="en-US" dirty="0" smtClean="0"/>
-              <a:t>Consumer</a:t>
-            </a:r>
-          </a:p>
-          <a:p>
-            <a:endParaRPr lang="en-US" dirty="0"/>
-          </a:p>
-          <a:p>
-            <a:r>
-              <a:rPr lang="en-US" dirty="0" smtClean="0"/>
-              <a:t>UUDI</a:t>
-            </a:r>
-          </a:p>
-          <a:p>
-            <a:endParaRPr lang="es-MX" dirty="0"/>
-          </a:p>
-          <a:p>
-            <a:endParaRPr lang="es-MX" dirty="0" smtClean="0"/>
-          </a:p>
-          <a:p>
-            <a:endParaRPr lang="es-MX" dirty="0" smtClean="0"/>
-          </a:p>
-          <a:p>
+              <a:rPr lang="en-US" sz="9600" dirty="0" smtClean="0"/>
+              <a:t>2</a:t>
+            </a:r>
+            <a:br>
+              <a:rPr lang="en-US" sz="9600" dirty="0" smtClean="0"/>
+            </a:br>
+            <a:r>
+              <a:rPr lang="en-US" b="1" dirty="0" smtClean="0"/>
+              <a:t>Architecture</a:t>
+            </a:r>
             <a:endParaRPr lang="en-US" dirty="0"/>
           </a:p>
         </p:txBody>
@@ -21080,7 +22066,7 @@
     </p:spTree>
     <p:extLst>
       <p:ext uri="{BB962C8B-B14F-4D97-AF65-F5344CB8AC3E}">
-        <p14:creationId xmlns:p14="http://schemas.microsoft.com/office/powerpoint/2010/main" val="3378269734"/>
+        <p14:creationId xmlns:p14="http://schemas.microsoft.com/office/powerpoint/2010/main" val="128301367"/>
       </p:ext>
     </p:extLst>
   </p:cSld>
@@ -21131,7 +22117,7 @@
           <a:p>
             <a:r>
               <a:rPr lang="en-US" dirty="0" smtClean="0"/>
-              <a:t>Architecture</a:t>
+              <a:t>Components</a:t>
             </a:r>
             <a:endParaRPr lang="en-US" dirty="0"/>
           </a:p>
@@ -21159,34 +22145,317 @@
           </a:p>
         </p:txBody>
       </p:sp>
-      <p:pic>
-        <p:nvPicPr>
-          <p:cNvPr id="3" name="Imagen 2"/>
-          <p:cNvPicPr>
-            <a:picLocks noChangeAspect="1"/>
-          </p:cNvPicPr>
+      <p:sp>
+        <p:nvSpPr>
+          <p:cNvPr id="4" name="Marcador de contenido 14"/>
+          <p:cNvSpPr txBox="1">
+            <a:spLocks/>
+          </p:cNvSpPr>
           <p:nvPr/>
-        </p:nvPicPr>
-        <p:blipFill>
-          <a:blip r:embed="rId2"/>
-          <a:stretch>
-            <a:fillRect/>
-          </a:stretch>
-        </p:blipFill>
-        <p:spPr>
-          <a:xfrm>
-            <a:off x="604283" y="1828800"/>
-            <a:ext cx="7924800" cy="3589468"/>
+        </p:nvSpPr>
+        <p:spPr bwMode="auto">
+          <a:xfrm>
+            <a:off x="614627" y="1492189"/>
+            <a:ext cx="8208912" cy="4965019"/>
           </a:xfrm>
           <a:prstGeom prst="rect">
             <a:avLst/>
           </a:prstGeom>
-        </p:spPr>
-      </p:pic>
+          <a:noFill/>
+          <a:ln>
+            <a:noFill/>
+          </a:ln>
+          <a:extLst>
+            <a:ext uri="{909E8E84-426E-40DD-AFC4-6F175D3DCCD1}">
+              <a14:hiddenFill xmlns:a14="http://schemas.microsoft.com/office/drawing/2010/main">
+                <a:solidFill>
+                  <a:srgbClr val="FFFFFF"/>
+                </a:solidFill>
+              </a14:hiddenFill>
+            </a:ext>
+            <a:ext uri="{91240B29-F687-4F45-9708-019B960494DF}">
+              <a14:hiddenLine xmlns:a14="http://schemas.microsoft.com/office/drawing/2010/main" w="9525">
+                <a:solidFill>
+                  <a:srgbClr val="000000"/>
+                </a:solidFill>
+                <a:miter lim="800000"/>
+                <a:headEnd/>
+                <a:tailEnd/>
+              </a14:hiddenLine>
+            </a:ext>
+          </a:extLst>
+        </p:spPr>
+        <p:txBody>
+          <a:bodyPr vert="horz" wrap="square" lIns="91440" tIns="45720" rIns="91440" bIns="45720" numCol="1" anchor="t" anchorCtr="0" compatLnSpc="1">
+            <a:prstTxWarp prst="textNoShape">
+              <a:avLst/>
+            </a:prstTxWarp>
+          </a:bodyPr>
+          <a:lstStyle>
+            <a:lvl1pPr marL="126000" marR="0" indent="-180000" algn="l" defTabSz="914400" rtl="0" eaLnBrk="0" fontAlgn="base" latinLnBrk="0" hangingPunct="0">
+              <a:lnSpc>
+                <a:spcPct val="100000"/>
+              </a:lnSpc>
+              <a:spcBef>
+                <a:spcPct val="20000"/>
+              </a:spcBef>
+              <a:spcAft>
+                <a:spcPct val="0"/>
+              </a:spcAft>
+              <a:buClrTx/>
+              <a:buSzTx/>
+              <a:buFont typeface="Arial Rounded MT Bold" pitchFamily="34" charset="0"/>
+              <a:buChar char="›"/>
+              <a:tabLst/>
+              <a:defRPr kern="1200">
+                <a:solidFill>
+                  <a:schemeClr val="tx1">
+                    <a:lumMod val="75000"/>
+                    <a:lumOff val="25000"/>
+                  </a:schemeClr>
+                </a:solidFill>
+                <a:latin typeface="Arial"/>
+                <a:ea typeface="+mn-ea"/>
+                <a:cs typeface="Arial"/>
+              </a:defRPr>
+            </a:lvl1pPr>
+            <a:lvl2pPr marL="540000" marR="0" indent="-180000" algn="l" defTabSz="914400" rtl="0" eaLnBrk="0" fontAlgn="base" latinLnBrk="0" hangingPunct="0">
+              <a:lnSpc>
+                <a:spcPct val="100000"/>
+              </a:lnSpc>
+              <a:spcBef>
+                <a:spcPct val="20000"/>
+              </a:spcBef>
+              <a:spcAft>
+                <a:spcPct val="0"/>
+              </a:spcAft>
+              <a:buClrTx/>
+              <a:buSzTx/>
+              <a:buFont typeface="Arial Rounded MT Bold" pitchFamily="34" charset="0"/>
+              <a:buChar char="›"/>
+              <a:tabLst/>
+              <a:defRPr sz="1600" kern="1200">
+                <a:solidFill>
+                  <a:schemeClr val="tx1">
+                    <a:lumMod val="75000"/>
+                    <a:lumOff val="25000"/>
+                  </a:schemeClr>
+                </a:solidFill>
+                <a:latin typeface="Arial"/>
+                <a:ea typeface="+mn-ea"/>
+                <a:cs typeface="Arial"/>
+              </a:defRPr>
+            </a:lvl2pPr>
+            <a:lvl3pPr marL="715963" marR="0" indent="-180000" algn="l" defTabSz="914400" rtl="0" eaLnBrk="0" fontAlgn="base" latinLnBrk="0" hangingPunct="0">
+              <a:lnSpc>
+                <a:spcPct val="100000"/>
+              </a:lnSpc>
+              <a:spcBef>
+                <a:spcPct val="20000"/>
+              </a:spcBef>
+              <a:spcAft>
+                <a:spcPct val="0"/>
+              </a:spcAft>
+              <a:buClrTx/>
+              <a:buSzTx/>
+              <a:buFont typeface="Arial Rounded MT Bold" pitchFamily="34" charset="0"/>
+              <a:buChar char="›"/>
+              <a:tabLst/>
+              <a:defRPr sz="1400" kern="1200">
+                <a:solidFill>
+                  <a:schemeClr val="tx1">
+                    <a:lumMod val="75000"/>
+                    <a:lumOff val="25000"/>
+                  </a:schemeClr>
+                </a:solidFill>
+                <a:latin typeface="Arial"/>
+                <a:ea typeface="+mn-ea"/>
+                <a:cs typeface="Arial"/>
+              </a:defRPr>
+            </a:lvl3pPr>
+            <a:lvl4pPr marL="923925" marR="0" indent="-180000" algn="l" defTabSz="914400" rtl="0" eaLnBrk="0" fontAlgn="base" latinLnBrk="0" hangingPunct="0">
+              <a:lnSpc>
+                <a:spcPct val="100000"/>
+              </a:lnSpc>
+              <a:spcBef>
+                <a:spcPct val="20000"/>
+              </a:spcBef>
+              <a:spcAft>
+                <a:spcPct val="0"/>
+              </a:spcAft>
+              <a:buClrTx/>
+              <a:buSzTx/>
+              <a:buFont typeface="Arial Rounded MT Bold" pitchFamily="34" charset="0"/>
+              <a:buChar char="›"/>
+              <a:tabLst/>
+              <a:defRPr sz="1200" kern="1200">
+                <a:solidFill>
+                  <a:schemeClr val="tx1">
+                    <a:lumMod val="75000"/>
+                    <a:lumOff val="25000"/>
+                  </a:schemeClr>
+                </a:solidFill>
+                <a:latin typeface="Arial"/>
+                <a:ea typeface="+mn-ea"/>
+                <a:cs typeface="Arial"/>
+              </a:defRPr>
+            </a:lvl4pPr>
+            <a:lvl5pPr marL="1079500" indent="-77788" algn="l" rtl="0" eaLnBrk="1" fontAlgn="base" hangingPunct="1">
+              <a:spcBef>
+                <a:spcPct val="20000"/>
+              </a:spcBef>
+              <a:spcAft>
+                <a:spcPct val="0"/>
+              </a:spcAft>
+              <a:buFont typeface="Arial Rounded MT Bold" pitchFamily="34" charset="0"/>
+              <a:buChar char="›"/>
+              <a:defRPr sz="1100" kern="1200">
+                <a:solidFill>
+                  <a:schemeClr val="tx1"/>
+                </a:solidFill>
+                <a:latin typeface="Arial" pitchFamily="34" charset="0"/>
+                <a:ea typeface="+mn-ea"/>
+                <a:cs typeface="Arial" pitchFamily="34" charset="0"/>
+              </a:defRPr>
+            </a:lvl5pPr>
+            <a:lvl6pPr marL="2514600" indent="-228600" algn="l" defTabSz="914400" rtl="0" eaLnBrk="1" latinLnBrk="0" hangingPunct="1">
+              <a:spcBef>
+                <a:spcPct val="20000"/>
+              </a:spcBef>
+              <a:buFont typeface="Arial" pitchFamily="34" charset="0"/>
+              <a:buChar char="•"/>
+              <a:defRPr sz="2000" kern="1200">
+                <a:solidFill>
+                  <a:schemeClr val="tx1"/>
+                </a:solidFill>
+                <a:latin typeface="+mn-lt"/>
+                <a:ea typeface="+mn-ea"/>
+                <a:cs typeface="+mn-cs"/>
+              </a:defRPr>
+            </a:lvl6pPr>
+            <a:lvl7pPr marL="2971800" indent="-228600" algn="l" defTabSz="914400" rtl="0" eaLnBrk="1" latinLnBrk="0" hangingPunct="1">
+              <a:spcBef>
+                <a:spcPct val="20000"/>
+              </a:spcBef>
+              <a:buFont typeface="Arial" pitchFamily="34" charset="0"/>
+              <a:buChar char="•"/>
+              <a:defRPr sz="2000" kern="1200">
+                <a:solidFill>
+                  <a:schemeClr val="tx1"/>
+                </a:solidFill>
+                <a:latin typeface="+mn-lt"/>
+                <a:ea typeface="+mn-ea"/>
+                <a:cs typeface="+mn-cs"/>
+              </a:defRPr>
+            </a:lvl7pPr>
+            <a:lvl8pPr marL="3429000" indent="-228600" algn="l" defTabSz="914400" rtl="0" eaLnBrk="1" latinLnBrk="0" hangingPunct="1">
+              <a:spcBef>
+                <a:spcPct val="20000"/>
+              </a:spcBef>
+              <a:buFont typeface="Arial" pitchFamily="34" charset="0"/>
+              <a:buChar char="•"/>
+              <a:defRPr sz="2000" kern="1200">
+                <a:solidFill>
+                  <a:schemeClr val="tx1"/>
+                </a:solidFill>
+                <a:latin typeface="+mn-lt"/>
+                <a:ea typeface="+mn-ea"/>
+                <a:cs typeface="+mn-cs"/>
+              </a:defRPr>
+            </a:lvl8pPr>
+            <a:lvl9pPr marL="3886200" indent="-228600" algn="l" defTabSz="914400" rtl="0" eaLnBrk="1" latinLnBrk="0" hangingPunct="1">
+              <a:spcBef>
+                <a:spcPct val="20000"/>
+              </a:spcBef>
+              <a:buFont typeface="Arial" pitchFamily="34" charset="0"/>
+              <a:buChar char="•"/>
+              <a:defRPr sz="2000" kern="1200">
+                <a:solidFill>
+                  <a:schemeClr val="tx1"/>
+                </a:solidFill>
+                <a:latin typeface="+mn-lt"/>
+                <a:ea typeface="+mn-ea"/>
+                <a:cs typeface="+mn-cs"/>
+              </a:defRPr>
+            </a:lvl9pPr>
+          </a:lstStyle>
+          <a:p>
+            <a:r>
+              <a:rPr lang="en-US" dirty="0" smtClean="0"/>
+              <a:t>WSDL.</a:t>
+            </a:r>
+          </a:p>
+          <a:p>
+            <a:endParaRPr lang="es-MX" dirty="0" smtClean="0"/>
+          </a:p>
+          <a:p>
+            <a:r>
+              <a:rPr lang="es-MX" dirty="0" smtClean="0"/>
+              <a:t>XSD.</a:t>
+            </a:r>
+          </a:p>
+          <a:p>
+            <a:endParaRPr lang="es-MX" dirty="0"/>
+          </a:p>
+          <a:p>
+            <a:r>
+              <a:rPr lang="es-MX" dirty="0" smtClean="0"/>
+              <a:t>SOAP </a:t>
+            </a:r>
+            <a:r>
+              <a:rPr lang="en-US" dirty="0" smtClean="0"/>
+              <a:t>request and </a:t>
+            </a:r>
+            <a:r>
+              <a:rPr lang="es-MX" dirty="0" smtClean="0"/>
+              <a:t>SOAP response.</a:t>
+            </a:r>
+          </a:p>
+          <a:p>
+            <a:endParaRPr lang="es-MX" dirty="0"/>
+          </a:p>
+          <a:p>
+            <a:r>
+              <a:rPr lang="en-US" dirty="0" smtClean="0"/>
+              <a:t>Provider.</a:t>
+            </a:r>
+          </a:p>
+          <a:p>
+            <a:endParaRPr lang="es-MX" dirty="0"/>
+          </a:p>
+          <a:p>
+            <a:r>
+              <a:rPr lang="en-US" dirty="0" smtClean="0"/>
+              <a:t>Consumer.</a:t>
+            </a:r>
+          </a:p>
+          <a:p>
+            <a:endParaRPr lang="en-US" dirty="0"/>
+          </a:p>
+          <a:p>
+            <a:r>
+              <a:rPr lang="en-US" dirty="0" smtClean="0"/>
+              <a:t>UUDI.</a:t>
+            </a:r>
+          </a:p>
+          <a:p>
+            <a:endParaRPr lang="es-MX" dirty="0"/>
+          </a:p>
+          <a:p>
+            <a:endParaRPr lang="es-MX" dirty="0" smtClean="0"/>
+          </a:p>
+          <a:p>
+            <a:endParaRPr lang="es-MX" dirty="0" smtClean="0"/>
+          </a:p>
+          <a:p>
+            <a:endParaRPr lang="en-US" dirty="0"/>
+          </a:p>
+        </p:txBody>
+      </p:sp>
     </p:spTree>
     <p:extLst>
       <p:ext uri="{BB962C8B-B14F-4D97-AF65-F5344CB8AC3E}">
-        <p14:creationId xmlns:p14="http://schemas.microsoft.com/office/powerpoint/2010/main" val="1064482346"/>
+        <p14:creationId xmlns:p14="http://schemas.microsoft.com/office/powerpoint/2010/main" val="3378269734"/>
       </p:ext>
     </p:extLst>
   </p:cSld>
@@ -22229,4 +23498,47 @@
   <a:objectDefaults/>
   <a:extraClrSchemeLst/>
 </a:theme>
+</file>
+
+<file path=ppt/theme/themeOverride1.xml><?xml version="1.0" encoding="utf-8"?>
+<a:themeOverride xmlns:a="http://schemas.openxmlformats.org/drawingml/2006/main">
+  <a:clrScheme name="Custom 2">
+    <a:dk1>
+      <a:srgbClr val="2B2D2E"/>
+    </a:dk1>
+    <a:lt1>
+      <a:srgbClr val="FFFFFF"/>
+    </a:lt1>
+    <a:dk2>
+      <a:srgbClr val="008CD2"/>
+    </a:dk2>
+    <a:lt2>
+      <a:srgbClr val="FFFFFF"/>
+    </a:lt2>
+    <a:accent1>
+      <a:srgbClr val="FF6600"/>
+    </a:accent1>
+    <a:accent2>
+      <a:srgbClr val="004569"/>
+    </a:accent2>
+    <a:accent3>
+      <a:srgbClr val="00CC66"/>
+    </a:accent3>
+    <a:accent4>
+      <a:srgbClr val="C90000"/>
+    </a:accent4>
+    <a:accent5>
+      <a:srgbClr val="841A7C"/>
+    </a:accent5>
+    <a:accent6>
+      <a:srgbClr val="1CA49D"/>
+    </a:accent6>
+    <a:hlink>
+      <a:srgbClr val="00B0F0"/>
+    </a:hlink>
+    <a:folHlink>
+      <a:srgbClr val="575A5D"/>
+    </a:folHlink>
+  </a:clrScheme>
+</a:themeOverride>
 </file>
</xml_diff>

<commit_message>
[PPT] Adding xpath and jaxb
</commit_message>
<xml_diff>
--- a/SOAP/doc/SOAP.pptx
+++ b/SOAP/doc/SOAP.pptx
@@ -7,7 +7,7 @@
     <p:sldMasterId id="2147483683" r:id="rId3"/>
   </p:sldMasterIdLst>
   <p:notesMasterIdLst>
-    <p:notesMasterId r:id="rId37"/>
+    <p:notesMasterId r:id="rId41"/>
   </p:notesMasterIdLst>
   <p:sldIdLst>
     <p:sldId id="256" r:id="rId4"/>
@@ -40,9 +40,13 @@
     <p:sldId id="415" r:id="rId31"/>
     <p:sldId id="424" r:id="rId32"/>
     <p:sldId id="423" r:id="rId33"/>
-    <p:sldId id="405" r:id="rId34"/>
-    <p:sldId id="403" r:id="rId35"/>
-    <p:sldId id="404" r:id="rId36"/>
+    <p:sldId id="432" r:id="rId34"/>
+    <p:sldId id="433" r:id="rId35"/>
+    <p:sldId id="434" r:id="rId36"/>
+    <p:sldId id="435" r:id="rId37"/>
+    <p:sldId id="405" r:id="rId38"/>
+    <p:sldId id="403" r:id="rId39"/>
+    <p:sldId id="404" r:id="rId40"/>
   </p:sldIdLst>
   <p:sldSz cx="9144000" cy="6858000" type="screen4x3"/>
   <p:notesSz cx="6858000" cy="9144000"/>
@@ -188,6 +192,10 @@
             <p14:sldId id="415"/>
             <p14:sldId id="424"/>
             <p14:sldId id="423"/>
+            <p14:sldId id="432"/>
+            <p14:sldId id="433"/>
+            <p14:sldId id="434"/>
+            <p14:sldId id="435"/>
             <p14:sldId id="405"/>
             <p14:sldId id="403"/>
             <p14:sldId id="404"/>
@@ -295,7 +303,7 @@
           <a:p>
             <a:fld id="{C12A86BB-B91D-4109-9037-CC50C5C80585}" type="datetimeFigureOut">
               <a:rPr lang="en-US" smtClean="0"/>
-              <a:t>10/20/2015</a:t>
+              <a:t>10/21/2015</a:t>
             </a:fld>
             <a:endParaRPr lang="en-US"/>
           </a:p>
@@ -7258,7 +7266,7 @@
           <a:p>
             <a:fld id="{748BD116-2C56-4960-9148-E30902D398A4}" type="datetimeFigureOut">
               <a:rPr lang="en-US" smtClean="0"/>
-              <a:t>10/20/2015</a:t>
+              <a:t>10/21/2015</a:t>
             </a:fld>
             <a:endParaRPr lang="en-US"/>
           </a:p>
@@ -13137,7 +13145,7 @@
           <a:p>
             <a:fld id="{748BD116-2C56-4960-9148-E30902D398A4}" type="datetimeFigureOut">
               <a:rPr lang="en-US" smtClean="0"/>
-              <a:t>10/20/2015</a:t>
+              <a:t>10/21/2015</a:t>
             </a:fld>
             <a:endParaRPr lang="en-US"/>
           </a:p>
@@ -15741,7 +15749,7 @@
           <a:p>
             <a:fld id="{748BD116-2C56-4960-9148-E30902D398A4}" type="datetimeFigureOut">
               <a:rPr lang="en-US" smtClean="0"/>
-              <a:t>10/20/2015</a:t>
+              <a:t>10/21/2015</a:t>
             </a:fld>
             <a:endParaRPr lang="en-US"/>
           </a:p>
@@ -19366,11 +19374,7 @@
             <a:pPr marL="285750" indent="-285750"/>
             <a:r>
               <a:rPr lang="en-US" dirty="0"/>
-              <a:t>Is the </a:t>
-            </a:r>
-            <a:r>
-              <a:rPr lang="en-US" dirty="0"/>
-              <a:t>root element of all WSDL documents. </a:t>
+              <a:t>Is the root element of all WSDL documents. </a:t>
             </a:r>
             <a:endParaRPr lang="en-US" dirty="0" smtClean="0"/>
           </a:p>
@@ -19809,7 +19813,6 @@
               <a:rPr lang="en-US" dirty="0"/>
               <a:t>WSDL Message</a:t>
             </a:r>
-            <a:endParaRPr lang="en-US" dirty="0"/>
           </a:p>
         </p:txBody>
       </p:sp>
@@ -20451,7 +20454,6 @@
               <a:rPr lang="en-US" dirty="0"/>
               <a:t>Each operation refers to an input message and output messages</a:t>
             </a:r>
-            <a:endParaRPr lang="en-US" dirty="0"/>
           </a:p>
         </p:txBody>
       </p:sp>
@@ -20785,7 +20787,6 @@
               <a:rPr lang="en-US" dirty="0"/>
               <a:t>concrete protocol and data formats for the operations and messages defined for a particular port type.</a:t>
             </a:r>
-            <a:endParaRPr lang="en-US" dirty="0"/>
           </a:p>
         </p:txBody>
       </p:sp>
@@ -21157,7 +21158,6 @@
               <a:rPr lang="en-US" dirty="0"/>
               <a:t>a combination of a binding and a network address, providing the target address of the service communication</a:t>
             </a:r>
-            <a:endParaRPr lang="en-US" dirty="0"/>
           </a:p>
         </p:txBody>
       </p:sp>
@@ -26461,11 +26461,7 @@
             </a:pPr>
             <a:r>
               <a:rPr lang="en-US" sz="1400" dirty="0" smtClean="0"/>
-              <a:t>Implementing </a:t>
-            </a:r>
-            <a:r>
-              <a:rPr lang="en-US" sz="1400" dirty="0" smtClean="0"/>
-              <a:t>Endpoint. Create java class for handling SOAP request and SOAP response (@Endpoint, </a:t>
+              <a:t>Implementing Endpoint. Create java class for handling SOAP request and SOAP response (@Endpoint, </a:t>
             </a:r>
             <a:r>
               <a:rPr lang="en-US" sz="1400" dirty="0"/>
@@ -26497,13 +26493,24 @@
             </a:r>
             <a:r>
               <a:rPr lang="en-US" sz="1400" dirty="0" err="1" smtClean="0"/>
+              <a:t>XPathParam</a:t>
+            </a:r>
+            <a:r>
+              <a:rPr lang="en-US" sz="1400" dirty="0" smtClean="0"/>
+              <a:t>, </a:t>
+            </a:r>
+            <a:r>
+              <a:rPr lang="en-US" sz="1400" dirty="0" smtClean="0"/>
+              <a:t>@</a:t>
+            </a:r>
+            <a:r>
+              <a:rPr lang="en-US" sz="1400" dirty="0" err="1" smtClean="0"/>
               <a:t>ResponsePayload</a:t>
             </a:r>
             <a:r>
               <a:rPr lang="en-US" sz="1400" dirty="0" smtClean="0"/>
               <a:t>).</a:t>
             </a:r>
-            <a:endParaRPr lang="en-US" sz="1400" dirty="0" smtClean="0"/>
           </a:p>
           <a:p>
             <a:pPr marL="756900" lvl="1" indent="-342900">
@@ -26617,45 +26624,48 @@
       </p:grpSpPr>
       <p:sp>
         <p:nvSpPr>
-          <p:cNvPr id="4" name="Slide Number Placeholder 3"/>
+          <p:cNvPr id="2" name="Title 1"/>
           <p:cNvSpPr>
             <a:spLocks noGrp="1"/>
           </p:cNvSpPr>
           <p:nvPr>
-            <p:ph type="sldNum" sz="quarter" idx="4294967295"/>
+            <p:ph type="title"/>
           </p:nvPr>
         </p:nvSpPr>
-        <p:spPr>
-          <a:xfrm>
-            <a:off x="0" y="6519863"/>
-            <a:ext cx="360363" cy="222250"/>
-          </a:xfrm>
-          <a:prstGeom prst="rect">
-            <a:avLst/>
-          </a:prstGeom>
-        </p:spPr>
-        <p:txBody>
-          <a:bodyPr/>
+        <p:spPr/>
+        <p:txBody>
+          <a:bodyPr>
+            <a:normAutofit/>
+          </a:bodyPr>
           <a:lstStyle/>
           <a:p>
-            <a:pPr>
-              <a:defRPr/>
-            </a:pPr>
-            <a:fld id="{4AD834FB-D050-4DAD-A587-98ECF1E1D3D9}" type="slidenum">
-              <a:rPr lang="en-US" noProof="0" smtClean="0"/>
-              <a:pPr>
-                <a:defRPr/>
-              </a:pPr>
-              <a:t>31</a:t>
-            </a:fld>
-            <a:endParaRPr lang="en-US" noProof="0"/>
+            <a:r>
+              <a:rPr lang="en-US" sz="9600" dirty="0"/>
+              <a:t>5</a:t>
+            </a:r>
+            <a:r>
+              <a:rPr lang="en-US" sz="9600" dirty="0"/>
+              <a:t/>
+            </a:r>
+            <a:br>
+              <a:rPr lang="en-US" sz="9600" dirty="0"/>
+            </a:br>
+            <a:r>
+              <a:rPr lang="en-US" dirty="0" smtClean="0"/>
+              <a:t>JAXB &amp; </a:t>
+            </a:r>
+            <a:r>
+              <a:rPr lang="en-US" dirty="0" err="1" smtClean="0"/>
+              <a:t>Xpath</a:t>
+            </a:r>
+            <a:endParaRPr lang="en-US" dirty="0"/>
           </a:p>
         </p:txBody>
       </p:sp>
     </p:spTree>
     <p:extLst>
       <p:ext uri="{BB962C8B-B14F-4D97-AF65-F5344CB8AC3E}">
-        <p14:creationId xmlns:p14="http://schemas.microsoft.com/office/powerpoint/2010/main" val="3482330255"/>
+        <p14:creationId xmlns:p14="http://schemas.microsoft.com/office/powerpoint/2010/main" val="253511563"/>
       </p:ext>
     </p:extLst>
   </p:cSld>
@@ -26691,6 +26701,312 @@
       </p:grpSpPr>
       <p:sp>
         <p:nvSpPr>
+          <p:cNvPr id="5" name="Marcador de contenido 14"/>
+          <p:cNvSpPr txBox="1">
+            <a:spLocks/>
+          </p:cNvSpPr>
+          <p:nvPr/>
+        </p:nvSpPr>
+        <p:spPr bwMode="auto">
+          <a:xfrm>
+            <a:off x="614627" y="1492189"/>
+            <a:ext cx="8208912" cy="4965019"/>
+          </a:xfrm>
+          <a:prstGeom prst="rect">
+            <a:avLst/>
+          </a:prstGeom>
+          <a:noFill/>
+          <a:ln>
+            <a:noFill/>
+          </a:ln>
+          <a:extLst>
+            <a:ext uri="{909E8E84-426E-40DD-AFC4-6F175D3DCCD1}">
+              <a14:hiddenFill xmlns:a14="http://schemas.microsoft.com/office/drawing/2010/main">
+                <a:solidFill>
+                  <a:srgbClr val="FFFFFF"/>
+                </a:solidFill>
+              </a14:hiddenFill>
+            </a:ext>
+            <a:ext uri="{91240B29-F687-4F45-9708-019B960494DF}">
+              <a14:hiddenLine xmlns:a14="http://schemas.microsoft.com/office/drawing/2010/main" w="9525">
+                <a:solidFill>
+                  <a:srgbClr val="000000"/>
+                </a:solidFill>
+                <a:miter lim="800000"/>
+                <a:headEnd/>
+                <a:tailEnd/>
+              </a14:hiddenLine>
+            </a:ext>
+          </a:extLst>
+        </p:spPr>
+        <p:txBody>
+          <a:bodyPr vert="horz" wrap="square" lIns="91440" tIns="45720" rIns="91440" bIns="45720" numCol="1" anchor="t" anchorCtr="0" compatLnSpc="1">
+            <a:prstTxWarp prst="textNoShape">
+              <a:avLst/>
+            </a:prstTxWarp>
+          </a:bodyPr>
+          <a:lstStyle>
+            <a:lvl1pPr marL="126000" marR="0" indent="-180000" algn="l" defTabSz="914400" rtl="0" eaLnBrk="0" fontAlgn="base" latinLnBrk="0" hangingPunct="0">
+              <a:lnSpc>
+                <a:spcPct val="100000"/>
+              </a:lnSpc>
+              <a:spcBef>
+                <a:spcPct val="20000"/>
+              </a:spcBef>
+              <a:spcAft>
+                <a:spcPct val="0"/>
+              </a:spcAft>
+              <a:buClrTx/>
+              <a:buSzTx/>
+              <a:buFont typeface="Arial Rounded MT Bold" pitchFamily="34" charset="0"/>
+              <a:buChar char="›"/>
+              <a:tabLst/>
+              <a:defRPr kern="1200">
+                <a:solidFill>
+                  <a:schemeClr val="tx1">
+                    <a:lumMod val="75000"/>
+                    <a:lumOff val="25000"/>
+                  </a:schemeClr>
+                </a:solidFill>
+                <a:latin typeface="Arial"/>
+                <a:ea typeface="+mn-ea"/>
+                <a:cs typeface="Arial"/>
+              </a:defRPr>
+            </a:lvl1pPr>
+            <a:lvl2pPr marL="540000" marR="0" indent="-180000" algn="l" defTabSz="914400" rtl="0" eaLnBrk="0" fontAlgn="base" latinLnBrk="0" hangingPunct="0">
+              <a:lnSpc>
+                <a:spcPct val="100000"/>
+              </a:lnSpc>
+              <a:spcBef>
+                <a:spcPct val="20000"/>
+              </a:spcBef>
+              <a:spcAft>
+                <a:spcPct val="0"/>
+              </a:spcAft>
+              <a:buClrTx/>
+              <a:buSzTx/>
+              <a:buFont typeface="Arial Rounded MT Bold" pitchFamily="34" charset="0"/>
+              <a:buChar char="›"/>
+              <a:tabLst/>
+              <a:defRPr sz="1600" kern="1200">
+                <a:solidFill>
+                  <a:schemeClr val="tx1">
+                    <a:lumMod val="75000"/>
+                    <a:lumOff val="25000"/>
+                  </a:schemeClr>
+                </a:solidFill>
+                <a:latin typeface="Arial"/>
+                <a:ea typeface="+mn-ea"/>
+                <a:cs typeface="Arial"/>
+              </a:defRPr>
+            </a:lvl2pPr>
+            <a:lvl3pPr marL="715963" marR="0" indent="-180000" algn="l" defTabSz="914400" rtl="0" eaLnBrk="0" fontAlgn="base" latinLnBrk="0" hangingPunct="0">
+              <a:lnSpc>
+                <a:spcPct val="100000"/>
+              </a:lnSpc>
+              <a:spcBef>
+                <a:spcPct val="20000"/>
+              </a:spcBef>
+              <a:spcAft>
+                <a:spcPct val="0"/>
+              </a:spcAft>
+              <a:buClrTx/>
+              <a:buSzTx/>
+              <a:buFont typeface="Arial Rounded MT Bold" pitchFamily="34" charset="0"/>
+              <a:buChar char="›"/>
+              <a:tabLst/>
+              <a:defRPr sz="1400" kern="1200">
+                <a:solidFill>
+                  <a:schemeClr val="tx1">
+                    <a:lumMod val="75000"/>
+                    <a:lumOff val="25000"/>
+                  </a:schemeClr>
+                </a:solidFill>
+                <a:latin typeface="Arial"/>
+                <a:ea typeface="+mn-ea"/>
+                <a:cs typeface="Arial"/>
+              </a:defRPr>
+            </a:lvl3pPr>
+            <a:lvl4pPr marL="923925" marR="0" indent="-180000" algn="l" defTabSz="914400" rtl="0" eaLnBrk="0" fontAlgn="base" latinLnBrk="0" hangingPunct="0">
+              <a:lnSpc>
+                <a:spcPct val="100000"/>
+              </a:lnSpc>
+              <a:spcBef>
+                <a:spcPct val="20000"/>
+              </a:spcBef>
+              <a:spcAft>
+                <a:spcPct val="0"/>
+              </a:spcAft>
+              <a:buClrTx/>
+              <a:buSzTx/>
+              <a:buFont typeface="Arial Rounded MT Bold" pitchFamily="34" charset="0"/>
+              <a:buChar char="›"/>
+              <a:tabLst/>
+              <a:defRPr sz="1200" kern="1200">
+                <a:solidFill>
+                  <a:schemeClr val="tx1">
+                    <a:lumMod val="75000"/>
+                    <a:lumOff val="25000"/>
+                  </a:schemeClr>
+                </a:solidFill>
+                <a:latin typeface="Arial"/>
+                <a:ea typeface="+mn-ea"/>
+                <a:cs typeface="Arial"/>
+              </a:defRPr>
+            </a:lvl4pPr>
+            <a:lvl5pPr marL="1079500" indent="-77788" algn="l" rtl="0" eaLnBrk="1" fontAlgn="base" hangingPunct="1">
+              <a:spcBef>
+                <a:spcPct val="20000"/>
+              </a:spcBef>
+              <a:spcAft>
+                <a:spcPct val="0"/>
+              </a:spcAft>
+              <a:buFont typeface="Arial Rounded MT Bold" pitchFamily="34" charset="0"/>
+              <a:buChar char="›"/>
+              <a:defRPr sz="1100" kern="1200">
+                <a:solidFill>
+                  <a:schemeClr val="tx1"/>
+                </a:solidFill>
+                <a:latin typeface="Arial" pitchFamily="34" charset="0"/>
+                <a:ea typeface="+mn-ea"/>
+                <a:cs typeface="Arial" pitchFamily="34" charset="0"/>
+              </a:defRPr>
+            </a:lvl5pPr>
+            <a:lvl6pPr marL="2514600" indent="-228600" algn="l" defTabSz="914400" rtl="0" eaLnBrk="1" latinLnBrk="0" hangingPunct="1">
+              <a:spcBef>
+                <a:spcPct val="20000"/>
+              </a:spcBef>
+              <a:buFont typeface="Arial" pitchFamily="34" charset="0"/>
+              <a:buChar char="•"/>
+              <a:defRPr sz="2000" kern="1200">
+                <a:solidFill>
+                  <a:schemeClr val="tx1"/>
+                </a:solidFill>
+                <a:latin typeface="+mn-lt"/>
+                <a:ea typeface="+mn-ea"/>
+                <a:cs typeface="+mn-cs"/>
+              </a:defRPr>
+            </a:lvl6pPr>
+            <a:lvl7pPr marL="2971800" indent="-228600" algn="l" defTabSz="914400" rtl="0" eaLnBrk="1" latinLnBrk="0" hangingPunct="1">
+              <a:spcBef>
+                <a:spcPct val="20000"/>
+              </a:spcBef>
+              <a:buFont typeface="Arial" pitchFamily="34" charset="0"/>
+              <a:buChar char="•"/>
+              <a:defRPr sz="2000" kern="1200">
+                <a:solidFill>
+                  <a:schemeClr val="tx1"/>
+                </a:solidFill>
+                <a:latin typeface="+mn-lt"/>
+                <a:ea typeface="+mn-ea"/>
+                <a:cs typeface="+mn-cs"/>
+              </a:defRPr>
+            </a:lvl7pPr>
+            <a:lvl8pPr marL="3429000" indent="-228600" algn="l" defTabSz="914400" rtl="0" eaLnBrk="1" latinLnBrk="0" hangingPunct="1">
+              <a:spcBef>
+                <a:spcPct val="20000"/>
+              </a:spcBef>
+              <a:buFont typeface="Arial" pitchFamily="34" charset="0"/>
+              <a:buChar char="•"/>
+              <a:defRPr sz="2000" kern="1200">
+                <a:solidFill>
+                  <a:schemeClr val="tx1"/>
+                </a:solidFill>
+                <a:latin typeface="+mn-lt"/>
+                <a:ea typeface="+mn-ea"/>
+                <a:cs typeface="+mn-cs"/>
+              </a:defRPr>
+            </a:lvl8pPr>
+            <a:lvl9pPr marL="3886200" indent="-228600" algn="l" defTabSz="914400" rtl="0" eaLnBrk="1" latinLnBrk="0" hangingPunct="1">
+              <a:spcBef>
+                <a:spcPct val="20000"/>
+              </a:spcBef>
+              <a:buFont typeface="Arial" pitchFamily="34" charset="0"/>
+              <a:buChar char="•"/>
+              <a:defRPr sz="2000" kern="1200">
+                <a:solidFill>
+                  <a:schemeClr val="tx1"/>
+                </a:solidFill>
+                <a:latin typeface="+mn-lt"/>
+                <a:ea typeface="+mn-ea"/>
+                <a:cs typeface="+mn-cs"/>
+              </a:defRPr>
+            </a:lvl9pPr>
+          </a:lstStyle>
+          <a:p>
+            <a:pPr marL="342900" indent="-342900"/>
+            <a:r>
+              <a:rPr lang="en-US" dirty="0" smtClean="0"/>
+              <a:t>Used </a:t>
+            </a:r>
+            <a:r>
+              <a:rPr lang="en-US" dirty="0"/>
+              <a:t>to navigate through elements and attributes in an XML document</a:t>
+            </a:r>
+            <a:r>
+              <a:rPr lang="en-US" dirty="0" smtClean="0"/>
+              <a:t>.</a:t>
+            </a:r>
+          </a:p>
+          <a:p>
+            <a:pPr marL="342900" indent="-342900"/>
+            <a:endParaRPr lang="en-US" dirty="0"/>
+          </a:p>
+          <a:p>
+            <a:pPr marL="342900" indent="-342900"/>
+            <a:r>
+              <a:rPr lang="en-US" dirty="0" smtClean="0"/>
+              <a:t>Uses </a:t>
+            </a:r>
+            <a:r>
+              <a:rPr lang="en-US" dirty="0"/>
+              <a:t>path expressions to navigate in XML </a:t>
+            </a:r>
+            <a:r>
+              <a:rPr lang="en-US" dirty="0" smtClean="0"/>
+              <a:t>documents.</a:t>
+            </a:r>
+          </a:p>
+          <a:p>
+            <a:pPr marL="342900" indent="-342900"/>
+            <a:endParaRPr lang="en-US" dirty="0"/>
+          </a:p>
+          <a:p>
+            <a:pPr marL="342900" indent="-342900"/>
+            <a:r>
+              <a:rPr lang="en-US" dirty="0" smtClean="0"/>
+              <a:t>There </a:t>
+            </a:r>
+            <a:r>
+              <a:rPr lang="en-US" dirty="0"/>
+              <a:t>are seven kinds of nodes: element, attribute, text, namespace, processing-instruction, comment, and document nodes</a:t>
+            </a:r>
+            <a:r>
+              <a:rPr lang="en-US" dirty="0" smtClean="0"/>
+              <a:t>.</a:t>
+            </a:r>
+            <a:endParaRPr lang="en-US" sz="1400" dirty="0"/>
+          </a:p>
+          <a:p>
+            <a:pPr marL="342900" indent="-342900"/>
+            <a:endParaRPr lang="en-US" sz="1400" dirty="0" smtClean="0"/>
+          </a:p>
+          <a:p>
+            <a:pPr marL="342900" indent="-342900"/>
+            <a:r>
+              <a:rPr lang="en-US" dirty="0"/>
+              <a:t>XML documents are treated as trees of </a:t>
+            </a:r>
+            <a:r>
+              <a:rPr lang="en-US" dirty="0" smtClean="0"/>
+              <a:t>nodes.</a:t>
+            </a:r>
+            <a:endParaRPr lang="en-US" dirty="0" smtClean="0"/>
+          </a:p>
+        </p:txBody>
+      </p:sp>
+      <p:sp>
+        <p:nvSpPr>
           <p:cNvPr id="2" name="Title 1"/>
           <p:cNvSpPr>
             <a:spLocks noGrp="1"/>
@@ -26699,19 +27015,14 @@
             <p:ph type="title"/>
           </p:nvPr>
         </p:nvSpPr>
-        <p:spPr>
-          <a:xfrm>
-            <a:off x="457200" y="2590800"/>
-            <a:ext cx="8229600" cy="1143000"/>
-          </a:xfrm>
-        </p:spPr>
+        <p:spPr/>
         <p:txBody>
           <a:bodyPr/>
           <a:lstStyle/>
           <a:p>
             <a:r>
-              <a:rPr lang="en-US" dirty="0" smtClean="0"/>
-              <a:t>The End</a:t>
+              <a:rPr lang="en-US" dirty="0" err="1" smtClean="0"/>
+              <a:t>Xpath</a:t>
             </a:r>
             <a:endParaRPr lang="en-US" dirty="0"/>
           </a:p>
@@ -26720,7 +27031,7 @@
     </p:spTree>
     <p:extLst>
       <p:ext uri="{BB962C8B-B14F-4D97-AF65-F5344CB8AC3E}">
-        <p14:creationId xmlns:p14="http://schemas.microsoft.com/office/powerpoint/2010/main" val="2404004988"/>
+        <p14:creationId xmlns:p14="http://schemas.microsoft.com/office/powerpoint/2010/main" val="3367428526"/>
       </p:ext>
     </p:extLst>
   </p:cSld>
@@ -26756,6 +27067,1003 @@
       </p:grpSpPr>
       <p:sp>
         <p:nvSpPr>
+          <p:cNvPr id="2" name="Title 1"/>
+          <p:cNvSpPr>
+            <a:spLocks noGrp="1"/>
+          </p:cNvSpPr>
+          <p:nvPr>
+            <p:ph type="title"/>
+          </p:nvPr>
+        </p:nvSpPr>
+        <p:spPr/>
+        <p:txBody>
+          <a:bodyPr/>
+          <a:lstStyle/>
+          <a:p>
+            <a:r>
+              <a:rPr lang="en-US" dirty="0" err="1" smtClean="0"/>
+              <a:t>Xpath</a:t>
+            </a:r>
+            <a:r>
+              <a:rPr lang="en-US" dirty="0"/>
+              <a:t> Syntax</a:t>
+            </a:r>
+            <a:endParaRPr lang="en-US" dirty="0"/>
+          </a:p>
+        </p:txBody>
+      </p:sp>
+      <p:graphicFrame>
+        <p:nvGraphicFramePr>
+          <p:cNvPr id="6" name="Table 5"/>
+          <p:cNvGraphicFramePr>
+            <a:graphicFrameLocks noGrp="1"/>
+          </p:cNvGraphicFramePr>
+          <p:nvPr>
+            <p:extLst>
+              <p:ext uri="{D42A27DB-BD31-4B8C-83A1-F6EECF244321}">
+                <p14:modId xmlns:p14="http://schemas.microsoft.com/office/powerpoint/2010/main" val="3973027962"/>
+              </p:ext>
+            </p:extLst>
+          </p:nvPr>
+        </p:nvGraphicFramePr>
+        <p:xfrm>
+          <a:off x="457200" y="1499579"/>
+          <a:ext cx="7467600" cy="4225577"/>
+        </p:xfrm>
+        <a:graphic>
+          <a:graphicData uri="http://schemas.openxmlformats.org/drawingml/2006/table">
+            <a:tbl>
+              <a:tblPr>
+                <a:tableStyleId>{284E427A-3D55-4303-BF80-6455036E1DE7}</a:tableStyleId>
+              </a:tblPr>
+              <a:tblGrid>
+                <a:gridCol w="1676400"/>
+                <a:gridCol w="5791200"/>
+              </a:tblGrid>
+              <a:tr h="270088">
+                <a:tc>
+                  <a:txBody>
+                    <a:bodyPr/>
+                    <a:lstStyle/>
+                    <a:p>
+                      <a:pPr algn="ctr" fontAlgn="b"/>
+                      <a:r>
+                        <a:rPr lang="es-MX" sz="1800" b="1" u="none" strike="noStrike" dirty="0" err="1">
+                          <a:effectLst/>
+                        </a:rPr>
+                        <a:t>Expression</a:t>
+                      </a:r>
+                      <a:endParaRPr lang="es-MX" sz="1800" b="1" i="0" u="none" strike="noStrike" dirty="0">
+                        <a:solidFill>
+                          <a:srgbClr val="000000"/>
+                        </a:solidFill>
+                        <a:effectLst/>
+                        <a:latin typeface="Arial" panose="020B0604020202020204" pitchFamily="34" charset="0"/>
+                        <a:cs typeface="Arial" panose="020B0604020202020204" pitchFamily="34" charset="0"/>
+                      </a:endParaRPr>
+                    </a:p>
+                  </a:txBody>
+                  <a:tcPr marL="7978" marR="7978" marT="7978" marB="0" anchor="b"/>
+                </a:tc>
+                <a:tc>
+                  <a:txBody>
+                    <a:bodyPr/>
+                    <a:lstStyle/>
+                    <a:p>
+                      <a:pPr algn="ctr" fontAlgn="b"/>
+                      <a:r>
+                        <a:rPr lang="es-MX" sz="1800" b="1" u="none" strike="noStrike" dirty="0" err="1">
+                          <a:effectLst/>
+                        </a:rPr>
+                        <a:t>Description</a:t>
+                      </a:r>
+                      <a:endParaRPr lang="es-MX" sz="1800" b="1" i="0" u="none" strike="noStrike" dirty="0">
+                        <a:solidFill>
+                          <a:srgbClr val="000000"/>
+                        </a:solidFill>
+                        <a:effectLst/>
+                        <a:latin typeface="Arial" panose="020B0604020202020204" pitchFamily="34" charset="0"/>
+                        <a:cs typeface="Arial" panose="020B0604020202020204" pitchFamily="34" charset="0"/>
+                      </a:endParaRPr>
+                    </a:p>
+                  </a:txBody>
+                  <a:tcPr marL="7978" marR="7978" marT="7978" marB="0" anchor="b"/>
+                </a:tc>
+              </a:tr>
+              <a:tr h="795343">
+                <a:tc>
+                  <a:txBody>
+                    <a:bodyPr/>
+                    <a:lstStyle/>
+                    <a:p>
+                      <a:pPr algn="l" fontAlgn="b"/>
+                      <a:r>
+                        <a:rPr lang="es-MX" sz="1800" u="none" strike="noStrike" dirty="0" err="1">
+                          <a:effectLst/>
+                        </a:rPr>
+                        <a:t>nodename</a:t>
+                      </a:r>
+                      <a:endParaRPr lang="es-MX" sz="1800" b="0" i="0" u="none" strike="noStrike" dirty="0">
+                        <a:solidFill>
+                          <a:srgbClr val="000000"/>
+                        </a:solidFill>
+                        <a:effectLst/>
+                        <a:latin typeface="Arial" panose="020B0604020202020204" pitchFamily="34" charset="0"/>
+                        <a:cs typeface="Arial" panose="020B0604020202020204" pitchFamily="34" charset="0"/>
+                      </a:endParaRPr>
+                    </a:p>
+                  </a:txBody>
+                  <a:tcPr marL="7978" marR="7978" marT="7978" marB="0" anchor="ctr"/>
+                </a:tc>
+                <a:tc>
+                  <a:txBody>
+                    <a:bodyPr/>
+                    <a:lstStyle/>
+                    <a:p>
+                      <a:pPr algn="l" fontAlgn="b"/>
+                      <a:r>
+                        <a:rPr lang="en-US" sz="1800" u="none" strike="noStrike">
+                          <a:effectLst/>
+                        </a:rPr>
+                        <a:t>Selects all nodes with the name "nodename"</a:t>
+                      </a:r>
+                      <a:endParaRPr lang="en-US" sz="1800" b="0" i="0" u="none" strike="noStrike">
+                        <a:solidFill>
+                          <a:srgbClr val="000000"/>
+                        </a:solidFill>
+                        <a:effectLst/>
+                        <a:latin typeface="Arial" panose="020B0604020202020204" pitchFamily="34" charset="0"/>
+                        <a:cs typeface="Arial" panose="020B0604020202020204" pitchFamily="34" charset="0"/>
+                      </a:endParaRPr>
+                    </a:p>
+                  </a:txBody>
+                  <a:tcPr marL="7978" marR="7978" marT="7978" marB="0" anchor="ctr"/>
+                </a:tc>
+              </a:tr>
+              <a:tr h="401402">
+                <a:tc>
+                  <a:txBody>
+                    <a:bodyPr/>
+                    <a:lstStyle/>
+                    <a:p>
+                      <a:pPr algn="l" fontAlgn="b"/>
+                      <a:r>
+                        <a:rPr lang="es-MX" sz="1800" u="none" strike="noStrike" dirty="0">
+                          <a:effectLst/>
+                        </a:rPr>
+                        <a:t>/</a:t>
+                      </a:r>
+                      <a:endParaRPr lang="es-MX" sz="1800" b="0" i="0" u="none" strike="noStrike" dirty="0">
+                        <a:solidFill>
+                          <a:srgbClr val="000000"/>
+                        </a:solidFill>
+                        <a:effectLst/>
+                        <a:latin typeface="Arial" panose="020B0604020202020204" pitchFamily="34" charset="0"/>
+                        <a:cs typeface="Arial" panose="020B0604020202020204" pitchFamily="34" charset="0"/>
+                      </a:endParaRPr>
+                    </a:p>
+                  </a:txBody>
+                  <a:tcPr marL="7978" marR="7978" marT="7978" marB="0" anchor="ctr"/>
+                </a:tc>
+                <a:tc>
+                  <a:txBody>
+                    <a:bodyPr/>
+                    <a:lstStyle/>
+                    <a:p>
+                      <a:pPr algn="l" fontAlgn="b"/>
+                      <a:r>
+                        <a:rPr lang="en-US" sz="1800" u="none" strike="noStrike">
+                          <a:effectLst/>
+                        </a:rPr>
+                        <a:t>Selects from the root node</a:t>
+                      </a:r>
+                      <a:endParaRPr lang="en-US" sz="1800" b="0" i="0" u="none" strike="noStrike">
+                        <a:solidFill>
+                          <a:srgbClr val="000000"/>
+                        </a:solidFill>
+                        <a:effectLst/>
+                        <a:latin typeface="Arial" panose="020B0604020202020204" pitchFamily="34" charset="0"/>
+                        <a:cs typeface="Arial" panose="020B0604020202020204" pitchFamily="34" charset="0"/>
+                      </a:endParaRPr>
+                    </a:p>
+                  </a:txBody>
+                  <a:tcPr marL="7978" marR="7978" marT="7978" marB="0" anchor="ctr"/>
+                </a:tc>
+              </a:tr>
+              <a:tr h="1136178">
+                <a:tc>
+                  <a:txBody>
+                    <a:bodyPr/>
+                    <a:lstStyle/>
+                    <a:p>
+                      <a:pPr algn="l" fontAlgn="b"/>
+                      <a:r>
+                        <a:rPr lang="es-MX" sz="1800" u="none" strike="noStrike" dirty="0">
+                          <a:effectLst/>
+                        </a:rPr>
+                        <a:t>//</a:t>
+                      </a:r>
+                      <a:endParaRPr lang="es-MX" sz="1800" b="0" i="0" u="none" strike="noStrike" dirty="0">
+                        <a:solidFill>
+                          <a:srgbClr val="000000"/>
+                        </a:solidFill>
+                        <a:effectLst/>
+                        <a:latin typeface="Arial" panose="020B0604020202020204" pitchFamily="34" charset="0"/>
+                        <a:cs typeface="Arial" panose="020B0604020202020204" pitchFamily="34" charset="0"/>
+                      </a:endParaRPr>
+                    </a:p>
+                  </a:txBody>
+                  <a:tcPr marL="7978" marR="7978" marT="7978" marB="0" anchor="ctr"/>
+                </a:tc>
+                <a:tc>
+                  <a:txBody>
+                    <a:bodyPr/>
+                    <a:lstStyle/>
+                    <a:p>
+                      <a:pPr algn="l" fontAlgn="b"/>
+                      <a:r>
+                        <a:rPr lang="en-US" sz="1800" u="none" strike="noStrike" dirty="0">
+                          <a:effectLst/>
+                        </a:rPr>
+                        <a:t>Selects nodes in the document from the current node that match the selection no matter where they are</a:t>
+                      </a:r>
+                      <a:endParaRPr lang="en-US" sz="1800" b="0" i="0" u="none" strike="noStrike" dirty="0">
+                        <a:solidFill>
+                          <a:srgbClr val="000000"/>
+                        </a:solidFill>
+                        <a:effectLst/>
+                        <a:latin typeface="Arial" panose="020B0604020202020204" pitchFamily="34" charset="0"/>
+                        <a:cs typeface="Arial" panose="020B0604020202020204" pitchFamily="34" charset="0"/>
+                      </a:endParaRPr>
+                    </a:p>
+                  </a:txBody>
+                  <a:tcPr marL="7978" marR="7978" marT="7978" marB="0" anchor="ctr"/>
+                </a:tc>
+              </a:tr>
+              <a:tr h="532715">
+                <a:tc>
+                  <a:txBody>
+                    <a:bodyPr/>
+                    <a:lstStyle/>
+                    <a:p>
+                      <a:pPr algn="l" fontAlgn="b"/>
+                      <a:r>
+                        <a:rPr lang="es-MX" sz="1800" u="none" strike="noStrike" dirty="0">
+                          <a:effectLst/>
+                        </a:rPr>
+                        <a:t>.</a:t>
+                      </a:r>
+                      <a:endParaRPr lang="es-MX" sz="1800" b="0" i="0" u="none" strike="noStrike" dirty="0">
+                        <a:solidFill>
+                          <a:srgbClr val="000000"/>
+                        </a:solidFill>
+                        <a:effectLst/>
+                        <a:latin typeface="Arial" panose="020B0604020202020204" pitchFamily="34" charset="0"/>
+                        <a:cs typeface="Arial" panose="020B0604020202020204" pitchFamily="34" charset="0"/>
+                      </a:endParaRPr>
+                    </a:p>
+                  </a:txBody>
+                  <a:tcPr marL="7978" marR="7978" marT="7978" marB="0" anchor="ctr"/>
+                </a:tc>
+                <a:tc>
+                  <a:txBody>
+                    <a:bodyPr/>
+                    <a:lstStyle/>
+                    <a:p>
+                      <a:pPr algn="l" fontAlgn="b"/>
+                      <a:r>
+                        <a:rPr lang="es-MX" sz="1800" u="none" strike="noStrike" dirty="0" err="1">
+                          <a:effectLst/>
+                        </a:rPr>
+                        <a:t>Selects</a:t>
+                      </a:r>
+                      <a:r>
+                        <a:rPr lang="es-MX" sz="1800" u="none" strike="noStrike" dirty="0">
+                          <a:effectLst/>
+                        </a:rPr>
+                        <a:t> </a:t>
+                      </a:r>
+                      <a:r>
+                        <a:rPr lang="es-MX" sz="1800" u="none" strike="noStrike" dirty="0" err="1">
+                          <a:effectLst/>
+                        </a:rPr>
+                        <a:t>the</a:t>
+                      </a:r>
+                      <a:r>
+                        <a:rPr lang="es-MX" sz="1800" u="none" strike="noStrike" dirty="0">
+                          <a:effectLst/>
+                        </a:rPr>
+                        <a:t> </a:t>
+                      </a:r>
+                      <a:r>
+                        <a:rPr lang="es-MX" sz="1800" u="none" strike="noStrike" dirty="0" err="1">
+                          <a:effectLst/>
+                        </a:rPr>
+                        <a:t>current</a:t>
+                      </a:r>
+                      <a:r>
+                        <a:rPr lang="es-MX" sz="1800" u="none" strike="noStrike" dirty="0">
+                          <a:effectLst/>
+                        </a:rPr>
+                        <a:t> </a:t>
+                      </a:r>
+                      <a:r>
+                        <a:rPr lang="es-MX" sz="1800" u="none" strike="noStrike" dirty="0" err="1">
+                          <a:effectLst/>
+                        </a:rPr>
+                        <a:t>node</a:t>
+                      </a:r>
+                      <a:endParaRPr lang="es-MX" sz="1800" b="0" i="0" u="none" strike="noStrike" dirty="0">
+                        <a:solidFill>
+                          <a:srgbClr val="000000"/>
+                        </a:solidFill>
+                        <a:effectLst/>
+                        <a:latin typeface="Arial" panose="020B0604020202020204" pitchFamily="34" charset="0"/>
+                        <a:cs typeface="Arial" panose="020B0604020202020204" pitchFamily="34" charset="0"/>
+                      </a:endParaRPr>
+                    </a:p>
+                  </a:txBody>
+                  <a:tcPr marL="7978" marR="7978" marT="7978" marB="0" anchor="ctr"/>
+                </a:tc>
+              </a:tr>
+              <a:tr h="795343">
+                <a:tc>
+                  <a:txBody>
+                    <a:bodyPr/>
+                    <a:lstStyle/>
+                    <a:p>
+                      <a:pPr algn="l" fontAlgn="b"/>
+                      <a:r>
+                        <a:rPr lang="es-MX" sz="1800" u="none" strike="noStrike" dirty="0">
+                          <a:effectLst/>
+                        </a:rPr>
+                        <a:t>..</a:t>
+                      </a:r>
+                      <a:endParaRPr lang="es-MX" sz="1800" b="0" i="0" u="none" strike="noStrike" dirty="0">
+                        <a:solidFill>
+                          <a:srgbClr val="000000"/>
+                        </a:solidFill>
+                        <a:effectLst/>
+                        <a:latin typeface="Arial" panose="020B0604020202020204" pitchFamily="34" charset="0"/>
+                        <a:cs typeface="Arial" panose="020B0604020202020204" pitchFamily="34" charset="0"/>
+                      </a:endParaRPr>
+                    </a:p>
+                  </a:txBody>
+                  <a:tcPr marL="7978" marR="7978" marT="7978" marB="0" anchor="ctr"/>
+                </a:tc>
+                <a:tc>
+                  <a:txBody>
+                    <a:bodyPr/>
+                    <a:lstStyle/>
+                    <a:p>
+                      <a:pPr algn="l" fontAlgn="b"/>
+                      <a:r>
+                        <a:rPr lang="en-US" sz="1800" u="none" strike="noStrike" dirty="0">
+                          <a:effectLst/>
+                        </a:rPr>
+                        <a:t>Selects the parent of the current node</a:t>
+                      </a:r>
+                      <a:endParaRPr lang="en-US" sz="1800" b="0" i="0" u="none" strike="noStrike" dirty="0">
+                        <a:solidFill>
+                          <a:srgbClr val="000000"/>
+                        </a:solidFill>
+                        <a:effectLst/>
+                        <a:latin typeface="Arial" panose="020B0604020202020204" pitchFamily="34" charset="0"/>
+                        <a:cs typeface="Arial" panose="020B0604020202020204" pitchFamily="34" charset="0"/>
+                      </a:endParaRPr>
+                    </a:p>
+                  </a:txBody>
+                  <a:tcPr marL="7978" marR="7978" marT="7978" marB="0" anchor="ctr"/>
+                </a:tc>
+              </a:tr>
+              <a:tr h="270088">
+                <a:tc>
+                  <a:txBody>
+                    <a:bodyPr/>
+                    <a:lstStyle/>
+                    <a:p>
+                      <a:pPr algn="l" fontAlgn="b"/>
+                      <a:r>
+                        <a:rPr lang="es-MX" sz="1800" u="none" strike="noStrike" dirty="0">
+                          <a:effectLst/>
+                        </a:rPr>
+                        <a:t>@</a:t>
+                      </a:r>
+                      <a:endParaRPr lang="es-MX" sz="1800" b="0" i="0" u="none" strike="noStrike" dirty="0">
+                        <a:solidFill>
+                          <a:srgbClr val="000000"/>
+                        </a:solidFill>
+                        <a:effectLst/>
+                        <a:latin typeface="Arial" panose="020B0604020202020204" pitchFamily="34" charset="0"/>
+                        <a:cs typeface="Arial" panose="020B0604020202020204" pitchFamily="34" charset="0"/>
+                      </a:endParaRPr>
+                    </a:p>
+                  </a:txBody>
+                  <a:tcPr marL="7978" marR="7978" marT="7978" marB="0" anchor="ctr"/>
+                </a:tc>
+                <a:tc>
+                  <a:txBody>
+                    <a:bodyPr/>
+                    <a:lstStyle/>
+                    <a:p>
+                      <a:pPr algn="l" fontAlgn="b"/>
+                      <a:r>
+                        <a:rPr lang="es-MX" sz="1800" u="none" strike="noStrike" dirty="0" err="1">
+                          <a:effectLst/>
+                        </a:rPr>
+                        <a:t>Selects</a:t>
+                      </a:r>
+                      <a:r>
+                        <a:rPr lang="es-MX" sz="1800" u="none" strike="noStrike" dirty="0">
+                          <a:effectLst/>
+                        </a:rPr>
+                        <a:t> </a:t>
+                      </a:r>
+                      <a:r>
+                        <a:rPr lang="es-MX" sz="1800" u="none" strike="noStrike" dirty="0" err="1">
+                          <a:effectLst/>
+                        </a:rPr>
+                        <a:t>attributes</a:t>
+                      </a:r>
+                      <a:endParaRPr lang="es-MX" sz="1800" b="0" i="0" u="none" strike="noStrike" dirty="0">
+                        <a:solidFill>
+                          <a:srgbClr val="000000"/>
+                        </a:solidFill>
+                        <a:effectLst/>
+                        <a:latin typeface="Arial" panose="020B0604020202020204" pitchFamily="34" charset="0"/>
+                        <a:cs typeface="Arial" panose="020B0604020202020204" pitchFamily="34" charset="0"/>
+                      </a:endParaRPr>
+                    </a:p>
+                  </a:txBody>
+                  <a:tcPr marL="7978" marR="7978" marT="7978" marB="0" anchor="ctr"/>
+                </a:tc>
+              </a:tr>
+            </a:tbl>
+          </a:graphicData>
+        </a:graphic>
+      </p:graphicFrame>
+    </p:spTree>
+    <p:extLst>
+      <p:ext uri="{BB962C8B-B14F-4D97-AF65-F5344CB8AC3E}">
+        <p14:creationId xmlns:p14="http://schemas.microsoft.com/office/powerpoint/2010/main" val="1221730672"/>
+      </p:ext>
+    </p:extLst>
+  </p:cSld>
+  <p:clrMapOvr>
+    <a:masterClrMapping/>
+  </p:clrMapOvr>
+  <p:timing>
+    <p:tnLst>
+      <p:par>
+        <p:cTn id="1" dur="indefinite" restart="never" nodeType="tmRoot"/>
+      </p:par>
+    </p:tnLst>
+  </p:timing>
+</p:sld>
+</file>
+
+<file path=ppt/slides/slide34.xml><?xml version="1.0" encoding="utf-8"?>
+<p:sld xmlns:a="http://schemas.openxmlformats.org/drawingml/2006/main" xmlns:r="http://schemas.openxmlformats.org/officeDocument/2006/relationships" xmlns:p="http://schemas.openxmlformats.org/presentationml/2006/main">
+  <p:cSld>
+    <p:spTree>
+      <p:nvGrpSpPr>
+        <p:cNvPr id="1" name=""/>
+        <p:cNvGrpSpPr/>
+        <p:nvPr/>
+      </p:nvGrpSpPr>
+      <p:grpSpPr>
+        <a:xfrm>
+          <a:off x="0" y="0"/>
+          <a:ext cx="0" cy="0"/>
+          <a:chOff x="0" y="0"/>
+          <a:chExt cx="0" cy="0"/>
+        </a:xfrm>
+      </p:grpSpPr>
+      <p:sp>
+        <p:nvSpPr>
+          <p:cNvPr id="5" name="Marcador de contenido 14"/>
+          <p:cNvSpPr txBox="1">
+            <a:spLocks/>
+          </p:cNvSpPr>
+          <p:nvPr/>
+        </p:nvSpPr>
+        <p:spPr bwMode="auto">
+          <a:xfrm>
+            <a:off x="614627" y="1492189"/>
+            <a:ext cx="8208912" cy="4965019"/>
+          </a:xfrm>
+          <a:prstGeom prst="rect">
+            <a:avLst/>
+          </a:prstGeom>
+          <a:noFill/>
+          <a:ln>
+            <a:noFill/>
+          </a:ln>
+          <a:extLst>
+            <a:ext uri="{909E8E84-426E-40DD-AFC4-6F175D3DCCD1}">
+              <a14:hiddenFill xmlns:a14="http://schemas.microsoft.com/office/drawing/2010/main">
+                <a:solidFill>
+                  <a:srgbClr val="FFFFFF"/>
+                </a:solidFill>
+              </a14:hiddenFill>
+            </a:ext>
+            <a:ext uri="{91240B29-F687-4F45-9708-019B960494DF}">
+              <a14:hiddenLine xmlns:a14="http://schemas.microsoft.com/office/drawing/2010/main" w="9525">
+                <a:solidFill>
+                  <a:srgbClr val="000000"/>
+                </a:solidFill>
+                <a:miter lim="800000"/>
+                <a:headEnd/>
+                <a:tailEnd/>
+              </a14:hiddenLine>
+            </a:ext>
+          </a:extLst>
+        </p:spPr>
+        <p:txBody>
+          <a:bodyPr vert="horz" wrap="square" lIns="91440" tIns="45720" rIns="91440" bIns="45720" numCol="1" anchor="t" anchorCtr="0" compatLnSpc="1">
+            <a:prstTxWarp prst="textNoShape">
+              <a:avLst/>
+            </a:prstTxWarp>
+          </a:bodyPr>
+          <a:lstStyle>
+            <a:lvl1pPr marL="126000" marR="0" indent="-180000" algn="l" defTabSz="914400" rtl="0" eaLnBrk="0" fontAlgn="base" latinLnBrk="0" hangingPunct="0">
+              <a:lnSpc>
+                <a:spcPct val="100000"/>
+              </a:lnSpc>
+              <a:spcBef>
+                <a:spcPct val="20000"/>
+              </a:spcBef>
+              <a:spcAft>
+                <a:spcPct val="0"/>
+              </a:spcAft>
+              <a:buClrTx/>
+              <a:buSzTx/>
+              <a:buFont typeface="Arial Rounded MT Bold" pitchFamily="34" charset="0"/>
+              <a:buChar char="›"/>
+              <a:tabLst/>
+              <a:defRPr kern="1200">
+                <a:solidFill>
+                  <a:schemeClr val="tx1">
+                    <a:lumMod val="75000"/>
+                    <a:lumOff val="25000"/>
+                  </a:schemeClr>
+                </a:solidFill>
+                <a:latin typeface="Arial"/>
+                <a:ea typeface="+mn-ea"/>
+                <a:cs typeface="Arial"/>
+              </a:defRPr>
+            </a:lvl1pPr>
+            <a:lvl2pPr marL="540000" marR="0" indent="-180000" algn="l" defTabSz="914400" rtl="0" eaLnBrk="0" fontAlgn="base" latinLnBrk="0" hangingPunct="0">
+              <a:lnSpc>
+                <a:spcPct val="100000"/>
+              </a:lnSpc>
+              <a:spcBef>
+                <a:spcPct val="20000"/>
+              </a:spcBef>
+              <a:spcAft>
+                <a:spcPct val="0"/>
+              </a:spcAft>
+              <a:buClrTx/>
+              <a:buSzTx/>
+              <a:buFont typeface="Arial Rounded MT Bold" pitchFamily="34" charset="0"/>
+              <a:buChar char="›"/>
+              <a:tabLst/>
+              <a:defRPr sz="1600" kern="1200">
+                <a:solidFill>
+                  <a:schemeClr val="tx1">
+                    <a:lumMod val="75000"/>
+                    <a:lumOff val="25000"/>
+                  </a:schemeClr>
+                </a:solidFill>
+                <a:latin typeface="Arial"/>
+                <a:ea typeface="+mn-ea"/>
+                <a:cs typeface="Arial"/>
+              </a:defRPr>
+            </a:lvl2pPr>
+            <a:lvl3pPr marL="715963" marR="0" indent="-180000" algn="l" defTabSz="914400" rtl="0" eaLnBrk="0" fontAlgn="base" latinLnBrk="0" hangingPunct="0">
+              <a:lnSpc>
+                <a:spcPct val="100000"/>
+              </a:lnSpc>
+              <a:spcBef>
+                <a:spcPct val="20000"/>
+              </a:spcBef>
+              <a:spcAft>
+                <a:spcPct val="0"/>
+              </a:spcAft>
+              <a:buClrTx/>
+              <a:buSzTx/>
+              <a:buFont typeface="Arial Rounded MT Bold" pitchFamily="34" charset="0"/>
+              <a:buChar char="›"/>
+              <a:tabLst/>
+              <a:defRPr sz="1400" kern="1200">
+                <a:solidFill>
+                  <a:schemeClr val="tx1">
+                    <a:lumMod val="75000"/>
+                    <a:lumOff val="25000"/>
+                  </a:schemeClr>
+                </a:solidFill>
+                <a:latin typeface="Arial"/>
+                <a:ea typeface="+mn-ea"/>
+                <a:cs typeface="Arial"/>
+              </a:defRPr>
+            </a:lvl3pPr>
+            <a:lvl4pPr marL="923925" marR="0" indent="-180000" algn="l" defTabSz="914400" rtl="0" eaLnBrk="0" fontAlgn="base" latinLnBrk="0" hangingPunct="0">
+              <a:lnSpc>
+                <a:spcPct val="100000"/>
+              </a:lnSpc>
+              <a:spcBef>
+                <a:spcPct val="20000"/>
+              </a:spcBef>
+              <a:spcAft>
+                <a:spcPct val="0"/>
+              </a:spcAft>
+              <a:buClrTx/>
+              <a:buSzTx/>
+              <a:buFont typeface="Arial Rounded MT Bold" pitchFamily="34" charset="0"/>
+              <a:buChar char="›"/>
+              <a:tabLst/>
+              <a:defRPr sz="1200" kern="1200">
+                <a:solidFill>
+                  <a:schemeClr val="tx1">
+                    <a:lumMod val="75000"/>
+                    <a:lumOff val="25000"/>
+                  </a:schemeClr>
+                </a:solidFill>
+                <a:latin typeface="Arial"/>
+                <a:ea typeface="+mn-ea"/>
+                <a:cs typeface="Arial"/>
+              </a:defRPr>
+            </a:lvl4pPr>
+            <a:lvl5pPr marL="1079500" indent="-77788" algn="l" rtl="0" eaLnBrk="1" fontAlgn="base" hangingPunct="1">
+              <a:spcBef>
+                <a:spcPct val="20000"/>
+              </a:spcBef>
+              <a:spcAft>
+                <a:spcPct val="0"/>
+              </a:spcAft>
+              <a:buFont typeface="Arial Rounded MT Bold" pitchFamily="34" charset="0"/>
+              <a:buChar char="›"/>
+              <a:defRPr sz="1100" kern="1200">
+                <a:solidFill>
+                  <a:schemeClr val="tx1"/>
+                </a:solidFill>
+                <a:latin typeface="Arial" pitchFamily="34" charset="0"/>
+                <a:ea typeface="+mn-ea"/>
+                <a:cs typeface="Arial" pitchFamily="34" charset="0"/>
+              </a:defRPr>
+            </a:lvl5pPr>
+            <a:lvl6pPr marL="2514600" indent="-228600" algn="l" defTabSz="914400" rtl="0" eaLnBrk="1" latinLnBrk="0" hangingPunct="1">
+              <a:spcBef>
+                <a:spcPct val="20000"/>
+              </a:spcBef>
+              <a:buFont typeface="Arial" pitchFamily="34" charset="0"/>
+              <a:buChar char="•"/>
+              <a:defRPr sz="2000" kern="1200">
+                <a:solidFill>
+                  <a:schemeClr val="tx1"/>
+                </a:solidFill>
+                <a:latin typeface="+mn-lt"/>
+                <a:ea typeface="+mn-ea"/>
+                <a:cs typeface="+mn-cs"/>
+              </a:defRPr>
+            </a:lvl6pPr>
+            <a:lvl7pPr marL="2971800" indent="-228600" algn="l" defTabSz="914400" rtl="0" eaLnBrk="1" latinLnBrk="0" hangingPunct="1">
+              <a:spcBef>
+                <a:spcPct val="20000"/>
+              </a:spcBef>
+              <a:buFont typeface="Arial" pitchFamily="34" charset="0"/>
+              <a:buChar char="•"/>
+              <a:defRPr sz="2000" kern="1200">
+                <a:solidFill>
+                  <a:schemeClr val="tx1"/>
+                </a:solidFill>
+                <a:latin typeface="+mn-lt"/>
+                <a:ea typeface="+mn-ea"/>
+                <a:cs typeface="+mn-cs"/>
+              </a:defRPr>
+            </a:lvl7pPr>
+            <a:lvl8pPr marL="3429000" indent="-228600" algn="l" defTabSz="914400" rtl="0" eaLnBrk="1" latinLnBrk="0" hangingPunct="1">
+              <a:spcBef>
+                <a:spcPct val="20000"/>
+              </a:spcBef>
+              <a:buFont typeface="Arial" pitchFamily="34" charset="0"/>
+              <a:buChar char="•"/>
+              <a:defRPr sz="2000" kern="1200">
+                <a:solidFill>
+                  <a:schemeClr val="tx1"/>
+                </a:solidFill>
+                <a:latin typeface="+mn-lt"/>
+                <a:ea typeface="+mn-ea"/>
+                <a:cs typeface="+mn-cs"/>
+              </a:defRPr>
+            </a:lvl8pPr>
+            <a:lvl9pPr marL="3886200" indent="-228600" algn="l" defTabSz="914400" rtl="0" eaLnBrk="1" latinLnBrk="0" hangingPunct="1">
+              <a:spcBef>
+                <a:spcPct val="20000"/>
+              </a:spcBef>
+              <a:buFont typeface="Arial" pitchFamily="34" charset="0"/>
+              <a:buChar char="•"/>
+              <a:defRPr sz="2000" kern="1200">
+                <a:solidFill>
+                  <a:schemeClr val="tx1"/>
+                </a:solidFill>
+                <a:latin typeface="+mn-lt"/>
+                <a:ea typeface="+mn-ea"/>
+                <a:cs typeface="+mn-cs"/>
+              </a:defRPr>
+            </a:lvl9pPr>
+          </a:lstStyle>
+          <a:p>
+            <a:pPr marL="342900" indent="-342900"/>
+            <a:r>
+              <a:rPr lang="en-US" dirty="0"/>
+              <a:t>Java Architecture for XML Binding.</a:t>
+            </a:r>
+            <a:endParaRPr lang="en-US" dirty="0" smtClean="0"/>
+          </a:p>
+          <a:p>
+            <a:pPr marL="342900" indent="-342900"/>
+            <a:endParaRPr lang="en-US" dirty="0"/>
+          </a:p>
+          <a:p>
+            <a:pPr marL="342900" indent="-342900"/>
+            <a:r>
+              <a:rPr lang="en-US" dirty="0"/>
+              <a:t>Marshalling – Convert a Java object into a XML file.</a:t>
+            </a:r>
+            <a:endParaRPr lang="en-US" dirty="0" smtClean="0"/>
+          </a:p>
+          <a:p>
+            <a:pPr marL="342900" indent="-342900"/>
+            <a:endParaRPr lang="en-US" dirty="0"/>
+          </a:p>
+          <a:p>
+            <a:pPr marL="342900" indent="-342900"/>
+            <a:r>
+              <a:rPr lang="en-US" dirty="0" err="1"/>
+              <a:t>Unmarshalling</a:t>
+            </a:r>
+            <a:r>
+              <a:rPr lang="en-US" dirty="0"/>
+              <a:t> – Convert XML content into a Java Object.</a:t>
+            </a:r>
+            <a:endParaRPr lang="en-US" sz="1400" dirty="0"/>
+          </a:p>
+          <a:p>
+            <a:pPr marL="342900" indent="-342900"/>
+            <a:endParaRPr lang="en-US" sz="1400" dirty="0" smtClean="0"/>
+          </a:p>
+          <a:p>
+            <a:pPr marL="342900" indent="-342900"/>
+            <a:r>
+              <a:rPr lang="en-US" dirty="0"/>
+              <a:t>Most common annotations @</a:t>
+            </a:r>
+            <a:r>
+              <a:rPr lang="en-US" dirty="0" err="1" smtClean="0"/>
+              <a:t>XmlRootElement</a:t>
+            </a:r>
+            <a:r>
+              <a:rPr lang="en-US" dirty="0"/>
+              <a:t>, @</a:t>
+            </a:r>
+            <a:r>
+              <a:rPr lang="en-US" dirty="0" err="1" smtClean="0"/>
+              <a:t>XmlElement</a:t>
+            </a:r>
+            <a:r>
+              <a:rPr lang="en-US" dirty="0"/>
+              <a:t>, @</a:t>
+            </a:r>
+            <a:r>
+              <a:rPr lang="en-US" dirty="0" err="1"/>
+              <a:t>XmlAttribute</a:t>
+            </a:r>
+            <a:endParaRPr lang="en-US" dirty="0" smtClean="0"/>
+          </a:p>
+        </p:txBody>
+      </p:sp>
+      <p:sp>
+        <p:nvSpPr>
+          <p:cNvPr id="2" name="Title 1"/>
+          <p:cNvSpPr>
+            <a:spLocks noGrp="1"/>
+          </p:cNvSpPr>
+          <p:nvPr>
+            <p:ph type="title"/>
+          </p:nvPr>
+        </p:nvSpPr>
+        <p:spPr/>
+        <p:txBody>
+          <a:bodyPr/>
+          <a:lstStyle/>
+          <a:p>
+            <a:r>
+              <a:rPr lang="en-US" dirty="0" smtClean="0"/>
+              <a:t>JAXB</a:t>
+            </a:r>
+            <a:endParaRPr lang="en-US" dirty="0"/>
+          </a:p>
+        </p:txBody>
+      </p:sp>
+    </p:spTree>
+    <p:extLst>
+      <p:ext uri="{BB962C8B-B14F-4D97-AF65-F5344CB8AC3E}">
+        <p14:creationId xmlns:p14="http://schemas.microsoft.com/office/powerpoint/2010/main" val="1114002136"/>
+      </p:ext>
+    </p:extLst>
+  </p:cSld>
+  <p:clrMapOvr>
+    <a:masterClrMapping/>
+  </p:clrMapOvr>
+  <p:timing>
+    <p:tnLst>
+      <p:par>
+        <p:cTn id="1" dur="indefinite" restart="never" nodeType="tmRoot"/>
+      </p:par>
+    </p:tnLst>
+  </p:timing>
+</p:sld>
+</file>
+
+<file path=ppt/slides/slide35.xml><?xml version="1.0" encoding="utf-8"?>
+<p:sld xmlns:a="http://schemas.openxmlformats.org/drawingml/2006/main" xmlns:r="http://schemas.openxmlformats.org/officeDocument/2006/relationships" xmlns:p="http://schemas.openxmlformats.org/presentationml/2006/main">
+  <p:cSld>
+    <p:spTree>
+      <p:nvGrpSpPr>
+        <p:cNvPr id="1" name=""/>
+        <p:cNvGrpSpPr/>
+        <p:nvPr/>
+      </p:nvGrpSpPr>
+      <p:grpSpPr>
+        <a:xfrm>
+          <a:off x="0" y="0"/>
+          <a:ext cx="0" cy="0"/>
+          <a:chOff x="0" y="0"/>
+          <a:chExt cx="0" cy="0"/>
+        </a:xfrm>
+      </p:grpSpPr>
+      <p:sp>
+        <p:nvSpPr>
+          <p:cNvPr id="4" name="Slide Number Placeholder 3"/>
+          <p:cNvSpPr>
+            <a:spLocks noGrp="1"/>
+          </p:cNvSpPr>
+          <p:nvPr>
+            <p:ph type="sldNum" sz="quarter" idx="4294967295"/>
+          </p:nvPr>
+        </p:nvSpPr>
+        <p:spPr>
+          <a:xfrm>
+            <a:off x="0" y="6519863"/>
+            <a:ext cx="360363" cy="222250"/>
+          </a:xfrm>
+          <a:prstGeom prst="rect">
+            <a:avLst/>
+          </a:prstGeom>
+        </p:spPr>
+        <p:txBody>
+          <a:bodyPr/>
+          <a:lstStyle/>
+          <a:p>
+            <a:pPr>
+              <a:defRPr/>
+            </a:pPr>
+            <a:fld id="{4AD834FB-D050-4DAD-A587-98ECF1E1D3D9}" type="slidenum">
+              <a:rPr lang="en-US" noProof="0" smtClean="0"/>
+              <a:pPr>
+                <a:defRPr/>
+              </a:pPr>
+              <a:t>35</a:t>
+            </a:fld>
+            <a:endParaRPr lang="en-US" noProof="0"/>
+          </a:p>
+        </p:txBody>
+      </p:sp>
+    </p:spTree>
+    <p:extLst>
+      <p:ext uri="{BB962C8B-B14F-4D97-AF65-F5344CB8AC3E}">
+        <p14:creationId xmlns:p14="http://schemas.microsoft.com/office/powerpoint/2010/main" val="3482330255"/>
+      </p:ext>
+    </p:extLst>
+  </p:cSld>
+  <p:clrMapOvr>
+    <a:masterClrMapping/>
+  </p:clrMapOvr>
+  <p:timing>
+    <p:tnLst>
+      <p:par>
+        <p:cTn id="1" dur="indefinite" restart="never" nodeType="tmRoot"/>
+      </p:par>
+    </p:tnLst>
+  </p:timing>
+</p:sld>
+</file>
+
+<file path=ppt/slides/slide36.xml><?xml version="1.0" encoding="utf-8"?>
+<p:sld xmlns:a="http://schemas.openxmlformats.org/drawingml/2006/main" xmlns:r="http://schemas.openxmlformats.org/officeDocument/2006/relationships" xmlns:p="http://schemas.openxmlformats.org/presentationml/2006/main">
+  <p:cSld>
+    <p:spTree>
+      <p:nvGrpSpPr>
+        <p:cNvPr id="1" name=""/>
+        <p:cNvGrpSpPr/>
+        <p:nvPr/>
+      </p:nvGrpSpPr>
+      <p:grpSpPr>
+        <a:xfrm>
+          <a:off x="0" y="0"/>
+          <a:ext cx="0" cy="0"/>
+          <a:chOff x="0" y="0"/>
+          <a:chExt cx="0" cy="0"/>
+        </a:xfrm>
+      </p:grpSpPr>
+      <p:sp>
+        <p:nvSpPr>
+          <p:cNvPr id="2" name="Title 1"/>
+          <p:cNvSpPr>
+            <a:spLocks noGrp="1"/>
+          </p:cNvSpPr>
+          <p:nvPr>
+            <p:ph type="title"/>
+          </p:nvPr>
+        </p:nvSpPr>
+        <p:spPr>
+          <a:xfrm>
+            <a:off x="457200" y="2590800"/>
+            <a:ext cx="8229600" cy="1143000"/>
+          </a:xfrm>
+        </p:spPr>
+        <p:txBody>
+          <a:bodyPr/>
+          <a:lstStyle/>
+          <a:p>
+            <a:r>
+              <a:rPr lang="en-US" dirty="0" smtClean="0"/>
+              <a:t>The End</a:t>
+            </a:r>
+            <a:endParaRPr lang="en-US" dirty="0"/>
+          </a:p>
+        </p:txBody>
+      </p:sp>
+    </p:spTree>
+    <p:extLst>
+      <p:ext uri="{BB962C8B-B14F-4D97-AF65-F5344CB8AC3E}">
+        <p14:creationId xmlns:p14="http://schemas.microsoft.com/office/powerpoint/2010/main" val="2404004988"/>
+      </p:ext>
+    </p:extLst>
+  </p:cSld>
+  <p:clrMapOvr>
+    <a:masterClrMapping/>
+  </p:clrMapOvr>
+  <p:timing>
+    <p:tnLst>
+      <p:par>
+        <p:cTn id="1" dur="indefinite" restart="never" nodeType="tmRoot"/>
+      </p:par>
+    </p:tnLst>
+  </p:timing>
+</p:sld>
+</file>
+
+<file path=ppt/slides/slide37.xml><?xml version="1.0" encoding="utf-8"?>
+<p:sld xmlns:a="http://schemas.openxmlformats.org/drawingml/2006/main" xmlns:r="http://schemas.openxmlformats.org/officeDocument/2006/relationships" xmlns:p="http://schemas.openxmlformats.org/presentationml/2006/main">
+  <p:cSld>
+    <p:spTree>
+      <p:nvGrpSpPr>
+        <p:cNvPr id="1" name=""/>
+        <p:cNvGrpSpPr/>
+        <p:nvPr/>
+      </p:nvGrpSpPr>
+      <p:grpSpPr>
+        <a:xfrm>
+          <a:off x="0" y="0"/>
+          <a:ext cx="0" cy="0"/>
+          <a:chOff x="0" y="0"/>
+          <a:chExt cx="0" cy="0"/>
+        </a:xfrm>
+      </p:grpSpPr>
+      <p:sp>
+        <p:nvSpPr>
           <p:cNvPr id="7" name="Text Placeholder 6"/>
           <p:cNvSpPr>
             <a:spLocks noGrp="1"/>
@@ -26908,7 +28216,6 @@
               <a:rPr lang="en-US" dirty="0"/>
               <a:t>http://www.w3.org/TR/wsdl</a:t>
             </a:r>
-            <a:endParaRPr lang="en-US" dirty="0"/>
           </a:p>
         </p:txBody>
       </p:sp>
@@ -27363,7 +28670,6 @@
               <a:rPr lang="es-MX" dirty="0" smtClean="0"/>
               <a:t>.</a:t>
             </a:r>
-            <a:endParaRPr lang="es-MX" dirty="0" smtClean="0"/>
           </a:p>
           <a:p>
             <a:endParaRPr lang="en-US" dirty="0" smtClean="0"/>
@@ -27398,7 +28704,6 @@
               <a:rPr lang="es-MX" dirty="0" smtClean="0"/>
               <a:t>. </a:t>
             </a:r>
-            <a:endParaRPr lang="es-MX" dirty="0" smtClean="0"/>
           </a:p>
           <a:p>
             <a:endParaRPr lang="es-MX" dirty="0"/>
@@ -27847,11 +29152,7 @@
           <a:p>
             <a:r>
               <a:rPr lang="en-US" dirty="0" smtClean="0"/>
-              <a:t>WSDL</a:t>
-            </a:r>
-            <a:r>
-              <a:rPr lang="en-US" dirty="0" smtClean="0"/>
-              <a:t>.</a:t>
+              <a:t>WSDL.</a:t>
             </a:r>
           </a:p>
           <a:p>

</xml_diff>